<commit_message>
Slides for overlapping chunks
</commit_message>
<xml_diff>
--- a/challenges/house_of_force/house_of_force.pptx
+++ b/challenges/house_of_force/house_of_force.pptx
@@ -23737,7 +23737,7 @@
           <a:p>
             <a:fld id="{2DA23E8D-1792-1541-9147-970A8DD8A355}" type="datetimeFigureOut">
               <a:rPr lang="en-US" smtClean="0"/>
-              <a:t>12/28/20</a:t>
+              <a:t>3/20/21</a:t>
             </a:fld>
             <a:endParaRPr lang="en-US" dirty="0"/>
           </a:p>
@@ -24207,7 +24207,7 @@
                 <a:latin typeface="Calibri"/>
               </a:rPr>
               <a:pPr/>
-              <a:t>12/28/20</a:t>
+              <a:t>3/20/21</a:t>
             </a:fld>
             <a:endParaRPr lang="en-US" dirty="0">
               <a:solidFill>
@@ -24460,7 +24460,7 @@
                 <a:latin typeface="Calibri"/>
               </a:rPr>
               <a:pPr/>
-              <a:t>12/28/20</a:t>
+              <a:t>3/20/21</a:t>
             </a:fld>
             <a:endParaRPr lang="en-US" dirty="0">
               <a:solidFill>
@@ -24675,7 +24675,7 @@
                 <a:latin typeface="Calibri"/>
               </a:rPr>
               <a:pPr/>
-              <a:t>12/28/20</a:t>
+              <a:t>3/20/21</a:t>
             </a:fld>
             <a:endParaRPr lang="en-US" dirty="0">
               <a:solidFill>
@@ -24959,7 +24959,7 @@
                 <a:latin typeface="Calibri"/>
               </a:rPr>
               <a:pPr/>
-              <a:t>12/28/20</a:t>
+              <a:t>3/20/21</a:t>
             </a:fld>
             <a:endParaRPr lang="en-US" dirty="0">
               <a:solidFill>
@@ -25301,7 +25301,7 @@
                 <a:latin typeface="Calibri"/>
               </a:rPr>
               <a:pPr/>
-              <a:t>12/28/20</a:t>
+              <a:t>3/20/21</a:t>
             </a:fld>
             <a:endParaRPr lang="en-US" dirty="0">
               <a:solidFill>
@@ -25629,7 +25629,7 @@
                 <a:latin typeface="Calibri"/>
               </a:rPr>
               <a:pPr/>
-              <a:t>12/28/20</a:t>
+              <a:t>3/20/21</a:t>
             </a:fld>
             <a:endParaRPr lang="en-US" dirty="0">
               <a:solidFill>
@@ -26118,7 +26118,7 @@
                 <a:latin typeface="Calibri"/>
               </a:rPr>
               <a:pPr/>
-              <a:t>12/28/20</a:t>
+              <a:t>3/20/21</a:t>
             </a:fld>
             <a:endParaRPr lang="en-US" dirty="0">
               <a:solidFill>
@@ -26301,7 +26301,7 @@
                 <a:latin typeface="Calibri"/>
               </a:rPr>
               <a:pPr/>
-              <a:t>12/28/20</a:t>
+              <a:t>3/20/21</a:t>
             </a:fld>
             <a:endParaRPr lang="en-US" dirty="0">
               <a:solidFill>
@@ -26547,7 +26547,7 @@
                 <a:latin typeface="Calibri"/>
               </a:rPr>
               <a:pPr/>
-              <a:t>12/28/20</a:t>
+              <a:t>3/20/21</a:t>
             </a:fld>
             <a:endParaRPr lang="en-US" dirty="0">
               <a:solidFill>
@@ -26889,7 +26889,7 @@
                 <a:latin typeface="Calibri"/>
               </a:rPr>
               <a:pPr/>
-              <a:t>12/28/20</a:t>
+              <a:t>3/20/21</a:t>
             </a:fld>
             <a:endParaRPr lang="en-US" dirty="0">
               <a:solidFill>
@@ -27181,7 +27181,7 @@
                 <a:latin typeface="Calibri"/>
               </a:rPr>
               <a:pPr/>
-              <a:t>12/28/20</a:t>
+              <a:t>3/20/21</a:t>
             </a:fld>
             <a:endParaRPr lang="en-US" dirty="0">
               <a:solidFill>
@@ -27431,7 +27431,7 @@
                 <a:latin typeface="Calibri"/>
               </a:rPr>
               <a:pPr defTabSz="914400"/>
-              <a:t>12/28/20</a:t>
+              <a:t>3/20/21</a:t>
             </a:fld>
             <a:endParaRPr lang="en-US" dirty="0">
               <a:solidFill>
@@ -43867,7 +43867,7 @@
             </a:pPr>
             <a:r>
               <a:rPr lang="en-US" sz="2100" b="1" dirty="0"/>
-              <a:t>Top Chunk Extension </a:t>
+              <a:t>Top Chunk Usage </a:t>
             </a:r>
           </a:p>
           <a:p>
@@ -45277,7 +45277,7 @@
             </a:pPr>
             <a:r>
               <a:rPr lang="en-US" sz="2100" dirty="0"/>
-              <a:t>Top Chunk Extension </a:t>
+              <a:t>Top Chunk Usage </a:t>
             </a:r>
             <a:r>
               <a:rPr lang="en-US" sz="2100" b="1" dirty="0"/>

</xml_diff>

<commit_message>
House of Force slide changes
</commit_message>
<xml_diff>
--- a/challenges/house_of_force/house_of_force.pptx
+++ b/challenges/house_of_force/house_of_force.pptx
@@ -5,7 +5,7 @@
     <p:sldMasterId id="2147483660" r:id="rId1"/>
   </p:sldMasterIdLst>
   <p:notesMasterIdLst>
-    <p:notesMasterId r:id="rId57"/>
+    <p:notesMasterId r:id="rId56"/>
   </p:notesMasterIdLst>
   <p:sldIdLst>
     <p:sldId id="327" r:id="rId2"/>
@@ -34,35 +34,34 @@
     <p:sldId id="521" r:id="rId25"/>
     <p:sldId id="522" r:id="rId26"/>
     <p:sldId id="516" r:id="rId27"/>
-    <p:sldId id="526" r:id="rId28"/>
-    <p:sldId id="504" r:id="rId29"/>
-    <p:sldId id="505" r:id="rId30"/>
-    <p:sldId id="525" r:id="rId31"/>
-    <p:sldId id="536" r:id="rId32"/>
-    <p:sldId id="537" r:id="rId33"/>
-    <p:sldId id="531" r:id="rId34"/>
-    <p:sldId id="532" r:id="rId35"/>
-    <p:sldId id="533" r:id="rId36"/>
-    <p:sldId id="535" r:id="rId37"/>
-    <p:sldId id="538" r:id="rId38"/>
-    <p:sldId id="540" r:id="rId39"/>
-    <p:sldId id="546" r:id="rId40"/>
-    <p:sldId id="544" r:id="rId41"/>
-    <p:sldId id="543" r:id="rId42"/>
-    <p:sldId id="542" r:id="rId43"/>
-    <p:sldId id="541" r:id="rId44"/>
-    <p:sldId id="545" r:id="rId45"/>
-    <p:sldId id="552" r:id="rId46"/>
-    <p:sldId id="547" r:id="rId47"/>
-    <p:sldId id="549" r:id="rId48"/>
-    <p:sldId id="550" r:id="rId49"/>
-    <p:sldId id="551" r:id="rId50"/>
-    <p:sldId id="553" r:id="rId51"/>
-    <p:sldId id="554" r:id="rId52"/>
-    <p:sldId id="555" r:id="rId53"/>
-    <p:sldId id="556" r:id="rId54"/>
-    <p:sldId id="557" r:id="rId55"/>
-    <p:sldId id="524" r:id="rId56"/>
+    <p:sldId id="504" r:id="rId28"/>
+    <p:sldId id="505" r:id="rId29"/>
+    <p:sldId id="525" r:id="rId30"/>
+    <p:sldId id="536" r:id="rId31"/>
+    <p:sldId id="537" r:id="rId32"/>
+    <p:sldId id="531" r:id="rId33"/>
+    <p:sldId id="532" r:id="rId34"/>
+    <p:sldId id="533" r:id="rId35"/>
+    <p:sldId id="535" r:id="rId36"/>
+    <p:sldId id="538" r:id="rId37"/>
+    <p:sldId id="540" r:id="rId38"/>
+    <p:sldId id="546" r:id="rId39"/>
+    <p:sldId id="544" r:id="rId40"/>
+    <p:sldId id="543" r:id="rId41"/>
+    <p:sldId id="542" r:id="rId42"/>
+    <p:sldId id="541" r:id="rId43"/>
+    <p:sldId id="545" r:id="rId44"/>
+    <p:sldId id="552" r:id="rId45"/>
+    <p:sldId id="547" r:id="rId46"/>
+    <p:sldId id="549" r:id="rId47"/>
+    <p:sldId id="550" r:id="rId48"/>
+    <p:sldId id="551" r:id="rId49"/>
+    <p:sldId id="553" r:id="rId50"/>
+    <p:sldId id="554" r:id="rId51"/>
+    <p:sldId id="555" r:id="rId52"/>
+    <p:sldId id="556" r:id="rId53"/>
+    <p:sldId id="557" r:id="rId54"/>
+    <p:sldId id="524" r:id="rId55"/>
   </p:sldIdLst>
   <p:sldSz cx="9144000" cy="5143500" type="screen16x9"/>
   <p:notesSz cx="6858000" cy="9144000"/>
@@ -23737,7 +23736,7 @@
           <a:p>
             <a:fld id="{2DA23E8D-1792-1541-9147-970A8DD8A355}" type="datetimeFigureOut">
               <a:rPr lang="en-US" smtClean="0"/>
-              <a:t>3/20/21</a:t>
+              <a:t>3/23/21</a:t>
             </a:fld>
             <a:endParaRPr lang="en-US" dirty="0"/>
           </a:p>
@@ -24207,7 +24206,7 @@
                 <a:latin typeface="Calibri"/>
               </a:rPr>
               <a:pPr/>
-              <a:t>3/20/21</a:t>
+              <a:t>3/23/21</a:t>
             </a:fld>
             <a:endParaRPr lang="en-US" dirty="0">
               <a:solidFill>
@@ -24460,7 +24459,7 @@
                 <a:latin typeface="Calibri"/>
               </a:rPr>
               <a:pPr/>
-              <a:t>3/20/21</a:t>
+              <a:t>3/23/21</a:t>
             </a:fld>
             <a:endParaRPr lang="en-US" dirty="0">
               <a:solidFill>
@@ -24675,7 +24674,7 @@
                 <a:latin typeface="Calibri"/>
               </a:rPr>
               <a:pPr/>
-              <a:t>3/20/21</a:t>
+              <a:t>3/23/21</a:t>
             </a:fld>
             <a:endParaRPr lang="en-US" dirty="0">
               <a:solidFill>
@@ -24959,7 +24958,7 @@
                 <a:latin typeface="Calibri"/>
               </a:rPr>
               <a:pPr/>
-              <a:t>3/20/21</a:t>
+              <a:t>3/23/21</a:t>
             </a:fld>
             <a:endParaRPr lang="en-US" dirty="0">
               <a:solidFill>
@@ -25301,7 +25300,7 @@
                 <a:latin typeface="Calibri"/>
               </a:rPr>
               <a:pPr/>
-              <a:t>3/20/21</a:t>
+              <a:t>3/23/21</a:t>
             </a:fld>
             <a:endParaRPr lang="en-US" dirty="0">
               <a:solidFill>
@@ -25629,7 +25628,7 @@
                 <a:latin typeface="Calibri"/>
               </a:rPr>
               <a:pPr/>
-              <a:t>3/20/21</a:t>
+              <a:t>3/23/21</a:t>
             </a:fld>
             <a:endParaRPr lang="en-US" dirty="0">
               <a:solidFill>
@@ -26118,7 +26117,7 @@
                 <a:latin typeface="Calibri"/>
               </a:rPr>
               <a:pPr/>
-              <a:t>3/20/21</a:t>
+              <a:t>3/23/21</a:t>
             </a:fld>
             <a:endParaRPr lang="en-US" dirty="0">
               <a:solidFill>
@@ -26301,7 +26300,7 @@
                 <a:latin typeface="Calibri"/>
               </a:rPr>
               <a:pPr/>
-              <a:t>3/20/21</a:t>
+              <a:t>3/23/21</a:t>
             </a:fld>
             <a:endParaRPr lang="en-US" dirty="0">
               <a:solidFill>
@@ -26547,7 +26546,7 @@
                 <a:latin typeface="Calibri"/>
               </a:rPr>
               <a:pPr/>
-              <a:t>3/20/21</a:t>
+              <a:t>3/23/21</a:t>
             </a:fld>
             <a:endParaRPr lang="en-US" dirty="0">
               <a:solidFill>
@@ -26889,7 +26888,7 @@
                 <a:latin typeface="Calibri"/>
               </a:rPr>
               <a:pPr/>
-              <a:t>3/20/21</a:t>
+              <a:t>3/23/21</a:t>
             </a:fld>
             <a:endParaRPr lang="en-US" dirty="0">
               <a:solidFill>
@@ -27181,7 +27180,7 @@
                 <a:latin typeface="Calibri"/>
               </a:rPr>
               <a:pPr/>
-              <a:t>3/20/21</a:t>
+              <a:t>3/23/21</a:t>
             </a:fld>
             <a:endParaRPr lang="en-US" dirty="0">
               <a:solidFill>
@@ -27431,7 +27430,7 @@
                 <a:latin typeface="Calibri"/>
               </a:rPr>
               <a:pPr defTabSz="914400"/>
-              <a:t>3/20/21</a:t>
+              <a:t>3/23/21</a:t>
             </a:fld>
             <a:endParaRPr lang="en-US" dirty="0">
               <a:solidFill>
@@ -33538,19 +33537,19 @@
         </p:nvSpPr>
         <p:spPr>
           <a:xfrm>
-            <a:off x="628650" y="273847"/>
-            <a:ext cx="7886700" cy="994172"/>
+            <a:off x="124358" y="288238"/>
+            <a:ext cx="8727034" cy="994172"/>
           </a:xfrm>
         </p:spPr>
         <p:txBody>
           <a:bodyPr anchor="ctr">
-            <a:normAutofit/>
+            <a:normAutofit fontScale="90000"/>
           </a:bodyPr>
           <a:lstStyle/>
           <a:p>
             <a:r>
               <a:rPr lang="en-US" dirty="0"/>
-              <a:t>Allocate Close to Target – 4 </a:t>
+              <a:t>Allocate Close to Target – Aftermath </a:t>
             </a:r>
           </a:p>
         </p:txBody>
@@ -33697,6 +33696,50 @@
           </a:xfrm>
         </p:spPr>
       </p:pic>
+      <p:cxnSp>
+        <p:nvCxnSpPr>
+          <p:cNvPr id="6" name="Straight Arrow Connector 5">
+            <a:extLst>
+              <a:ext uri="{FF2B5EF4-FFF2-40B4-BE49-F238E27FC236}">
+                <a16:creationId xmlns:a16="http://schemas.microsoft.com/office/drawing/2014/main" id="{CE98D7A2-9928-A44D-BF77-64B3281A74EF}"/>
+              </a:ext>
+            </a:extLst>
+          </p:cNvPr>
+          <p:cNvCxnSpPr>
+            <a:cxnSpLocks/>
+          </p:cNvCxnSpPr>
+          <p:nvPr/>
+        </p:nvCxnSpPr>
+        <p:spPr>
+          <a:xfrm flipH="1">
+            <a:off x="6318558" y="4105104"/>
+            <a:ext cx="601621" cy="0"/>
+          </a:xfrm>
+          <a:prstGeom prst="straightConnector1">
+            <a:avLst/>
+          </a:prstGeom>
+          <a:ln w="57150">
+            <a:solidFill>
+              <a:srgbClr val="FF0000"/>
+            </a:solidFill>
+            <a:tailEnd type="triangle"/>
+          </a:ln>
+        </p:spPr>
+        <p:style>
+          <a:lnRef idx="1">
+            <a:schemeClr val="accent1"/>
+          </a:lnRef>
+          <a:fillRef idx="0">
+            <a:schemeClr val="accent1"/>
+          </a:fillRef>
+          <a:effectRef idx="0">
+            <a:schemeClr val="accent1"/>
+          </a:effectRef>
+          <a:fontRef idx="minor">
+            <a:schemeClr val="tx1"/>
+          </a:fontRef>
+        </p:style>
+      </p:cxnSp>
     </p:spTree>
     <p:extLst>
       <p:ext uri="{BB962C8B-B14F-4D97-AF65-F5344CB8AC3E}">
@@ -33897,6 +33940,50 @@
           </a:xfrm>
         </p:spPr>
       </p:pic>
+      <p:cxnSp>
+        <p:nvCxnSpPr>
+          <p:cNvPr id="6" name="Straight Arrow Connector 5">
+            <a:extLst>
+              <a:ext uri="{FF2B5EF4-FFF2-40B4-BE49-F238E27FC236}">
+                <a16:creationId xmlns:a16="http://schemas.microsoft.com/office/drawing/2014/main" id="{2F683981-7973-014A-8499-C1887CF91774}"/>
+              </a:ext>
+            </a:extLst>
+          </p:cNvPr>
+          <p:cNvCxnSpPr>
+            <a:cxnSpLocks/>
+          </p:cNvCxnSpPr>
+          <p:nvPr/>
+        </p:nvCxnSpPr>
+        <p:spPr>
+          <a:xfrm flipH="1">
+            <a:off x="6318558" y="4105104"/>
+            <a:ext cx="601621" cy="0"/>
+          </a:xfrm>
+          <a:prstGeom prst="straightConnector1">
+            <a:avLst/>
+          </a:prstGeom>
+          <a:ln w="57150">
+            <a:solidFill>
+              <a:srgbClr val="FF0000"/>
+            </a:solidFill>
+            <a:tailEnd type="triangle"/>
+          </a:ln>
+        </p:spPr>
+        <p:style>
+          <a:lnRef idx="1">
+            <a:schemeClr val="accent1"/>
+          </a:lnRef>
+          <a:fillRef idx="0">
+            <a:schemeClr val="accent1"/>
+          </a:fillRef>
+          <a:effectRef idx="0">
+            <a:schemeClr val="accent1"/>
+          </a:effectRef>
+          <a:fontRef idx="minor">
+            <a:schemeClr val="tx1"/>
+          </a:fontRef>
+        </p:style>
+      </p:cxnSp>
     </p:spTree>
     <p:extLst>
       <p:ext uri="{BB962C8B-B14F-4D97-AF65-F5344CB8AC3E}">
@@ -35211,94 +35298,6 @@
           <p:cNvPr id="2" name="Title 1">
             <a:extLst>
               <a:ext uri="{FF2B5EF4-FFF2-40B4-BE49-F238E27FC236}">
-                <a16:creationId xmlns:a16="http://schemas.microsoft.com/office/drawing/2014/main" id="{2E937BBE-3517-B74B-B553-0D1366B462B8}"/>
-              </a:ext>
-            </a:extLst>
-          </p:cNvPr>
-          <p:cNvSpPr>
-            <a:spLocks noGrp="1"/>
-          </p:cNvSpPr>
-          <p:nvPr>
-            <p:ph type="title"/>
-          </p:nvPr>
-        </p:nvSpPr>
-        <p:spPr/>
-        <p:txBody>
-          <a:bodyPr>
-            <a:normAutofit fontScale="90000"/>
-          </a:bodyPr>
-          <a:lstStyle/>
-          <a:p>
-            <a:r>
-              <a:rPr lang="en-US" dirty="0"/>
-              <a:t>House of Force – Technique Notes</a:t>
-            </a:r>
-          </a:p>
-        </p:txBody>
-      </p:sp>
-      <p:sp>
-        <p:nvSpPr>
-          <p:cNvPr id="3" name="Content Placeholder 2">
-            <a:extLst>
-              <a:ext uri="{FF2B5EF4-FFF2-40B4-BE49-F238E27FC236}">
-                <a16:creationId xmlns:a16="http://schemas.microsoft.com/office/drawing/2014/main" id="{F35BDBDF-032D-184B-94F7-F3307CE0ABDE}"/>
-              </a:ext>
-            </a:extLst>
-          </p:cNvPr>
-          <p:cNvSpPr>
-            <a:spLocks noGrp="1"/>
-          </p:cNvSpPr>
-          <p:nvPr>
-            <p:ph idx="1"/>
-          </p:nvPr>
-        </p:nvSpPr>
-        <p:spPr/>
-        <p:txBody>
-          <a:bodyPr/>
-          <a:lstStyle/>
-          <a:p>
-            <a:r>
-              <a:rPr lang="en-US" dirty="0"/>
-              <a:t>Used to set a pointer to ANY location</a:t>
-            </a:r>
-          </a:p>
-        </p:txBody>
-      </p:sp>
-    </p:spTree>
-    <p:extLst>
-      <p:ext uri="{BB962C8B-B14F-4D97-AF65-F5344CB8AC3E}">
-        <p14:creationId xmlns:p14="http://schemas.microsoft.com/office/powerpoint/2010/main" val="2624626848"/>
-      </p:ext>
-    </p:extLst>
-  </p:cSld>
-  <p:clrMapOvr>
-    <a:masterClrMapping/>
-  </p:clrMapOvr>
-</p:sld>
-</file>
-
-<file path=ppt/slides/slide28.xml><?xml version="1.0" encoding="utf-8"?>
-<p:sld xmlns:a="http://schemas.openxmlformats.org/drawingml/2006/main" xmlns:r="http://schemas.openxmlformats.org/officeDocument/2006/relationships" xmlns:p="http://schemas.openxmlformats.org/presentationml/2006/main">
-  <p:cSld>
-    <p:spTree>
-      <p:nvGrpSpPr>
-        <p:cNvPr id="1" name=""/>
-        <p:cNvGrpSpPr/>
-        <p:nvPr/>
-      </p:nvGrpSpPr>
-      <p:grpSpPr>
-        <a:xfrm>
-          <a:off x="0" y="0"/>
-          <a:ext cx="0" cy="0"/>
-          <a:chOff x="0" y="0"/>
-          <a:chExt cx="0" cy="0"/>
-        </a:xfrm>
-      </p:grpSpPr>
-      <p:sp>
-        <p:nvSpPr>
-          <p:cNvPr id="2" name="Title 1">
-            <a:extLst>
-              <a:ext uri="{FF2B5EF4-FFF2-40B4-BE49-F238E27FC236}">
                 <a16:creationId xmlns:a16="http://schemas.microsoft.com/office/drawing/2014/main" id="{BA872FA3-F02F-1745-B595-57166CE10F41}"/>
               </a:ext>
             </a:extLst>
@@ -35410,7 +35409,7 @@
 </p:sld>
 </file>
 
-<file path=ppt/slides/slide29.xml><?xml version="1.0" encoding="utf-8"?>
+<file path=ppt/slides/slide28.xml><?xml version="1.0" encoding="utf-8"?>
 <p:sld xmlns:a="http://schemas.openxmlformats.org/drawingml/2006/main" xmlns:r="http://schemas.openxmlformats.org/officeDocument/2006/relationships" xmlns:p="http://schemas.openxmlformats.org/presentationml/2006/main">
   <p:cSld>
     <p:spTree>
@@ -35583,6 +35582,156 @@
     <p:extLst>
       <p:ext uri="{BB962C8B-B14F-4D97-AF65-F5344CB8AC3E}">
         <p14:creationId xmlns:p14="http://schemas.microsoft.com/office/powerpoint/2010/main" val="496836656"/>
+      </p:ext>
+    </p:extLst>
+  </p:cSld>
+  <p:clrMapOvr>
+    <a:masterClrMapping/>
+  </p:clrMapOvr>
+</p:sld>
+</file>
+
+<file path=ppt/slides/slide29.xml><?xml version="1.0" encoding="utf-8"?>
+<p:sld xmlns:a="http://schemas.openxmlformats.org/drawingml/2006/main" xmlns:r="http://schemas.openxmlformats.org/officeDocument/2006/relationships" xmlns:p="http://schemas.openxmlformats.org/presentationml/2006/main">
+  <p:cSld>
+    <p:spTree>
+      <p:nvGrpSpPr>
+        <p:cNvPr id="1" name=""/>
+        <p:cNvGrpSpPr/>
+        <p:nvPr/>
+      </p:nvGrpSpPr>
+      <p:grpSpPr>
+        <a:xfrm>
+          <a:off x="0" y="0"/>
+          <a:ext cx="0" cy="0"/>
+          <a:chOff x="0" y="0"/>
+          <a:chExt cx="0" cy="0"/>
+        </a:xfrm>
+      </p:grpSpPr>
+      <p:sp>
+        <p:nvSpPr>
+          <p:cNvPr id="2" name="Title 1">
+            <a:extLst>
+              <a:ext uri="{FF2B5EF4-FFF2-40B4-BE49-F238E27FC236}">
+                <a16:creationId xmlns:a16="http://schemas.microsoft.com/office/drawing/2014/main" id="{82DA7DEA-B481-9045-B5D4-BF35BBF2F0E2}"/>
+              </a:ext>
+            </a:extLst>
+          </p:cNvPr>
+          <p:cNvSpPr>
+            <a:spLocks noGrp="1"/>
+          </p:cNvSpPr>
+          <p:nvPr>
+            <p:ph type="title"/>
+          </p:nvPr>
+        </p:nvSpPr>
+        <p:spPr/>
+        <p:txBody>
+          <a:bodyPr/>
+          <a:lstStyle/>
+          <a:p>
+            <a:r>
+              <a:rPr lang="en-US" dirty="0"/>
+              <a:t>Challenge Time!</a:t>
+            </a:r>
+          </a:p>
+        </p:txBody>
+      </p:sp>
+      <p:sp>
+        <p:nvSpPr>
+          <p:cNvPr id="3" name="Content Placeholder 2">
+            <a:extLst>
+              <a:ext uri="{FF2B5EF4-FFF2-40B4-BE49-F238E27FC236}">
+                <a16:creationId xmlns:a16="http://schemas.microsoft.com/office/drawing/2014/main" id="{9B84729C-0F4E-C64D-A363-B1B7546CE7EE}"/>
+              </a:ext>
+            </a:extLst>
+          </p:cNvPr>
+          <p:cNvSpPr>
+            <a:spLocks noGrp="1"/>
+          </p:cNvSpPr>
+          <p:nvPr>
+            <p:ph idx="1"/>
+          </p:nvPr>
+        </p:nvSpPr>
+        <p:spPr/>
+        <p:txBody>
+          <a:bodyPr/>
+          <a:lstStyle/>
+          <a:p>
+            <a:r>
+              <a:rPr lang="en-US" dirty="0" err="1"/>
+              <a:t>house_of_force</a:t>
+            </a:r>
+            <a:r>
+              <a:rPr lang="en-US" dirty="0"/>
+              <a:t>/</a:t>
+            </a:r>
+            <a:r>
+              <a:rPr lang="en-US" dirty="0" err="1"/>
+              <a:t>shinning_moment</a:t>
+            </a:r>
+            <a:endParaRPr lang="en-US" dirty="0"/>
+          </a:p>
+          <a:p>
+            <a:r>
+              <a:rPr lang="en-US" dirty="0"/>
+              <a:t>Remember the three steps: </a:t>
+            </a:r>
+          </a:p>
+          <a:p>
+            <a:pPr lvl="1"/>
+            <a:r>
+              <a:rPr lang="en-US" dirty="0"/>
+              <a:t>Corrupt Top Chunk</a:t>
+            </a:r>
+          </a:p>
+          <a:p>
+            <a:pPr lvl="1"/>
+            <a:r>
+              <a:rPr lang="en-US" dirty="0"/>
+              <a:t>Allocate </a:t>
+            </a:r>
+            <a:r>
+              <a:rPr lang="en-US" i="1" dirty="0"/>
+              <a:t>close</a:t>
+            </a:r>
+            <a:r>
+              <a:rPr lang="en-US" dirty="0"/>
+              <a:t> to the target</a:t>
+            </a:r>
+          </a:p>
+          <a:p>
+            <a:pPr lvl="1"/>
+            <a:r>
+              <a:rPr lang="en-US" dirty="0"/>
+              <a:t>Allocate &amp; overwrite target</a:t>
+            </a:r>
+          </a:p>
+          <a:p>
+            <a:r>
+              <a:rPr lang="en-US" dirty="0"/>
+              <a:t>Hints: </a:t>
+            </a:r>
+          </a:p>
+          <a:p>
+            <a:pPr lvl="1"/>
+            <a:r>
+              <a:rPr lang="en-US" dirty="0"/>
+              <a:t>Remember that 0x20 of metadata</a:t>
+            </a:r>
+          </a:p>
+          <a:p>
+            <a:pPr lvl="1"/>
+            <a:r>
+              <a:rPr lang="en-US" dirty="0"/>
+              <a:t>Read through the source code to see what is going on</a:t>
+            </a:r>
+          </a:p>
+        </p:txBody>
+      </p:sp>
+    </p:spTree>
+    <p:extLst>
+      <p:ext uri="{BB962C8B-B14F-4D97-AF65-F5344CB8AC3E}">
+        <p14:creationId xmlns:p14="http://schemas.microsoft.com/office/powerpoint/2010/main" val="2527480506"/>
       </p:ext>
     </p:extLst>
   </p:cSld>
@@ -35924,7 +36073,7 @@
           <p:cNvPr id="2" name="Title 1">
             <a:extLst>
               <a:ext uri="{FF2B5EF4-FFF2-40B4-BE49-F238E27FC236}">
-                <a16:creationId xmlns:a16="http://schemas.microsoft.com/office/drawing/2014/main" id="{82DA7DEA-B481-9045-B5D4-BF35BBF2F0E2}"/>
+                <a16:creationId xmlns:a16="http://schemas.microsoft.com/office/drawing/2014/main" id="{F90744CA-AA12-694B-9EFD-DAE3C6B34B65}"/>
               </a:ext>
             </a:extLst>
           </p:cNvPr>
@@ -35935,114 +36084,55 @@
             <p:ph type="title"/>
           </p:nvPr>
         </p:nvSpPr>
-        <p:spPr/>
+        <p:spPr>
+          <a:xfrm>
+            <a:off x="628650" y="273847"/>
+            <a:ext cx="7886700" cy="994172"/>
+          </a:xfrm>
+        </p:spPr>
         <p:txBody>
-          <a:bodyPr/>
+          <a:bodyPr anchor="ctr">
+            <a:normAutofit/>
+          </a:bodyPr>
           <a:lstStyle/>
           <a:p>
             <a:r>
               <a:rPr lang="en-US" dirty="0"/>
-              <a:t>Challenge Time!</a:t>
+              <a:t>Flow of the Attack</a:t>
             </a:r>
           </a:p>
         </p:txBody>
       </p:sp>
-      <p:sp>
-        <p:nvSpPr>
-          <p:cNvPr id="3" name="Content Placeholder 2">
+      <p:graphicFrame>
+        <p:nvGraphicFramePr>
+          <p:cNvPr id="7" name="Content Placeholder 2">
             <a:extLst>
               <a:ext uri="{FF2B5EF4-FFF2-40B4-BE49-F238E27FC236}">
-                <a16:creationId xmlns:a16="http://schemas.microsoft.com/office/drawing/2014/main" id="{9B84729C-0F4E-C64D-A363-B1B7546CE7EE}"/>
+                <a16:creationId xmlns:a16="http://schemas.microsoft.com/office/drawing/2014/main" id="{16AFF43D-D95F-43D7-9B17-22E96F279462}"/>
               </a:ext>
             </a:extLst>
           </p:cNvPr>
-          <p:cNvSpPr>
-            <a:spLocks noGrp="1"/>
-          </p:cNvSpPr>
+          <p:cNvGraphicFramePr>
+            <a:graphicFrameLocks noGrp="1"/>
+          </p:cNvGraphicFramePr>
           <p:nvPr>
             <p:ph idx="1"/>
           </p:nvPr>
-        </p:nvSpPr>
-        <p:spPr/>
-        <p:txBody>
-          <a:bodyPr/>
-          <a:lstStyle/>
-          <a:p>
-            <a:r>
-              <a:rPr lang="en-US" dirty="0" err="1"/>
-              <a:t>house_of_force</a:t>
-            </a:r>
-            <a:r>
-              <a:rPr lang="en-US" dirty="0"/>
-              <a:t>/</a:t>
-            </a:r>
-            <a:r>
-              <a:rPr lang="en-US" dirty="0" err="1"/>
-              <a:t>shinning_moment</a:t>
-            </a:r>
-            <a:endParaRPr lang="en-US" dirty="0"/>
-          </a:p>
-          <a:p>
-            <a:r>
-              <a:rPr lang="en-US" dirty="0"/>
-              <a:t>Remember the three steps: </a:t>
-            </a:r>
-          </a:p>
-          <a:p>
-            <a:pPr lvl="1"/>
-            <a:r>
-              <a:rPr lang="en-US" dirty="0"/>
-              <a:t>Corrupt Top Chunk</a:t>
-            </a:r>
-          </a:p>
-          <a:p>
-            <a:pPr lvl="1"/>
-            <a:r>
-              <a:rPr lang="en-US" dirty="0"/>
-              <a:t>Allocate </a:t>
-            </a:r>
-            <a:r>
-              <a:rPr lang="en-US" i="1" dirty="0"/>
-              <a:t>close</a:t>
-            </a:r>
-            <a:r>
-              <a:rPr lang="en-US" dirty="0"/>
-              <a:t> to the target</a:t>
-            </a:r>
-          </a:p>
-          <a:p>
-            <a:pPr lvl="1"/>
-            <a:r>
-              <a:rPr lang="en-US" dirty="0"/>
-              <a:t>Allocate &amp; overwrite target</a:t>
-            </a:r>
-          </a:p>
-          <a:p>
-            <a:r>
-              <a:rPr lang="en-US" dirty="0"/>
-              <a:t>Hints: </a:t>
-            </a:r>
-          </a:p>
-          <a:p>
-            <a:pPr lvl="1"/>
-            <a:r>
-              <a:rPr lang="en-US" dirty="0"/>
-              <a:t> Remember that 0x20 of metadata</a:t>
-            </a:r>
-          </a:p>
-          <a:p>
-            <a:pPr lvl="1"/>
-            <a:r>
-              <a:rPr lang="en-US" dirty="0"/>
-              <a:t>Read through the source code to see what is going on</a:t>
-            </a:r>
-          </a:p>
-        </p:txBody>
-      </p:sp>
+        </p:nvGraphicFramePr>
+        <p:xfrm>
+          <a:off x="628650" y="1236541"/>
+          <a:ext cx="7886700" cy="3263504"/>
+        </p:xfrm>
+        <a:graphic>
+          <a:graphicData uri="http://schemas.openxmlformats.org/drawingml/2006/diagram">
+            <dgm:relIds xmlns:dgm="http://schemas.openxmlformats.org/drawingml/2006/diagram" xmlns:r="http://schemas.openxmlformats.org/officeDocument/2006/relationships" r:dm="rId2" r:lo="rId3" r:qs="rId4" r:cs="rId5"/>
+          </a:graphicData>
+        </a:graphic>
+      </p:graphicFrame>
     </p:spTree>
     <p:extLst>
       <p:ext uri="{BB962C8B-B14F-4D97-AF65-F5344CB8AC3E}">
-        <p14:creationId xmlns:p14="http://schemas.microsoft.com/office/powerpoint/2010/main" val="2527480506"/>
+        <p14:creationId xmlns:p14="http://schemas.microsoft.com/office/powerpoint/2010/main" val="2852268455"/>
       </p:ext>
     </p:extLst>
   </p:cSld>
@@ -36118,97 +36208,6 @@
           </p:cNvGraphicFramePr>
           <p:nvPr>
             <p:ph idx="1"/>
-          </p:nvPr>
-        </p:nvGraphicFramePr>
-        <p:xfrm>
-          <a:off x="628650" y="1236541"/>
-          <a:ext cx="7886700" cy="3263504"/>
-        </p:xfrm>
-        <a:graphic>
-          <a:graphicData uri="http://schemas.openxmlformats.org/drawingml/2006/diagram">
-            <dgm:relIds xmlns:dgm="http://schemas.openxmlformats.org/drawingml/2006/diagram" xmlns:r="http://schemas.openxmlformats.org/officeDocument/2006/relationships" r:dm="rId2" r:lo="rId3" r:qs="rId4" r:cs="rId5"/>
-          </a:graphicData>
-        </a:graphic>
-      </p:graphicFrame>
-    </p:spTree>
-    <p:extLst>
-      <p:ext uri="{BB962C8B-B14F-4D97-AF65-F5344CB8AC3E}">
-        <p14:creationId xmlns:p14="http://schemas.microsoft.com/office/powerpoint/2010/main" val="2852268455"/>
-      </p:ext>
-    </p:extLst>
-  </p:cSld>
-  <p:clrMapOvr>
-    <a:masterClrMapping/>
-  </p:clrMapOvr>
-</p:sld>
-</file>
-
-<file path=ppt/slides/slide32.xml><?xml version="1.0" encoding="utf-8"?>
-<p:sld xmlns:a="http://schemas.openxmlformats.org/drawingml/2006/main" xmlns:r="http://schemas.openxmlformats.org/officeDocument/2006/relationships" xmlns:p="http://schemas.openxmlformats.org/presentationml/2006/main">
-  <p:cSld>
-    <p:spTree>
-      <p:nvGrpSpPr>
-        <p:cNvPr id="1" name=""/>
-        <p:cNvGrpSpPr/>
-        <p:nvPr/>
-      </p:nvGrpSpPr>
-      <p:grpSpPr>
-        <a:xfrm>
-          <a:off x="0" y="0"/>
-          <a:ext cx="0" cy="0"/>
-          <a:chOff x="0" y="0"/>
-          <a:chExt cx="0" cy="0"/>
-        </a:xfrm>
-      </p:grpSpPr>
-      <p:sp>
-        <p:nvSpPr>
-          <p:cNvPr id="2" name="Title 1">
-            <a:extLst>
-              <a:ext uri="{FF2B5EF4-FFF2-40B4-BE49-F238E27FC236}">
-                <a16:creationId xmlns:a16="http://schemas.microsoft.com/office/drawing/2014/main" id="{F90744CA-AA12-694B-9EFD-DAE3C6B34B65}"/>
-              </a:ext>
-            </a:extLst>
-          </p:cNvPr>
-          <p:cNvSpPr>
-            <a:spLocks noGrp="1"/>
-          </p:cNvSpPr>
-          <p:nvPr>
-            <p:ph type="title"/>
-          </p:nvPr>
-        </p:nvSpPr>
-        <p:spPr>
-          <a:xfrm>
-            <a:off x="628650" y="273847"/>
-            <a:ext cx="7886700" cy="994172"/>
-          </a:xfrm>
-        </p:spPr>
-        <p:txBody>
-          <a:bodyPr anchor="ctr">
-            <a:normAutofit/>
-          </a:bodyPr>
-          <a:lstStyle/>
-          <a:p>
-            <a:r>
-              <a:rPr lang="en-US" dirty="0"/>
-              <a:t>Flow of the Attack</a:t>
-            </a:r>
-          </a:p>
-        </p:txBody>
-      </p:sp>
-      <p:graphicFrame>
-        <p:nvGraphicFramePr>
-          <p:cNvPr id="7" name="Content Placeholder 2">
-            <a:extLst>
-              <a:ext uri="{FF2B5EF4-FFF2-40B4-BE49-F238E27FC236}">
-                <a16:creationId xmlns:a16="http://schemas.microsoft.com/office/drawing/2014/main" id="{16AFF43D-D95F-43D7-9B17-22E96F279462}"/>
-              </a:ext>
-            </a:extLst>
-          </p:cNvPr>
-          <p:cNvGraphicFramePr>
-            <a:graphicFrameLocks noGrp="1"/>
-          </p:cNvGraphicFramePr>
-          <p:nvPr>
-            <p:ph idx="1"/>
             <p:extLst>
               <p:ext uri="{D42A27DB-BD31-4B8C-83A1-F6EECF244321}">
                 <p14:modId xmlns:p14="http://schemas.microsoft.com/office/powerpoint/2010/main" val="3693824306"/>
@@ -36239,7 +36238,7 @@
 </p:sld>
 </file>
 
-<file path=ppt/slides/slide33.xml><?xml version="1.0" encoding="utf-8"?>
+<file path=ppt/slides/slide32.xml><?xml version="1.0" encoding="utf-8"?>
 <p:sld xmlns:a="http://schemas.openxmlformats.org/drawingml/2006/main" xmlns:r="http://schemas.openxmlformats.org/officeDocument/2006/relationships" xmlns:p="http://schemas.openxmlformats.org/presentationml/2006/main">
   <p:cSld>
     <p:spTree>
@@ -36542,7 +36541,7 @@
 </p:sld>
 </file>
 
-<file path=ppt/slides/slide34.xml><?xml version="1.0" encoding="utf-8"?>
+<file path=ppt/slides/slide33.xml><?xml version="1.0" encoding="utf-8"?>
 <p:sld xmlns:a="http://schemas.openxmlformats.org/drawingml/2006/main" xmlns:r="http://schemas.openxmlformats.org/officeDocument/2006/relationships" xmlns:p="http://schemas.openxmlformats.org/presentationml/2006/main">
   <p:cSld>
     <p:spTree>
@@ -36848,7 +36847,7 @@
 </p:sld>
 </file>
 
-<file path=ppt/slides/slide35.xml><?xml version="1.0" encoding="utf-8"?>
+<file path=ppt/slides/slide34.xml><?xml version="1.0" encoding="utf-8"?>
 <p:sld xmlns:a="http://schemas.openxmlformats.org/drawingml/2006/main" xmlns:r="http://schemas.openxmlformats.org/officeDocument/2006/relationships" xmlns:p="http://schemas.openxmlformats.org/presentationml/2006/main">
   <p:cSld>
     <p:spTree>
@@ -37143,7 +37142,7 @@
 </p:sld>
 </file>
 
-<file path=ppt/slides/slide36.xml><?xml version="1.0" encoding="utf-8"?>
+<file path=ppt/slides/slide35.xml><?xml version="1.0" encoding="utf-8"?>
 <p:sld xmlns:a="http://schemas.openxmlformats.org/drawingml/2006/main" xmlns:r="http://schemas.openxmlformats.org/officeDocument/2006/relationships" xmlns:p="http://schemas.openxmlformats.org/presentationml/2006/main">
   <p:cSld>
     <p:spTree>
@@ -37280,7 +37279,7 @@
 </p:sld>
 </file>
 
-<file path=ppt/slides/slide37.xml><?xml version="1.0" encoding="utf-8"?>
+<file path=ppt/slides/slide36.xml><?xml version="1.0" encoding="utf-8"?>
 <p:sld xmlns:a="http://schemas.openxmlformats.org/drawingml/2006/main" xmlns:r="http://schemas.openxmlformats.org/officeDocument/2006/relationships" xmlns:p="http://schemas.openxmlformats.org/presentationml/2006/main">
   <p:cSld>
     <p:spTree>
@@ -37376,7 +37375,7 @@
 </p:sld>
 </file>
 
-<file path=ppt/slides/slide38.xml><?xml version="1.0" encoding="utf-8"?>
+<file path=ppt/slides/slide37.xml><?xml version="1.0" encoding="utf-8"?>
 <p:sld xmlns:a="http://schemas.openxmlformats.org/drawingml/2006/main" xmlns:r="http://schemas.openxmlformats.org/officeDocument/2006/relationships" xmlns:p="http://schemas.openxmlformats.org/presentationml/2006/main">
   <p:cSld>
     <p:spTree>
@@ -38093,7 +38092,7 @@
 </p:sld>
 </file>
 
-<file path=ppt/slides/slide39.xml><?xml version="1.0" encoding="utf-8"?>
+<file path=ppt/slides/slide38.xml><?xml version="1.0" encoding="utf-8"?>
 <p:sld xmlns:a="http://schemas.openxmlformats.org/drawingml/2006/main" xmlns:r="http://schemas.openxmlformats.org/officeDocument/2006/relationships" xmlns:p="http://schemas.openxmlformats.org/presentationml/2006/main">
   <p:cSld>
     <p:spTree>
@@ -38837,299 +38836,7 @@
 </p:sld>
 </file>
 
-<file path=ppt/slides/slide4.xml><?xml version="1.0" encoding="utf-8"?>
-<p:sld xmlns:a="http://schemas.openxmlformats.org/drawingml/2006/main" xmlns:r="http://schemas.openxmlformats.org/officeDocument/2006/relationships" xmlns:p="http://schemas.openxmlformats.org/presentationml/2006/main">
-  <p:cSld>
-    <p:spTree>
-      <p:nvGrpSpPr>
-        <p:cNvPr id="1" name=""/>
-        <p:cNvGrpSpPr/>
-        <p:nvPr/>
-      </p:nvGrpSpPr>
-      <p:grpSpPr>
-        <a:xfrm>
-          <a:off x="0" y="0"/>
-          <a:ext cx="0" cy="0"/>
-          <a:chOff x="0" y="0"/>
-          <a:chExt cx="0" cy="0"/>
-        </a:xfrm>
-      </p:grpSpPr>
-      <p:sp>
-        <p:nvSpPr>
-          <p:cNvPr id="2" name="Title 1">
-            <a:extLst>
-              <a:ext uri="{FF2B5EF4-FFF2-40B4-BE49-F238E27FC236}">
-                <a16:creationId xmlns:a16="http://schemas.microsoft.com/office/drawing/2014/main" id="{496A2660-C8FE-1445-B170-34232396C7B1}"/>
-              </a:ext>
-            </a:extLst>
-          </p:cNvPr>
-          <p:cNvSpPr>
-            <a:spLocks noGrp="1"/>
-          </p:cNvSpPr>
-          <p:nvPr>
-            <p:ph type="title"/>
-          </p:nvPr>
-        </p:nvSpPr>
-        <p:spPr/>
-        <p:txBody>
-          <a:bodyPr/>
-          <a:lstStyle/>
-          <a:p>
-            <a:r>
-              <a:rPr lang="en-US" dirty="0"/>
-              <a:t>Top Chunk - 2</a:t>
-            </a:r>
-          </a:p>
-        </p:txBody>
-      </p:sp>
-      <p:sp>
-        <p:nvSpPr>
-          <p:cNvPr id="3" name="Content Placeholder 2">
-            <a:extLst>
-              <a:ext uri="{FF2B5EF4-FFF2-40B4-BE49-F238E27FC236}">
-                <a16:creationId xmlns:a16="http://schemas.microsoft.com/office/drawing/2014/main" id="{19A651E9-27DF-FA46-9C12-B918D240929A}"/>
-              </a:ext>
-            </a:extLst>
-          </p:cNvPr>
-          <p:cNvSpPr>
-            <a:spLocks noGrp="1"/>
-          </p:cNvSpPr>
-          <p:nvPr>
-            <p:ph idx="1"/>
-          </p:nvPr>
-        </p:nvSpPr>
-        <p:spPr>
-          <a:xfrm>
-            <a:off x="628650" y="1236540"/>
-            <a:ext cx="4506620" cy="3814853"/>
-          </a:xfrm>
-        </p:spPr>
-        <p:txBody>
-          <a:bodyPr>
-            <a:normAutofit/>
-          </a:bodyPr>
-          <a:lstStyle/>
-          <a:p>
-            <a:r>
-              <a:rPr lang="en-US" dirty="0"/>
-              <a:t>Size: </a:t>
-            </a:r>
-          </a:p>
-          <a:p>
-            <a:pPr lvl="1"/>
-            <a:r>
-              <a:rPr lang="en-US" dirty="0"/>
-              <a:t>The remaining size from the original </a:t>
-            </a:r>
-            <a:r>
-              <a:rPr lang="en-US" i="1" dirty="0" err="1"/>
-              <a:t>sbrk</a:t>
-            </a:r>
-            <a:r>
-              <a:rPr lang="en-US" dirty="0"/>
-              <a:t> allocation</a:t>
-            </a:r>
-          </a:p>
-          <a:p>
-            <a:r>
-              <a:rPr lang="en-US" dirty="0" err="1"/>
-              <a:t>prev_inuse</a:t>
-            </a:r>
-            <a:r>
-              <a:rPr lang="en-US" dirty="0"/>
-              <a:t> is ALWAYS set</a:t>
-            </a:r>
-          </a:p>
-          <a:p>
-            <a:r>
-              <a:rPr lang="en-US" dirty="0"/>
-              <a:t>Unused fields: </a:t>
-            </a:r>
-          </a:p>
-          <a:p>
-            <a:pPr lvl="1"/>
-            <a:r>
-              <a:rPr lang="en-US" dirty="0"/>
-              <a:t>prev_size, fd and bk are NOT used on the top chunk</a:t>
-            </a:r>
-          </a:p>
-        </p:txBody>
-      </p:sp>
-      <p:pic>
-        <p:nvPicPr>
-          <p:cNvPr id="5" name="Picture 4" descr="Top Chunk">
-            <a:extLst>
-              <a:ext uri="{FF2B5EF4-FFF2-40B4-BE49-F238E27FC236}">
-                <a16:creationId xmlns:a16="http://schemas.microsoft.com/office/drawing/2014/main" id="{CEE51AF2-F9D0-8942-876F-E0AD7F4853B3}"/>
-              </a:ext>
-            </a:extLst>
-          </p:cNvPr>
-          <p:cNvPicPr>
-            <a:picLocks noChangeAspect="1"/>
-          </p:cNvPicPr>
-          <p:nvPr/>
-        </p:nvPicPr>
-        <p:blipFill>
-          <a:blip r:embed="rId2"/>
-          <a:stretch>
-            <a:fillRect/>
-          </a:stretch>
-        </p:blipFill>
-        <p:spPr>
-          <a:xfrm>
-            <a:off x="6222326" y="273847"/>
-            <a:ext cx="2655376" cy="4085193"/>
-          </a:xfrm>
-          <a:prstGeom prst="rect">
-            <a:avLst/>
-          </a:prstGeom>
-        </p:spPr>
-      </p:pic>
-      <p:cxnSp>
-        <p:nvCxnSpPr>
-          <p:cNvPr id="6" name="Straight Arrow Connector 5">
-            <a:extLst>
-              <a:ext uri="{FF2B5EF4-FFF2-40B4-BE49-F238E27FC236}">
-                <a16:creationId xmlns:a16="http://schemas.microsoft.com/office/drawing/2014/main" id="{8DA1D707-D95D-5141-9BAC-9B2EC095D01E}"/>
-              </a:ext>
-            </a:extLst>
-          </p:cNvPr>
-          <p:cNvCxnSpPr>
-            <a:cxnSpLocks/>
-          </p:cNvCxnSpPr>
-          <p:nvPr/>
-        </p:nvCxnSpPr>
-        <p:spPr>
-          <a:xfrm>
-            <a:off x="5449662" y="1387088"/>
-            <a:ext cx="719601" cy="0"/>
-          </a:xfrm>
-          <a:prstGeom prst="straightConnector1">
-            <a:avLst/>
-          </a:prstGeom>
-          <a:ln w="57150">
-            <a:solidFill>
-              <a:srgbClr val="FF0000"/>
-            </a:solidFill>
-            <a:tailEnd type="triangle"/>
-          </a:ln>
-        </p:spPr>
-        <p:style>
-          <a:lnRef idx="1">
-            <a:schemeClr val="accent1"/>
-          </a:lnRef>
-          <a:fillRef idx="0">
-            <a:schemeClr val="accent1"/>
-          </a:fillRef>
-          <a:effectRef idx="0">
-            <a:schemeClr val="accent1"/>
-          </a:effectRef>
-          <a:fontRef idx="minor">
-            <a:schemeClr val="tx1"/>
-          </a:fontRef>
-        </p:style>
-      </p:cxnSp>
-      <p:cxnSp>
-        <p:nvCxnSpPr>
-          <p:cNvPr id="7" name="Straight Connector 6">
-            <a:extLst>
-              <a:ext uri="{FF2B5EF4-FFF2-40B4-BE49-F238E27FC236}">
-                <a16:creationId xmlns:a16="http://schemas.microsoft.com/office/drawing/2014/main" id="{825AABEF-A152-B94A-993C-C49238F2EC7A}"/>
-              </a:ext>
-            </a:extLst>
-          </p:cNvPr>
-          <p:cNvCxnSpPr>
-            <a:cxnSpLocks/>
-          </p:cNvCxnSpPr>
-          <p:nvPr/>
-        </p:nvCxnSpPr>
-        <p:spPr>
-          <a:xfrm>
-            <a:off x="5477166" y="1387088"/>
-            <a:ext cx="17905" cy="2244135"/>
-          </a:xfrm>
-          <a:prstGeom prst="line">
-            <a:avLst/>
-          </a:prstGeom>
-          <a:ln w="47625">
-            <a:solidFill>
-              <a:srgbClr val="FF0000"/>
-            </a:solidFill>
-          </a:ln>
-        </p:spPr>
-        <p:style>
-          <a:lnRef idx="1">
-            <a:schemeClr val="accent1"/>
-          </a:lnRef>
-          <a:fillRef idx="0">
-            <a:schemeClr val="accent1"/>
-          </a:fillRef>
-          <a:effectRef idx="0">
-            <a:schemeClr val="accent1"/>
-          </a:effectRef>
-          <a:fontRef idx="minor">
-            <a:schemeClr val="tx1"/>
-          </a:fontRef>
-        </p:style>
-      </p:cxnSp>
-      <p:cxnSp>
-        <p:nvCxnSpPr>
-          <p:cNvPr id="8" name="Straight Arrow Connector 7">
-            <a:extLst>
-              <a:ext uri="{FF2B5EF4-FFF2-40B4-BE49-F238E27FC236}">
-                <a16:creationId xmlns:a16="http://schemas.microsoft.com/office/drawing/2014/main" id="{11D7D034-34AC-F041-A6F7-141B41F57537}"/>
-              </a:ext>
-            </a:extLst>
-          </p:cNvPr>
-          <p:cNvCxnSpPr>
-            <a:cxnSpLocks/>
-          </p:cNvCxnSpPr>
-          <p:nvPr/>
-        </p:nvCxnSpPr>
-        <p:spPr>
-          <a:xfrm>
-            <a:off x="5495071" y="3631223"/>
-            <a:ext cx="719601" cy="0"/>
-          </a:xfrm>
-          <a:prstGeom prst="straightConnector1">
-            <a:avLst/>
-          </a:prstGeom>
-          <a:ln w="57150">
-            <a:solidFill>
-              <a:srgbClr val="FF0000"/>
-            </a:solidFill>
-            <a:tailEnd type="triangle"/>
-          </a:ln>
-        </p:spPr>
-        <p:style>
-          <a:lnRef idx="1">
-            <a:schemeClr val="accent1"/>
-          </a:lnRef>
-          <a:fillRef idx="0">
-            <a:schemeClr val="accent1"/>
-          </a:fillRef>
-          <a:effectRef idx="0">
-            <a:schemeClr val="accent1"/>
-          </a:effectRef>
-          <a:fontRef idx="minor">
-            <a:schemeClr val="tx1"/>
-          </a:fontRef>
-        </p:style>
-      </p:cxnSp>
-    </p:spTree>
-    <p:extLst>
-      <p:ext uri="{BB962C8B-B14F-4D97-AF65-F5344CB8AC3E}">
-        <p14:creationId xmlns:p14="http://schemas.microsoft.com/office/powerpoint/2010/main" val="4193465238"/>
-      </p:ext>
-    </p:extLst>
-  </p:cSld>
-  <p:clrMapOvr>
-    <a:masterClrMapping/>
-  </p:clrMapOvr>
-</p:sld>
-</file>
-
-<file path=ppt/slides/slide40.xml><?xml version="1.0" encoding="utf-8"?>
+<file path=ppt/slides/slide39.xml><?xml version="1.0" encoding="utf-8"?>
 <p:sld xmlns:a="http://schemas.openxmlformats.org/drawingml/2006/main" xmlns:r="http://schemas.openxmlformats.org/officeDocument/2006/relationships" xmlns:p="http://schemas.openxmlformats.org/presentationml/2006/main">
   <p:cSld>
     <p:spTree>
@@ -40036,7 +39743,299 @@
 </p:sld>
 </file>
 
-<file path=ppt/slides/slide41.xml><?xml version="1.0" encoding="utf-8"?>
+<file path=ppt/slides/slide4.xml><?xml version="1.0" encoding="utf-8"?>
+<p:sld xmlns:a="http://schemas.openxmlformats.org/drawingml/2006/main" xmlns:r="http://schemas.openxmlformats.org/officeDocument/2006/relationships" xmlns:p="http://schemas.openxmlformats.org/presentationml/2006/main">
+  <p:cSld>
+    <p:spTree>
+      <p:nvGrpSpPr>
+        <p:cNvPr id="1" name=""/>
+        <p:cNvGrpSpPr/>
+        <p:nvPr/>
+      </p:nvGrpSpPr>
+      <p:grpSpPr>
+        <a:xfrm>
+          <a:off x="0" y="0"/>
+          <a:ext cx="0" cy="0"/>
+          <a:chOff x="0" y="0"/>
+          <a:chExt cx="0" cy="0"/>
+        </a:xfrm>
+      </p:grpSpPr>
+      <p:sp>
+        <p:nvSpPr>
+          <p:cNvPr id="2" name="Title 1">
+            <a:extLst>
+              <a:ext uri="{FF2B5EF4-FFF2-40B4-BE49-F238E27FC236}">
+                <a16:creationId xmlns:a16="http://schemas.microsoft.com/office/drawing/2014/main" id="{496A2660-C8FE-1445-B170-34232396C7B1}"/>
+              </a:ext>
+            </a:extLst>
+          </p:cNvPr>
+          <p:cNvSpPr>
+            <a:spLocks noGrp="1"/>
+          </p:cNvSpPr>
+          <p:nvPr>
+            <p:ph type="title"/>
+          </p:nvPr>
+        </p:nvSpPr>
+        <p:spPr/>
+        <p:txBody>
+          <a:bodyPr/>
+          <a:lstStyle/>
+          <a:p>
+            <a:r>
+              <a:rPr lang="en-US" dirty="0"/>
+              <a:t>Top Chunk - 2</a:t>
+            </a:r>
+          </a:p>
+        </p:txBody>
+      </p:sp>
+      <p:sp>
+        <p:nvSpPr>
+          <p:cNvPr id="3" name="Content Placeholder 2">
+            <a:extLst>
+              <a:ext uri="{FF2B5EF4-FFF2-40B4-BE49-F238E27FC236}">
+                <a16:creationId xmlns:a16="http://schemas.microsoft.com/office/drawing/2014/main" id="{19A651E9-27DF-FA46-9C12-B918D240929A}"/>
+              </a:ext>
+            </a:extLst>
+          </p:cNvPr>
+          <p:cNvSpPr>
+            <a:spLocks noGrp="1"/>
+          </p:cNvSpPr>
+          <p:nvPr>
+            <p:ph idx="1"/>
+          </p:nvPr>
+        </p:nvSpPr>
+        <p:spPr>
+          <a:xfrm>
+            <a:off x="628650" y="1236540"/>
+            <a:ext cx="4506620" cy="3814853"/>
+          </a:xfrm>
+        </p:spPr>
+        <p:txBody>
+          <a:bodyPr>
+            <a:normAutofit/>
+          </a:bodyPr>
+          <a:lstStyle/>
+          <a:p>
+            <a:r>
+              <a:rPr lang="en-US" dirty="0"/>
+              <a:t>Size: </a:t>
+            </a:r>
+          </a:p>
+          <a:p>
+            <a:pPr lvl="1"/>
+            <a:r>
+              <a:rPr lang="en-US" dirty="0"/>
+              <a:t>The remaining size from the original </a:t>
+            </a:r>
+            <a:r>
+              <a:rPr lang="en-US" i="1" dirty="0" err="1"/>
+              <a:t>sbrk</a:t>
+            </a:r>
+            <a:r>
+              <a:rPr lang="en-US" dirty="0"/>
+              <a:t> allocation</a:t>
+            </a:r>
+          </a:p>
+          <a:p>
+            <a:r>
+              <a:rPr lang="en-US" dirty="0" err="1"/>
+              <a:t>prev_inuse</a:t>
+            </a:r>
+            <a:r>
+              <a:rPr lang="en-US" dirty="0"/>
+              <a:t> is ALWAYS set</a:t>
+            </a:r>
+          </a:p>
+          <a:p>
+            <a:r>
+              <a:rPr lang="en-US" dirty="0"/>
+              <a:t>Unused fields: </a:t>
+            </a:r>
+          </a:p>
+          <a:p>
+            <a:pPr lvl="1"/>
+            <a:r>
+              <a:rPr lang="en-US" dirty="0"/>
+              <a:t>prev_size, fd and bk are NOT used on the top chunk</a:t>
+            </a:r>
+          </a:p>
+        </p:txBody>
+      </p:sp>
+      <p:pic>
+        <p:nvPicPr>
+          <p:cNvPr id="5" name="Picture 4" descr="Top Chunk">
+            <a:extLst>
+              <a:ext uri="{FF2B5EF4-FFF2-40B4-BE49-F238E27FC236}">
+                <a16:creationId xmlns:a16="http://schemas.microsoft.com/office/drawing/2014/main" id="{CEE51AF2-F9D0-8942-876F-E0AD7F4853B3}"/>
+              </a:ext>
+            </a:extLst>
+          </p:cNvPr>
+          <p:cNvPicPr>
+            <a:picLocks noChangeAspect="1"/>
+          </p:cNvPicPr>
+          <p:nvPr/>
+        </p:nvPicPr>
+        <p:blipFill>
+          <a:blip r:embed="rId2"/>
+          <a:stretch>
+            <a:fillRect/>
+          </a:stretch>
+        </p:blipFill>
+        <p:spPr>
+          <a:xfrm>
+            <a:off x="6222326" y="273847"/>
+            <a:ext cx="2655376" cy="4085193"/>
+          </a:xfrm>
+          <a:prstGeom prst="rect">
+            <a:avLst/>
+          </a:prstGeom>
+        </p:spPr>
+      </p:pic>
+      <p:cxnSp>
+        <p:nvCxnSpPr>
+          <p:cNvPr id="6" name="Straight Arrow Connector 5">
+            <a:extLst>
+              <a:ext uri="{FF2B5EF4-FFF2-40B4-BE49-F238E27FC236}">
+                <a16:creationId xmlns:a16="http://schemas.microsoft.com/office/drawing/2014/main" id="{8DA1D707-D95D-5141-9BAC-9B2EC095D01E}"/>
+              </a:ext>
+            </a:extLst>
+          </p:cNvPr>
+          <p:cNvCxnSpPr>
+            <a:cxnSpLocks/>
+          </p:cNvCxnSpPr>
+          <p:nvPr/>
+        </p:nvCxnSpPr>
+        <p:spPr>
+          <a:xfrm>
+            <a:off x="5449662" y="1387088"/>
+            <a:ext cx="719601" cy="0"/>
+          </a:xfrm>
+          <a:prstGeom prst="straightConnector1">
+            <a:avLst/>
+          </a:prstGeom>
+          <a:ln w="57150">
+            <a:solidFill>
+              <a:srgbClr val="FF0000"/>
+            </a:solidFill>
+            <a:tailEnd type="triangle"/>
+          </a:ln>
+        </p:spPr>
+        <p:style>
+          <a:lnRef idx="1">
+            <a:schemeClr val="accent1"/>
+          </a:lnRef>
+          <a:fillRef idx="0">
+            <a:schemeClr val="accent1"/>
+          </a:fillRef>
+          <a:effectRef idx="0">
+            <a:schemeClr val="accent1"/>
+          </a:effectRef>
+          <a:fontRef idx="minor">
+            <a:schemeClr val="tx1"/>
+          </a:fontRef>
+        </p:style>
+      </p:cxnSp>
+      <p:cxnSp>
+        <p:nvCxnSpPr>
+          <p:cNvPr id="7" name="Straight Connector 6">
+            <a:extLst>
+              <a:ext uri="{FF2B5EF4-FFF2-40B4-BE49-F238E27FC236}">
+                <a16:creationId xmlns:a16="http://schemas.microsoft.com/office/drawing/2014/main" id="{825AABEF-A152-B94A-993C-C49238F2EC7A}"/>
+              </a:ext>
+            </a:extLst>
+          </p:cNvPr>
+          <p:cNvCxnSpPr>
+            <a:cxnSpLocks/>
+          </p:cNvCxnSpPr>
+          <p:nvPr/>
+        </p:nvCxnSpPr>
+        <p:spPr>
+          <a:xfrm>
+            <a:off x="5477166" y="1387088"/>
+            <a:ext cx="17905" cy="2244135"/>
+          </a:xfrm>
+          <a:prstGeom prst="line">
+            <a:avLst/>
+          </a:prstGeom>
+          <a:ln w="47625">
+            <a:solidFill>
+              <a:srgbClr val="FF0000"/>
+            </a:solidFill>
+          </a:ln>
+        </p:spPr>
+        <p:style>
+          <a:lnRef idx="1">
+            <a:schemeClr val="accent1"/>
+          </a:lnRef>
+          <a:fillRef idx="0">
+            <a:schemeClr val="accent1"/>
+          </a:fillRef>
+          <a:effectRef idx="0">
+            <a:schemeClr val="accent1"/>
+          </a:effectRef>
+          <a:fontRef idx="minor">
+            <a:schemeClr val="tx1"/>
+          </a:fontRef>
+        </p:style>
+      </p:cxnSp>
+      <p:cxnSp>
+        <p:nvCxnSpPr>
+          <p:cNvPr id="8" name="Straight Arrow Connector 7">
+            <a:extLst>
+              <a:ext uri="{FF2B5EF4-FFF2-40B4-BE49-F238E27FC236}">
+                <a16:creationId xmlns:a16="http://schemas.microsoft.com/office/drawing/2014/main" id="{11D7D034-34AC-F041-A6F7-141B41F57537}"/>
+              </a:ext>
+            </a:extLst>
+          </p:cNvPr>
+          <p:cNvCxnSpPr>
+            <a:cxnSpLocks/>
+          </p:cNvCxnSpPr>
+          <p:nvPr/>
+        </p:nvCxnSpPr>
+        <p:spPr>
+          <a:xfrm>
+            <a:off x="5495071" y="3631223"/>
+            <a:ext cx="719601" cy="0"/>
+          </a:xfrm>
+          <a:prstGeom prst="straightConnector1">
+            <a:avLst/>
+          </a:prstGeom>
+          <a:ln w="57150">
+            <a:solidFill>
+              <a:srgbClr val="FF0000"/>
+            </a:solidFill>
+            <a:tailEnd type="triangle"/>
+          </a:ln>
+        </p:spPr>
+        <p:style>
+          <a:lnRef idx="1">
+            <a:schemeClr val="accent1"/>
+          </a:lnRef>
+          <a:fillRef idx="0">
+            <a:schemeClr val="accent1"/>
+          </a:fillRef>
+          <a:effectRef idx="0">
+            <a:schemeClr val="accent1"/>
+          </a:effectRef>
+          <a:fontRef idx="minor">
+            <a:schemeClr val="tx1"/>
+          </a:fontRef>
+        </p:style>
+      </p:cxnSp>
+    </p:spTree>
+    <p:extLst>
+      <p:ext uri="{BB962C8B-B14F-4D97-AF65-F5344CB8AC3E}">
+        <p14:creationId xmlns:p14="http://schemas.microsoft.com/office/powerpoint/2010/main" val="4193465238"/>
+      </p:ext>
+    </p:extLst>
+  </p:cSld>
+  <p:clrMapOvr>
+    <a:masterClrMapping/>
+  </p:clrMapOvr>
+</p:sld>
+</file>
+
+<file path=ppt/slides/slide40.xml><?xml version="1.0" encoding="utf-8"?>
 <p:sld xmlns:a="http://schemas.openxmlformats.org/drawingml/2006/main" xmlns:r="http://schemas.openxmlformats.org/officeDocument/2006/relationships" xmlns:p="http://schemas.openxmlformats.org/presentationml/2006/main">
   <p:cSld>
     <p:spTree>
@@ -40747,7 +40746,7 @@
 </p:sld>
 </file>
 
-<file path=ppt/slides/slide42.xml><?xml version="1.0" encoding="utf-8"?>
+<file path=ppt/slides/slide41.xml><?xml version="1.0" encoding="utf-8"?>
 <p:sld xmlns:a="http://schemas.openxmlformats.org/drawingml/2006/main" xmlns:r="http://schemas.openxmlformats.org/officeDocument/2006/relationships" xmlns:p="http://schemas.openxmlformats.org/presentationml/2006/main">
   <p:cSld>
     <p:spTree>
@@ -40786,7 +40785,7 @@
         </p:blipFill>
         <p:spPr>
           <a:xfrm>
-            <a:off x="5527997" y="1878809"/>
+            <a:off x="6764265" y="1878810"/>
             <a:ext cx="2089709" cy="2763441"/>
           </a:xfrm>
           <a:prstGeom prst="rect">
@@ -40811,7 +40810,7 @@
         </p:nvSpPr>
         <p:spPr>
           <a:xfrm>
-            <a:off x="4299437" y="4203963"/>
+            <a:off x="5535705" y="4203964"/>
             <a:ext cx="1228559" cy="438287"/>
           </a:xfrm>
           <a:prstGeom prst="rect">
@@ -41005,7 +41004,7 @@
         </p:nvSpPr>
         <p:spPr>
           <a:xfrm>
-            <a:off x="4763299" y="4238440"/>
+            <a:off x="5999567" y="4238441"/>
             <a:ext cx="764697" cy="369332"/>
           </a:xfrm>
           <a:prstGeom prst="rect">
@@ -41044,7 +41043,7 @@
         </p:nvSpPr>
         <p:spPr>
           <a:xfrm>
-            <a:off x="4498182" y="1878808"/>
+            <a:off x="5734450" y="1878809"/>
             <a:ext cx="1140377" cy="369332"/>
           </a:xfrm>
           <a:prstGeom prst="rect">
@@ -41282,7 +41281,7 @@
         <p:spPr>
           <a:xfrm>
             <a:off x="629841" y="1063869"/>
-            <a:ext cx="4525633" cy="3455377"/>
+            <a:ext cx="5099428" cy="3455377"/>
           </a:xfrm>
           <a:prstGeom prst="rect">
             <a:avLst/>
@@ -41484,7 +41483,15 @@
           <a:p>
             <a:r>
               <a:rPr lang="en-US" dirty="0"/>
-              <a:t>Size = target – top chunk</a:t>
+              <a:t>Size = __</a:t>
+            </a:r>
+            <a:r>
+              <a:rPr lang="en-US" dirty="0" err="1"/>
+              <a:t>malloc_hook</a:t>
+            </a:r>
+            <a:r>
+              <a:rPr lang="en-US" dirty="0"/>
+              <a:t> – top chunk</a:t>
             </a:r>
           </a:p>
         </p:txBody>
@@ -41540,7 +41547,7 @@
         </p:nvCxnSpPr>
         <p:spPr>
           <a:xfrm>
-            <a:off x="4499478" y="1907111"/>
+            <a:off x="5735746" y="1907112"/>
             <a:ext cx="719601" cy="0"/>
           </a:xfrm>
           <a:prstGeom prst="straightConnector1">
@@ -41584,7 +41591,7 @@
         </p:nvCxnSpPr>
         <p:spPr>
           <a:xfrm flipH="1">
-            <a:off x="4498182" y="1878807"/>
+            <a:off x="5734450" y="1878808"/>
             <a:ext cx="2590" cy="2720309"/>
           </a:xfrm>
           <a:prstGeom prst="line">
@@ -41627,7 +41634,7 @@
         </p:nvCxnSpPr>
         <p:spPr>
           <a:xfrm>
-            <a:off x="4498182" y="4599116"/>
+            <a:off x="5734450" y="4599117"/>
             <a:ext cx="719601" cy="0"/>
           </a:xfrm>
           <a:prstGeom prst="straightConnector1">
@@ -41668,7 +41675,7 @@
 </p:sld>
 </file>
 
-<file path=ppt/slides/slide43.xml><?xml version="1.0" encoding="utf-8"?>
+<file path=ppt/slides/slide42.xml><?xml version="1.0" encoding="utf-8"?>
 <p:sld xmlns:a="http://schemas.openxmlformats.org/drawingml/2006/main" xmlns:r="http://schemas.openxmlformats.org/officeDocument/2006/relationships" xmlns:p="http://schemas.openxmlformats.org/presentationml/2006/main">
   <p:cSld>
     <p:spTree>
@@ -42529,7 +42536,7 @@
 </p:sld>
 </file>
 
-<file path=ppt/slides/slide44.xml><?xml version="1.0" encoding="utf-8"?>
+<file path=ppt/slides/slide43.xml><?xml version="1.0" encoding="utf-8"?>
 <p:sld xmlns:a="http://schemas.openxmlformats.org/drawingml/2006/main" xmlns:r="http://schemas.openxmlformats.org/officeDocument/2006/relationships" xmlns:p="http://schemas.openxmlformats.org/presentationml/2006/main">
   <p:cSld>
     <p:spTree>
@@ -42890,7 +42897,7 @@
 </p:sld>
 </file>
 
-<file path=ppt/slides/slide45.xml><?xml version="1.0" encoding="utf-8"?>
+<file path=ppt/slides/slide44.xml><?xml version="1.0" encoding="utf-8"?>
 <p:sld xmlns:a="http://schemas.openxmlformats.org/drawingml/2006/main" xmlns:r="http://schemas.openxmlformats.org/officeDocument/2006/relationships" xmlns:p="http://schemas.openxmlformats.org/presentationml/2006/main">
   <p:cSld>
     <p:spTree>
@@ -43055,7 +43062,7 @@
 </p:sld>
 </file>
 
-<file path=ppt/slides/slide46.xml><?xml version="1.0" encoding="utf-8"?>
+<file path=ppt/slides/slide45.xml><?xml version="1.0" encoding="utf-8"?>
 <p:sld xmlns:a="http://schemas.openxmlformats.org/drawingml/2006/main" xmlns:r="http://schemas.openxmlformats.org/officeDocument/2006/relationships" xmlns:p="http://schemas.openxmlformats.org/presentationml/2006/main">
   <p:cSld>
     <p:spTree>
@@ -43142,6 +43149,102 @@
     <p:extLst>
       <p:ext uri="{BB962C8B-B14F-4D97-AF65-F5344CB8AC3E}">
         <p14:creationId xmlns:p14="http://schemas.microsoft.com/office/powerpoint/2010/main" val="3595735604"/>
+      </p:ext>
+    </p:extLst>
+  </p:cSld>
+  <p:clrMapOvr>
+    <a:masterClrMapping/>
+  </p:clrMapOvr>
+</p:sld>
+</file>
+
+<file path=ppt/slides/slide46.xml><?xml version="1.0" encoding="utf-8"?>
+<p:sld xmlns:a="http://schemas.openxmlformats.org/drawingml/2006/main" xmlns:r="http://schemas.openxmlformats.org/officeDocument/2006/relationships" xmlns:p="http://schemas.openxmlformats.org/presentationml/2006/main">
+  <p:cSld>
+    <p:spTree>
+      <p:nvGrpSpPr>
+        <p:cNvPr id="1" name=""/>
+        <p:cNvGrpSpPr/>
+        <p:nvPr/>
+      </p:nvGrpSpPr>
+      <p:grpSpPr>
+        <a:xfrm>
+          <a:off x="0" y="0"/>
+          <a:ext cx="0" cy="0"/>
+          <a:chOff x="0" y="0"/>
+          <a:chExt cx="0" cy="0"/>
+        </a:xfrm>
+      </p:grpSpPr>
+      <p:sp>
+        <p:nvSpPr>
+          <p:cNvPr id="2" name="Title 1">
+            <a:extLst>
+              <a:ext uri="{FF2B5EF4-FFF2-40B4-BE49-F238E27FC236}">
+                <a16:creationId xmlns:a16="http://schemas.microsoft.com/office/drawing/2014/main" id="{F90744CA-AA12-694B-9EFD-DAE3C6B34B65}"/>
+              </a:ext>
+            </a:extLst>
+          </p:cNvPr>
+          <p:cNvSpPr>
+            <a:spLocks noGrp="1"/>
+          </p:cNvSpPr>
+          <p:nvPr>
+            <p:ph type="title"/>
+          </p:nvPr>
+        </p:nvSpPr>
+        <p:spPr>
+          <a:xfrm>
+            <a:off x="628650" y="273847"/>
+            <a:ext cx="7886700" cy="994172"/>
+          </a:xfrm>
+        </p:spPr>
+        <p:txBody>
+          <a:bodyPr anchor="ctr">
+            <a:normAutofit/>
+          </a:bodyPr>
+          <a:lstStyle/>
+          <a:p>
+            <a:r>
+              <a:rPr lang="en-US" dirty="0"/>
+              <a:t>Flow of the Attack</a:t>
+            </a:r>
+          </a:p>
+        </p:txBody>
+      </p:sp>
+      <p:graphicFrame>
+        <p:nvGraphicFramePr>
+          <p:cNvPr id="7" name="Content Placeholder 2">
+            <a:extLst>
+              <a:ext uri="{FF2B5EF4-FFF2-40B4-BE49-F238E27FC236}">
+                <a16:creationId xmlns:a16="http://schemas.microsoft.com/office/drawing/2014/main" id="{16AFF43D-D95F-43D7-9B17-22E96F279462}"/>
+              </a:ext>
+            </a:extLst>
+          </p:cNvPr>
+          <p:cNvGraphicFramePr>
+            <a:graphicFrameLocks noGrp="1"/>
+          </p:cNvGraphicFramePr>
+          <p:nvPr>
+            <p:ph idx="1"/>
+            <p:extLst>
+              <p:ext uri="{D42A27DB-BD31-4B8C-83A1-F6EECF244321}">
+                <p14:modId xmlns:p14="http://schemas.microsoft.com/office/powerpoint/2010/main" val="2551833715"/>
+              </p:ext>
+            </p:extLst>
+          </p:nvPr>
+        </p:nvGraphicFramePr>
+        <p:xfrm>
+          <a:off x="628650" y="1236541"/>
+          <a:ext cx="7886700" cy="3263504"/>
+        </p:xfrm>
+        <a:graphic>
+          <a:graphicData uri="http://schemas.openxmlformats.org/drawingml/2006/diagram">
+            <dgm:relIds xmlns:dgm="http://schemas.openxmlformats.org/drawingml/2006/diagram" xmlns:r="http://schemas.openxmlformats.org/officeDocument/2006/relationships" r:dm="rId2" r:lo="rId3" r:qs="rId4" r:cs="rId5"/>
+          </a:graphicData>
+        </a:graphic>
+      </p:graphicFrame>
+    </p:spTree>
+    <p:extLst>
+      <p:ext uri="{BB962C8B-B14F-4D97-AF65-F5344CB8AC3E}">
+        <p14:creationId xmlns:p14="http://schemas.microsoft.com/office/powerpoint/2010/main" val="2426609233"/>
       </p:ext>
     </p:extLst>
   </p:cSld>
@@ -43219,14 +43322,14 @@
             <p:ph idx="1"/>
             <p:extLst>
               <p:ext uri="{D42A27DB-BD31-4B8C-83A1-F6EECF244321}">
-                <p14:modId xmlns:p14="http://schemas.microsoft.com/office/powerpoint/2010/main" val="2551833715"/>
+                <p14:modId xmlns:p14="http://schemas.microsoft.com/office/powerpoint/2010/main" val="225848377"/>
               </p:ext>
             </p:extLst>
           </p:nvPr>
         </p:nvGraphicFramePr>
         <p:xfrm>
           <a:off x="628650" y="1236541"/>
-          <a:ext cx="7886700" cy="3263504"/>
+          <a:ext cx="7886700" cy="1637288"/>
         </p:xfrm>
         <a:graphic>
           <a:graphicData uri="http://schemas.openxmlformats.org/drawingml/2006/diagram">
@@ -43237,7 +43340,7 @@
     </p:spTree>
     <p:extLst>
       <p:ext uri="{BB962C8B-B14F-4D97-AF65-F5344CB8AC3E}">
-        <p14:creationId xmlns:p14="http://schemas.microsoft.com/office/powerpoint/2010/main" val="2426609233"/>
+        <p14:creationId xmlns:p14="http://schemas.microsoft.com/office/powerpoint/2010/main" val="1539991312"/>
       </p:ext>
     </p:extLst>
   </p:cSld>
@@ -43269,7 +43372,7 @@
           <p:cNvPr id="2" name="Title 1">
             <a:extLst>
               <a:ext uri="{FF2B5EF4-FFF2-40B4-BE49-F238E27FC236}">
-                <a16:creationId xmlns:a16="http://schemas.microsoft.com/office/drawing/2014/main" id="{F90744CA-AA12-694B-9EFD-DAE3C6B34B65}"/>
+                <a16:creationId xmlns:a16="http://schemas.microsoft.com/office/drawing/2014/main" id="{A10A7709-FD6C-B04E-8F0B-FE511A82C787}"/>
               </a:ext>
             </a:extLst>
           </p:cNvPr>
@@ -43294,46 +43397,99 @@
           <a:p>
             <a:r>
               <a:rPr lang="en-US" dirty="0"/>
-              <a:t>Flow of the Attack</a:t>
+              <a:t>Overlap Chunk Over Target </a:t>
             </a:r>
           </a:p>
         </p:txBody>
       </p:sp>
-      <p:graphicFrame>
-        <p:nvGraphicFramePr>
-          <p:cNvPr id="7" name="Content Placeholder 2">
+      <p:sp>
+        <p:nvSpPr>
+          <p:cNvPr id="14" name="Content Placeholder 2">
             <a:extLst>
               <a:ext uri="{FF2B5EF4-FFF2-40B4-BE49-F238E27FC236}">
-                <a16:creationId xmlns:a16="http://schemas.microsoft.com/office/drawing/2014/main" id="{16AFF43D-D95F-43D7-9B17-22E96F279462}"/>
+                <a16:creationId xmlns:a16="http://schemas.microsoft.com/office/drawing/2014/main" id="{A25A42B0-2650-4A72-B532-FA1013885883}"/>
               </a:ext>
             </a:extLst>
           </p:cNvPr>
-          <p:cNvGraphicFramePr>
-            <a:graphicFrameLocks noGrp="1"/>
-          </p:cNvGraphicFramePr>
+          <p:cNvSpPr>
+            <a:spLocks noGrp="1"/>
+          </p:cNvSpPr>
           <p:nvPr>
-            <p:ph idx="1"/>
-            <p:extLst>
-              <p:ext uri="{D42A27DB-BD31-4B8C-83A1-F6EECF244321}">
-                <p14:modId xmlns:p14="http://schemas.microsoft.com/office/powerpoint/2010/main" val="225848377"/>
-              </p:ext>
-            </p:extLst>
+            <p:ph sz="half" idx="1"/>
           </p:nvPr>
-        </p:nvGraphicFramePr>
-        <p:xfrm>
-          <a:off x="628650" y="1236541"/>
-          <a:ext cx="7886700" cy="1637288"/>
-        </p:xfrm>
-        <a:graphic>
-          <a:graphicData uri="http://schemas.openxmlformats.org/drawingml/2006/diagram">
-            <dgm:relIds xmlns:dgm="http://schemas.openxmlformats.org/drawingml/2006/diagram" xmlns:r="http://schemas.openxmlformats.org/officeDocument/2006/relationships" r:dm="rId2" r:lo="rId3" r:qs="rId4" r:cs="rId5"/>
-          </a:graphicData>
-        </a:graphic>
-      </p:graphicFrame>
+        </p:nvSpPr>
+        <p:spPr>
+          <a:xfrm>
+            <a:off x="628650" y="1369219"/>
+            <a:ext cx="4648744" cy="3263504"/>
+          </a:xfrm>
+        </p:spPr>
+        <p:txBody>
+          <a:bodyPr>
+            <a:normAutofit/>
+          </a:bodyPr>
+          <a:lstStyle/>
+          <a:p>
+            <a:r>
+              <a:rPr lang="en-US" dirty="0"/>
+              <a:t>Top Chunk is RIGHT before the </a:t>
+            </a:r>
+            <a:r>
+              <a:rPr lang="en-US" b="1" i="1" dirty="0"/>
+              <a:t>target</a:t>
+            </a:r>
+          </a:p>
+          <a:p>
+            <a:r>
+              <a:rPr lang="en-US" dirty="0"/>
+              <a:t>To overwrite the target, we just allocate a chunk!</a:t>
+            </a:r>
+          </a:p>
+          <a:p>
+            <a:pPr lvl="1"/>
+            <a:r>
+              <a:rPr lang="en-US" dirty="0"/>
+              <a:t>Must get into step 7 (no other chunks in bins) </a:t>
+            </a:r>
+          </a:p>
+          <a:p>
+            <a:endParaRPr lang="en-US" dirty="0"/>
+          </a:p>
+        </p:txBody>
+      </p:sp>
+      <p:pic>
+        <p:nvPicPr>
+          <p:cNvPr id="6" name="Content Placeholder 5" descr="Top Chunk close to __malloc_hook">
+            <a:extLst>
+              <a:ext uri="{FF2B5EF4-FFF2-40B4-BE49-F238E27FC236}">
+                <a16:creationId xmlns:a16="http://schemas.microsoft.com/office/drawing/2014/main" id="{B40C0FC3-2632-424E-B07E-25682AC173B3}"/>
+              </a:ext>
+            </a:extLst>
+          </p:cNvPr>
+          <p:cNvPicPr>
+            <a:picLocks noGrp="1" noChangeAspect="1"/>
+          </p:cNvPicPr>
+          <p:nvPr>
+            <p:ph sz="half" idx="2"/>
+          </p:nvPr>
+        </p:nvPicPr>
+        <p:blipFill>
+          <a:blip r:embed="rId2"/>
+          <a:stretch>
+            <a:fillRect/>
+          </a:stretch>
+        </p:blipFill>
+        <p:spPr>
+          <a:xfrm>
+            <a:off x="5434148" y="1369219"/>
+            <a:ext cx="3075059" cy="2894172"/>
+          </a:xfrm>
+        </p:spPr>
+      </p:pic>
     </p:spTree>
     <p:extLst>
       <p:ext uri="{BB962C8B-B14F-4D97-AF65-F5344CB8AC3E}">
-        <p14:creationId xmlns:p14="http://schemas.microsoft.com/office/powerpoint/2010/main" val="1539991312"/>
+        <p14:creationId xmlns:p14="http://schemas.microsoft.com/office/powerpoint/2010/main" val="572446649"/>
       </p:ext>
     </p:extLst>
   </p:cSld>
@@ -43390,72 +43546,17 @@
           <a:p>
             <a:r>
               <a:rPr lang="en-US" dirty="0"/>
-              <a:t>Overlap Chunk Over Target </a:t>
-            </a:r>
-          </a:p>
-        </p:txBody>
-      </p:sp>
-      <p:sp>
-        <p:nvSpPr>
-          <p:cNvPr id="14" name="Content Placeholder 2">
-            <a:extLst>
-              <a:ext uri="{FF2B5EF4-FFF2-40B4-BE49-F238E27FC236}">
-                <a16:creationId xmlns:a16="http://schemas.microsoft.com/office/drawing/2014/main" id="{A25A42B0-2650-4A72-B532-FA1013885883}"/>
-              </a:ext>
-            </a:extLst>
-          </p:cNvPr>
-          <p:cNvSpPr>
-            <a:spLocks noGrp="1"/>
-          </p:cNvSpPr>
-          <p:nvPr>
-            <p:ph sz="half" idx="1"/>
-          </p:nvPr>
-        </p:nvSpPr>
-        <p:spPr>
-          <a:xfrm>
-            <a:off x="628650" y="1369219"/>
-            <a:ext cx="4648744" cy="3263504"/>
-          </a:xfrm>
-        </p:spPr>
-        <p:txBody>
-          <a:bodyPr>
-            <a:normAutofit/>
-          </a:bodyPr>
-          <a:lstStyle/>
-          <a:p>
-            <a:r>
-              <a:rPr lang="en-US" dirty="0"/>
-              <a:t>Top Chunk is RIGHT before the </a:t>
-            </a:r>
-            <a:r>
-              <a:rPr lang="en-US" b="1" i="1" dirty="0"/>
-              <a:t>target</a:t>
-            </a:r>
-          </a:p>
-          <a:p>
-            <a:r>
-              <a:rPr lang="en-US" dirty="0"/>
-              <a:t>To overwrite the target, we just allocate a chunk!</a:t>
-            </a:r>
-          </a:p>
-          <a:p>
-            <a:pPr lvl="1"/>
-            <a:r>
-              <a:rPr lang="en-US" dirty="0"/>
-              <a:t>Must get into step 7 (no other chunks in bins) </a:t>
-            </a:r>
-          </a:p>
-          <a:p>
-            <a:endParaRPr lang="en-US" dirty="0"/>
+              <a:t>Overlap Chunk Over Target</a:t>
+            </a:r>
           </a:p>
         </p:txBody>
       </p:sp>
       <p:pic>
         <p:nvPicPr>
-          <p:cNvPr id="6" name="Content Placeholder 5" descr="Top Chunk close to __malloc_hook">
+          <p:cNvPr id="24" name="Content Placeholder 23" descr="Overlapping fake chunk on malloc hook">
             <a:extLst>
               <a:ext uri="{FF2B5EF4-FFF2-40B4-BE49-F238E27FC236}">
-                <a16:creationId xmlns:a16="http://schemas.microsoft.com/office/drawing/2014/main" id="{B40C0FC3-2632-424E-B07E-25682AC173B3}"/>
+                <a16:creationId xmlns:a16="http://schemas.microsoft.com/office/drawing/2014/main" id="{A8F3C739-EAF4-3C4F-8B63-F9774D3BB97A}"/>
               </a:ext>
             </a:extLst>
           </p:cNvPr>
@@ -43463,7 +43564,7 @@
             <a:picLocks noGrp="1" noChangeAspect="1"/>
           </p:cNvPicPr>
           <p:nvPr>
-            <p:ph sz="half" idx="2"/>
+            <p:ph sz="half" idx="1"/>
           </p:nvPr>
         </p:nvPicPr>
         <p:blipFill>
@@ -43474,15 +43575,74 @@
         </p:blipFill>
         <p:spPr>
           <a:xfrm>
-            <a:off x="5434148" y="1369219"/>
-            <a:ext cx="3075059" cy="2894172"/>
+            <a:off x="4790076" y="1369218"/>
+            <a:ext cx="3474357" cy="3269983"/>
           </a:xfrm>
         </p:spPr>
       </p:pic>
+      <p:sp>
+        <p:nvSpPr>
+          <p:cNvPr id="22" name="Content Placeholder 21">
+            <a:extLst>
+              <a:ext uri="{FF2B5EF4-FFF2-40B4-BE49-F238E27FC236}">
+                <a16:creationId xmlns:a16="http://schemas.microsoft.com/office/drawing/2014/main" id="{8DC6FE71-F634-CC43-AF63-6EA86497B900}"/>
+              </a:ext>
+            </a:extLst>
+          </p:cNvPr>
+          <p:cNvSpPr>
+            <a:spLocks noGrp="1"/>
+          </p:cNvSpPr>
+          <p:nvPr>
+            <p:ph sz="half" idx="2"/>
+          </p:nvPr>
+        </p:nvSpPr>
+        <p:spPr>
+          <a:xfrm>
+            <a:off x="771253" y="1369219"/>
+            <a:ext cx="3886200" cy="3263504"/>
+          </a:xfrm>
+        </p:spPr>
+        <p:txBody>
+          <a:bodyPr/>
+          <a:lstStyle/>
+          <a:p>
+            <a:r>
+              <a:rPr lang="en-US" i="1"/>
+              <a:t>Third</a:t>
+            </a:r>
+            <a:r>
+              <a:rPr lang="en-US"/>
+              <a:t> pointer</a:t>
+            </a:r>
+            <a:endParaRPr lang="en-US" i="1" dirty="0"/>
+          </a:p>
+          <a:p>
+            <a:r>
+              <a:rPr lang="en-US" dirty="0"/>
+              <a:t>Allocated over the </a:t>
+            </a:r>
+            <a:r>
+              <a:rPr lang="en-US" i="1" dirty="0"/>
+              <a:t>__</a:t>
+            </a:r>
+            <a:r>
+              <a:rPr lang="en-US" i="1" dirty="0" err="1"/>
+              <a:t>malloc_hook</a:t>
+            </a:r>
+            <a:r>
+              <a:rPr lang="en-US" dirty="0"/>
+              <a:t>!</a:t>
+            </a:r>
+          </a:p>
+          <a:p>
+            <a:endParaRPr lang="en-US" dirty="0"/>
+          </a:p>
+        </p:txBody>
+      </p:sp>
     </p:spTree>
     <p:extLst>
       <p:ext uri="{BB962C8B-B14F-4D97-AF65-F5344CB8AC3E}">
-        <p14:creationId xmlns:p14="http://schemas.microsoft.com/office/powerpoint/2010/main" val="572446649"/>
+        <p14:creationId xmlns:p14="http://schemas.microsoft.com/office/powerpoint/2010/main" val="3982501371"/>
       </p:ext>
     </p:extLst>
   </p:cSld>
@@ -43997,159 +44157,6 @@
           </a:p>
         </p:txBody>
       </p:sp>
-      <p:pic>
-        <p:nvPicPr>
-          <p:cNvPr id="24" name="Content Placeholder 23" descr="Overlapping fake chunk on malloc hook">
-            <a:extLst>
-              <a:ext uri="{FF2B5EF4-FFF2-40B4-BE49-F238E27FC236}">
-                <a16:creationId xmlns:a16="http://schemas.microsoft.com/office/drawing/2014/main" id="{A8F3C739-EAF4-3C4F-8B63-F9774D3BB97A}"/>
-              </a:ext>
-            </a:extLst>
-          </p:cNvPr>
-          <p:cNvPicPr>
-            <a:picLocks noGrp="1" noChangeAspect="1"/>
-          </p:cNvPicPr>
-          <p:nvPr>
-            <p:ph sz="half" idx="1"/>
-          </p:nvPr>
-        </p:nvPicPr>
-        <p:blipFill>
-          <a:blip r:embed="rId2"/>
-          <a:stretch>
-            <a:fillRect/>
-          </a:stretch>
-        </p:blipFill>
-        <p:spPr>
-          <a:xfrm>
-            <a:off x="4790076" y="1369218"/>
-            <a:ext cx="3474357" cy="3269983"/>
-          </a:xfrm>
-        </p:spPr>
-      </p:pic>
-      <p:sp>
-        <p:nvSpPr>
-          <p:cNvPr id="22" name="Content Placeholder 21">
-            <a:extLst>
-              <a:ext uri="{FF2B5EF4-FFF2-40B4-BE49-F238E27FC236}">
-                <a16:creationId xmlns:a16="http://schemas.microsoft.com/office/drawing/2014/main" id="{8DC6FE71-F634-CC43-AF63-6EA86497B900}"/>
-              </a:ext>
-            </a:extLst>
-          </p:cNvPr>
-          <p:cNvSpPr>
-            <a:spLocks noGrp="1"/>
-          </p:cNvSpPr>
-          <p:nvPr>
-            <p:ph sz="half" idx="2"/>
-          </p:nvPr>
-        </p:nvSpPr>
-        <p:spPr>
-          <a:xfrm>
-            <a:off x="771253" y="1369219"/>
-            <a:ext cx="3886200" cy="3263504"/>
-          </a:xfrm>
-        </p:spPr>
-        <p:txBody>
-          <a:bodyPr/>
-          <a:lstStyle/>
-          <a:p>
-            <a:r>
-              <a:rPr lang="en-US" i="1"/>
-              <a:t>Third</a:t>
-            </a:r>
-            <a:r>
-              <a:rPr lang="en-US"/>
-              <a:t> pointer</a:t>
-            </a:r>
-            <a:endParaRPr lang="en-US" i="1" dirty="0"/>
-          </a:p>
-          <a:p>
-            <a:r>
-              <a:rPr lang="en-US" dirty="0"/>
-              <a:t>Allocated over the </a:t>
-            </a:r>
-            <a:r>
-              <a:rPr lang="en-US" i="1" dirty="0"/>
-              <a:t>__</a:t>
-            </a:r>
-            <a:r>
-              <a:rPr lang="en-US" i="1" dirty="0" err="1"/>
-              <a:t>malloc_hook</a:t>
-            </a:r>
-            <a:r>
-              <a:rPr lang="en-US" dirty="0"/>
-              <a:t>!</a:t>
-            </a:r>
-          </a:p>
-          <a:p>
-            <a:endParaRPr lang="en-US" dirty="0"/>
-          </a:p>
-        </p:txBody>
-      </p:sp>
-    </p:spTree>
-    <p:extLst>
-      <p:ext uri="{BB962C8B-B14F-4D97-AF65-F5344CB8AC3E}">
-        <p14:creationId xmlns:p14="http://schemas.microsoft.com/office/powerpoint/2010/main" val="3982501371"/>
-      </p:ext>
-    </p:extLst>
-  </p:cSld>
-  <p:clrMapOvr>
-    <a:masterClrMapping/>
-  </p:clrMapOvr>
-</p:sld>
-</file>
-
-<file path=ppt/slides/slide51.xml><?xml version="1.0" encoding="utf-8"?>
-<p:sld xmlns:a="http://schemas.openxmlformats.org/drawingml/2006/main" xmlns:r="http://schemas.openxmlformats.org/officeDocument/2006/relationships" xmlns:p="http://schemas.openxmlformats.org/presentationml/2006/main">
-  <p:cSld>
-    <p:spTree>
-      <p:nvGrpSpPr>
-        <p:cNvPr id="1" name=""/>
-        <p:cNvGrpSpPr/>
-        <p:nvPr/>
-      </p:nvGrpSpPr>
-      <p:grpSpPr>
-        <a:xfrm>
-          <a:off x="0" y="0"/>
-          <a:ext cx="0" cy="0"/>
-          <a:chOff x="0" y="0"/>
-          <a:chExt cx="0" cy="0"/>
-        </a:xfrm>
-      </p:grpSpPr>
-      <p:sp>
-        <p:nvSpPr>
-          <p:cNvPr id="2" name="Title 1">
-            <a:extLst>
-              <a:ext uri="{FF2B5EF4-FFF2-40B4-BE49-F238E27FC236}">
-                <a16:creationId xmlns:a16="http://schemas.microsoft.com/office/drawing/2014/main" id="{A10A7709-FD6C-B04E-8F0B-FE511A82C787}"/>
-              </a:ext>
-            </a:extLst>
-          </p:cNvPr>
-          <p:cNvSpPr>
-            <a:spLocks noGrp="1"/>
-          </p:cNvSpPr>
-          <p:nvPr>
-            <p:ph type="title"/>
-          </p:nvPr>
-        </p:nvSpPr>
-        <p:spPr>
-          <a:xfrm>
-            <a:off x="628650" y="273847"/>
-            <a:ext cx="7886700" cy="994172"/>
-          </a:xfrm>
-        </p:spPr>
-        <p:txBody>
-          <a:bodyPr anchor="ctr">
-            <a:normAutofit/>
-          </a:bodyPr>
-          <a:lstStyle/>
-          <a:p>
-            <a:r>
-              <a:rPr lang="en-US" dirty="0"/>
-              <a:t>Overlap Chunk Over Target</a:t>
-            </a:r>
-          </a:p>
-        </p:txBody>
-      </p:sp>
       <p:sp>
         <p:nvSpPr>
           <p:cNvPr id="22" name="Content Placeholder 21">
@@ -44246,7 +44253,7 @@
 </p:sld>
 </file>
 
-<file path=ppt/slides/slide52.xml><?xml version="1.0" encoding="utf-8"?>
+<file path=ppt/slides/slide51.xml><?xml version="1.0" encoding="utf-8"?>
 <p:sld xmlns:a="http://schemas.openxmlformats.org/drawingml/2006/main" xmlns:r="http://schemas.openxmlformats.org/officeDocument/2006/relationships" xmlns:p="http://schemas.openxmlformats.org/presentationml/2006/main">
   <p:cSld>
     <p:spTree>
@@ -44569,7 +44576,7 @@
 </p:sld>
 </file>
 
-<file path=ppt/slides/slide53.xml><?xml version="1.0" encoding="utf-8"?>
+<file path=ppt/slides/slide52.xml><?xml version="1.0" encoding="utf-8"?>
 <p:sld xmlns:a="http://schemas.openxmlformats.org/drawingml/2006/main" xmlns:r="http://schemas.openxmlformats.org/officeDocument/2006/relationships" xmlns:p="http://schemas.openxmlformats.org/presentationml/2006/main">
   <p:cSld>
     <p:spTree>
@@ -44665,7 +44672,7 @@
 </p:sld>
 </file>
 
-<file path=ppt/slides/slide54.xml><?xml version="1.0" encoding="utf-8"?>
+<file path=ppt/slides/slide53.xml><?xml version="1.0" encoding="utf-8"?>
 <p:sld xmlns:a="http://schemas.openxmlformats.org/drawingml/2006/main" xmlns:r="http://schemas.openxmlformats.org/officeDocument/2006/relationships" xmlns:p="http://schemas.openxmlformats.org/presentationml/2006/main">
   <p:cSld>
     <p:spTree>
@@ -44829,7 +44836,7 @@
 </p:sld>
 </file>
 
-<file path=ppt/slides/slide55.xml><?xml version="1.0" encoding="utf-8"?>
+<file path=ppt/slides/slide54.xml><?xml version="1.0" encoding="utf-8"?>
 <p:sld xmlns:a="http://schemas.openxmlformats.org/drawingml/2006/main" xmlns:r="http://schemas.openxmlformats.org/officeDocument/2006/relationships" xmlns:p="http://schemas.openxmlformats.org/presentationml/2006/main">
   <p:cSld>
     <p:spTree>
@@ -44976,19 +44983,12 @@
               <a:rPr lang="en-US" dirty="0">
                 <a:hlinkClick r:id="rId7"/>
               </a:rPr>
-              <a:t>https://www.youtube.com/watch?v</a:t>
-            </a:r>
-            <a:r>
-              <a:rPr lang="en-US">
-                <a:hlinkClick r:id="rId7"/>
-              </a:rPr>
-              <a:t>=PISoSH8KGVI</a:t>
-            </a:r>
-            <a:r>
-              <a:rPr lang="en-US"/>
+              <a:t>https://www.youtube.com/watch?v=PISoSH8KGVI</a:t>
+            </a:r>
+            <a:r>
+              <a:rPr lang="en-US" dirty="0"/>
               <a:t> </a:t>
             </a:r>
-            <a:endParaRPr lang="en-US" dirty="0"/>
           </a:p>
           <a:p>
             <a:r>
@@ -45387,7 +45387,7 @@
           <a:p>
             <a:r>
               <a:rPr lang="en-US" dirty="0"/>
-              <a:t>Top Chunk Extension</a:t>
+              <a:t>Using the Top Chunk</a:t>
             </a:r>
           </a:p>
         </p:txBody>
@@ -45643,7 +45643,7 @@
         </p:blipFill>
         <p:spPr>
           <a:xfrm>
-            <a:off x="5640389" y="418029"/>
+            <a:off x="5903736" y="431257"/>
             <a:ext cx="2782641" cy="4280985"/>
           </a:xfrm>
           <a:prstGeom prst="rect">
@@ -45667,7 +45667,7 @@
         </p:nvCxnSpPr>
         <p:spPr>
           <a:xfrm>
-            <a:off x="4929039" y="1659649"/>
+            <a:off x="5185071" y="1681594"/>
             <a:ext cx="719601" cy="0"/>
           </a:xfrm>
           <a:prstGeom prst="straightConnector1">
@@ -45711,7 +45711,7 @@
         </p:nvCxnSpPr>
         <p:spPr>
           <a:xfrm>
-            <a:off x="4932398" y="1655707"/>
+            <a:off x="5188430" y="1677652"/>
             <a:ext cx="0" cy="2369163"/>
           </a:xfrm>
           <a:prstGeom prst="line">
@@ -45754,7 +45754,7 @@
         </p:nvCxnSpPr>
         <p:spPr>
           <a:xfrm>
-            <a:off x="4929039" y="4024870"/>
+            <a:off x="5185071" y="4046815"/>
             <a:ext cx="719601" cy="0"/>
           </a:xfrm>
           <a:prstGeom prst="straightConnector1">
@@ -45835,7 +45835,7 @@
           <a:p>
             <a:r>
               <a:rPr lang="en-US" dirty="0"/>
-              <a:t>Top Chunk Extension</a:t>
+              <a:t>Top Chunk Extension – 1 </a:t>
             </a:r>
           </a:p>
         </p:txBody>
@@ -46075,7 +46075,7 @@
         </p:blipFill>
         <p:spPr>
           <a:xfrm>
-            <a:off x="5811512" y="703390"/>
+            <a:off x="6425989" y="645046"/>
             <a:ext cx="2600513" cy="4000790"/>
           </a:xfrm>
           <a:prstGeom prst="rect">
@@ -46099,7 +46099,7 @@
         </p:nvCxnSpPr>
         <p:spPr>
           <a:xfrm>
-            <a:off x="4929039" y="2400300"/>
+            <a:off x="5682504" y="2400300"/>
             <a:ext cx="719601" cy="0"/>
           </a:xfrm>
           <a:prstGeom prst="straightConnector1">
@@ -46143,7 +46143,7 @@
         </p:nvCxnSpPr>
         <p:spPr>
           <a:xfrm>
-            <a:off x="4932398" y="2365131"/>
+            <a:off x="5685863" y="2365131"/>
             <a:ext cx="0" cy="1659739"/>
           </a:xfrm>
           <a:prstGeom prst="line">
@@ -46186,7 +46186,7 @@
         </p:nvCxnSpPr>
         <p:spPr>
           <a:xfrm>
-            <a:off x="4929039" y="4022863"/>
+            <a:off x="5682504" y="4022863"/>
             <a:ext cx="719601" cy="0"/>
           </a:xfrm>
           <a:prstGeom prst="straightConnector1">

</xml_diff>

<commit_message>
Small modifications to the house of force POCs
</commit_message>
<xml_diff>
--- a/challenges/house_of_force/house_of_force.pptx
+++ b/challenges/house_of_force/house_of_force.pptx
@@ -5,7 +5,7 @@
     <p:sldMasterId id="2147483660" r:id="rId1"/>
   </p:sldMasterIdLst>
   <p:notesMasterIdLst>
-    <p:notesMasterId r:id="rId56"/>
+    <p:notesMasterId r:id="rId57"/>
   </p:notesMasterIdLst>
   <p:sldIdLst>
     <p:sldId id="327" r:id="rId2"/>
@@ -34,34 +34,35 @@
     <p:sldId id="521" r:id="rId25"/>
     <p:sldId id="522" r:id="rId26"/>
     <p:sldId id="516" r:id="rId27"/>
-    <p:sldId id="504" r:id="rId28"/>
-    <p:sldId id="505" r:id="rId29"/>
-    <p:sldId id="525" r:id="rId30"/>
-    <p:sldId id="536" r:id="rId31"/>
-    <p:sldId id="537" r:id="rId32"/>
-    <p:sldId id="531" r:id="rId33"/>
-    <p:sldId id="532" r:id="rId34"/>
-    <p:sldId id="533" r:id="rId35"/>
-    <p:sldId id="535" r:id="rId36"/>
-    <p:sldId id="538" r:id="rId37"/>
-    <p:sldId id="540" r:id="rId38"/>
-    <p:sldId id="546" r:id="rId39"/>
-    <p:sldId id="544" r:id="rId40"/>
-    <p:sldId id="543" r:id="rId41"/>
-    <p:sldId id="542" r:id="rId42"/>
-    <p:sldId id="541" r:id="rId43"/>
-    <p:sldId id="545" r:id="rId44"/>
-    <p:sldId id="552" r:id="rId45"/>
-    <p:sldId id="547" r:id="rId46"/>
-    <p:sldId id="549" r:id="rId47"/>
-    <p:sldId id="550" r:id="rId48"/>
-    <p:sldId id="551" r:id="rId49"/>
-    <p:sldId id="553" r:id="rId50"/>
-    <p:sldId id="554" r:id="rId51"/>
-    <p:sldId id="555" r:id="rId52"/>
-    <p:sldId id="556" r:id="rId53"/>
-    <p:sldId id="557" r:id="rId54"/>
-    <p:sldId id="524" r:id="rId55"/>
+    <p:sldId id="526" r:id="rId28"/>
+    <p:sldId id="504" r:id="rId29"/>
+    <p:sldId id="505" r:id="rId30"/>
+    <p:sldId id="525" r:id="rId31"/>
+    <p:sldId id="536" r:id="rId32"/>
+    <p:sldId id="537" r:id="rId33"/>
+    <p:sldId id="531" r:id="rId34"/>
+    <p:sldId id="532" r:id="rId35"/>
+    <p:sldId id="533" r:id="rId36"/>
+    <p:sldId id="535" r:id="rId37"/>
+    <p:sldId id="538" r:id="rId38"/>
+    <p:sldId id="540" r:id="rId39"/>
+    <p:sldId id="546" r:id="rId40"/>
+    <p:sldId id="544" r:id="rId41"/>
+    <p:sldId id="543" r:id="rId42"/>
+    <p:sldId id="542" r:id="rId43"/>
+    <p:sldId id="541" r:id="rId44"/>
+    <p:sldId id="545" r:id="rId45"/>
+    <p:sldId id="552" r:id="rId46"/>
+    <p:sldId id="547" r:id="rId47"/>
+    <p:sldId id="549" r:id="rId48"/>
+    <p:sldId id="550" r:id="rId49"/>
+    <p:sldId id="551" r:id="rId50"/>
+    <p:sldId id="553" r:id="rId51"/>
+    <p:sldId id="554" r:id="rId52"/>
+    <p:sldId id="555" r:id="rId53"/>
+    <p:sldId id="556" r:id="rId54"/>
+    <p:sldId id="557" r:id="rId55"/>
+    <p:sldId id="524" r:id="rId56"/>
   </p:sldIdLst>
   <p:sldSz cx="9144000" cy="5143500" type="screen16x9"/>
   <p:notesSz cx="6858000" cy="9144000"/>
@@ -23736,7 +23737,7 @@
           <a:p>
             <a:fld id="{2DA23E8D-1792-1541-9147-970A8DD8A355}" type="datetimeFigureOut">
               <a:rPr lang="en-US" smtClean="0"/>
-              <a:t>3/23/21</a:t>
+              <a:t>12/28/20</a:t>
             </a:fld>
             <a:endParaRPr lang="en-US" dirty="0"/>
           </a:p>
@@ -24206,7 +24207,7 @@
                 <a:latin typeface="Calibri"/>
               </a:rPr>
               <a:pPr/>
-              <a:t>3/23/21</a:t>
+              <a:t>12/28/20</a:t>
             </a:fld>
             <a:endParaRPr lang="en-US" dirty="0">
               <a:solidFill>
@@ -24459,7 +24460,7 @@
                 <a:latin typeface="Calibri"/>
               </a:rPr>
               <a:pPr/>
-              <a:t>3/23/21</a:t>
+              <a:t>12/28/20</a:t>
             </a:fld>
             <a:endParaRPr lang="en-US" dirty="0">
               <a:solidFill>
@@ -24674,7 +24675,7 @@
                 <a:latin typeface="Calibri"/>
               </a:rPr>
               <a:pPr/>
-              <a:t>3/23/21</a:t>
+              <a:t>12/28/20</a:t>
             </a:fld>
             <a:endParaRPr lang="en-US" dirty="0">
               <a:solidFill>
@@ -24958,7 +24959,7 @@
                 <a:latin typeface="Calibri"/>
               </a:rPr>
               <a:pPr/>
-              <a:t>3/23/21</a:t>
+              <a:t>12/28/20</a:t>
             </a:fld>
             <a:endParaRPr lang="en-US" dirty="0">
               <a:solidFill>
@@ -25300,7 +25301,7 @@
                 <a:latin typeface="Calibri"/>
               </a:rPr>
               <a:pPr/>
-              <a:t>3/23/21</a:t>
+              <a:t>12/28/20</a:t>
             </a:fld>
             <a:endParaRPr lang="en-US" dirty="0">
               <a:solidFill>
@@ -25628,7 +25629,7 @@
                 <a:latin typeface="Calibri"/>
               </a:rPr>
               <a:pPr/>
-              <a:t>3/23/21</a:t>
+              <a:t>12/28/20</a:t>
             </a:fld>
             <a:endParaRPr lang="en-US" dirty="0">
               <a:solidFill>
@@ -26117,7 +26118,7 @@
                 <a:latin typeface="Calibri"/>
               </a:rPr>
               <a:pPr/>
-              <a:t>3/23/21</a:t>
+              <a:t>12/28/20</a:t>
             </a:fld>
             <a:endParaRPr lang="en-US" dirty="0">
               <a:solidFill>
@@ -26300,7 +26301,7 @@
                 <a:latin typeface="Calibri"/>
               </a:rPr>
               <a:pPr/>
-              <a:t>3/23/21</a:t>
+              <a:t>12/28/20</a:t>
             </a:fld>
             <a:endParaRPr lang="en-US" dirty="0">
               <a:solidFill>
@@ -26546,7 +26547,7 @@
                 <a:latin typeface="Calibri"/>
               </a:rPr>
               <a:pPr/>
-              <a:t>3/23/21</a:t>
+              <a:t>12/28/20</a:t>
             </a:fld>
             <a:endParaRPr lang="en-US" dirty="0">
               <a:solidFill>
@@ -26888,7 +26889,7 @@
                 <a:latin typeface="Calibri"/>
               </a:rPr>
               <a:pPr/>
-              <a:t>3/23/21</a:t>
+              <a:t>12/28/20</a:t>
             </a:fld>
             <a:endParaRPr lang="en-US" dirty="0">
               <a:solidFill>
@@ -27180,7 +27181,7 @@
                 <a:latin typeface="Calibri"/>
               </a:rPr>
               <a:pPr/>
-              <a:t>3/23/21</a:t>
+              <a:t>12/28/20</a:t>
             </a:fld>
             <a:endParaRPr lang="en-US" dirty="0">
               <a:solidFill>
@@ -27430,7 +27431,7 @@
                 <a:latin typeface="Calibri"/>
               </a:rPr>
               <a:pPr defTabSz="914400"/>
-              <a:t>3/23/21</a:t>
+              <a:t>12/28/20</a:t>
             </a:fld>
             <a:endParaRPr lang="en-US" dirty="0">
               <a:solidFill>
@@ -33537,19 +33538,19 @@
         </p:nvSpPr>
         <p:spPr>
           <a:xfrm>
-            <a:off x="124358" y="288238"/>
-            <a:ext cx="8727034" cy="994172"/>
+            <a:off x="628650" y="273847"/>
+            <a:ext cx="7886700" cy="994172"/>
           </a:xfrm>
         </p:spPr>
         <p:txBody>
           <a:bodyPr anchor="ctr">
-            <a:normAutofit fontScale="90000"/>
+            <a:normAutofit/>
           </a:bodyPr>
           <a:lstStyle/>
           <a:p>
             <a:r>
               <a:rPr lang="en-US" dirty="0"/>
-              <a:t>Allocate Close to Target – Aftermath </a:t>
+              <a:t>Allocate Close to Target – 4 </a:t>
             </a:r>
           </a:p>
         </p:txBody>
@@ -33696,50 +33697,6 @@
           </a:xfrm>
         </p:spPr>
       </p:pic>
-      <p:cxnSp>
-        <p:nvCxnSpPr>
-          <p:cNvPr id="6" name="Straight Arrow Connector 5">
-            <a:extLst>
-              <a:ext uri="{FF2B5EF4-FFF2-40B4-BE49-F238E27FC236}">
-                <a16:creationId xmlns:a16="http://schemas.microsoft.com/office/drawing/2014/main" id="{CE98D7A2-9928-A44D-BF77-64B3281A74EF}"/>
-              </a:ext>
-            </a:extLst>
-          </p:cNvPr>
-          <p:cNvCxnSpPr>
-            <a:cxnSpLocks/>
-          </p:cNvCxnSpPr>
-          <p:nvPr/>
-        </p:nvCxnSpPr>
-        <p:spPr>
-          <a:xfrm flipH="1">
-            <a:off x="6318558" y="4105104"/>
-            <a:ext cx="601621" cy="0"/>
-          </a:xfrm>
-          <a:prstGeom prst="straightConnector1">
-            <a:avLst/>
-          </a:prstGeom>
-          <a:ln w="57150">
-            <a:solidFill>
-              <a:srgbClr val="FF0000"/>
-            </a:solidFill>
-            <a:tailEnd type="triangle"/>
-          </a:ln>
-        </p:spPr>
-        <p:style>
-          <a:lnRef idx="1">
-            <a:schemeClr val="accent1"/>
-          </a:lnRef>
-          <a:fillRef idx="0">
-            <a:schemeClr val="accent1"/>
-          </a:fillRef>
-          <a:effectRef idx="0">
-            <a:schemeClr val="accent1"/>
-          </a:effectRef>
-          <a:fontRef idx="minor">
-            <a:schemeClr val="tx1"/>
-          </a:fontRef>
-        </p:style>
-      </p:cxnSp>
     </p:spTree>
     <p:extLst>
       <p:ext uri="{BB962C8B-B14F-4D97-AF65-F5344CB8AC3E}">
@@ -33940,50 +33897,6 @@
           </a:xfrm>
         </p:spPr>
       </p:pic>
-      <p:cxnSp>
-        <p:nvCxnSpPr>
-          <p:cNvPr id="6" name="Straight Arrow Connector 5">
-            <a:extLst>
-              <a:ext uri="{FF2B5EF4-FFF2-40B4-BE49-F238E27FC236}">
-                <a16:creationId xmlns:a16="http://schemas.microsoft.com/office/drawing/2014/main" id="{2F683981-7973-014A-8499-C1887CF91774}"/>
-              </a:ext>
-            </a:extLst>
-          </p:cNvPr>
-          <p:cNvCxnSpPr>
-            <a:cxnSpLocks/>
-          </p:cNvCxnSpPr>
-          <p:nvPr/>
-        </p:nvCxnSpPr>
-        <p:spPr>
-          <a:xfrm flipH="1">
-            <a:off x="6318558" y="4105104"/>
-            <a:ext cx="601621" cy="0"/>
-          </a:xfrm>
-          <a:prstGeom prst="straightConnector1">
-            <a:avLst/>
-          </a:prstGeom>
-          <a:ln w="57150">
-            <a:solidFill>
-              <a:srgbClr val="FF0000"/>
-            </a:solidFill>
-            <a:tailEnd type="triangle"/>
-          </a:ln>
-        </p:spPr>
-        <p:style>
-          <a:lnRef idx="1">
-            <a:schemeClr val="accent1"/>
-          </a:lnRef>
-          <a:fillRef idx="0">
-            <a:schemeClr val="accent1"/>
-          </a:fillRef>
-          <a:effectRef idx="0">
-            <a:schemeClr val="accent1"/>
-          </a:effectRef>
-          <a:fontRef idx="minor">
-            <a:schemeClr val="tx1"/>
-          </a:fontRef>
-        </p:style>
-      </p:cxnSp>
     </p:spTree>
     <p:extLst>
       <p:ext uri="{BB962C8B-B14F-4D97-AF65-F5344CB8AC3E}">
@@ -35298,6 +35211,94 @@
           <p:cNvPr id="2" name="Title 1">
             <a:extLst>
               <a:ext uri="{FF2B5EF4-FFF2-40B4-BE49-F238E27FC236}">
+                <a16:creationId xmlns:a16="http://schemas.microsoft.com/office/drawing/2014/main" id="{2E937BBE-3517-B74B-B553-0D1366B462B8}"/>
+              </a:ext>
+            </a:extLst>
+          </p:cNvPr>
+          <p:cNvSpPr>
+            <a:spLocks noGrp="1"/>
+          </p:cNvSpPr>
+          <p:nvPr>
+            <p:ph type="title"/>
+          </p:nvPr>
+        </p:nvSpPr>
+        <p:spPr/>
+        <p:txBody>
+          <a:bodyPr>
+            <a:normAutofit fontScale="90000"/>
+          </a:bodyPr>
+          <a:lstStyle/>
+          <a:p>
+            <a:r>
+              <a:rPr lang="en-US" dirty="0"/>
+              <a:t>House of Force – Technique Notes</a:t>
+            </a:r>
+          </a:p>
+        </p:txBody>
+      </p:sp>
+      <p:sp>
+        <p:nvSpPr>
+          <p:cNvPr id="3" name="Content Placeholder 2">
+            <a:extLst>
+              <a:ext uri="{FF2B5EF4-FFF2-40B4-BE49-F238E27FC236}">
+                <a16:creationId xmlns:a16="http://schemas.microsoft.com/office/drawing/2014/main" id="{F35BDBDF-032D-184B-94F7-F3307CE0ABDE}"/>
+              </a:ext>
+            </a:extLst>
+          </p:cNvPr>
+          <p:cNvSpPr>
+            <a:spLocks noGrp="1"/>
+          </p:cNvSpPr>
+          <p:nvPr>
+            <p:ph idx="1"/>
+          </p:nvPr>
+        </p:nvSpPr>
+        <p:spPr/>
+        <p:txBody>
+          <a:bodyPr/>
+          <a:lstStyle/>
+          <a:p>
+            <a:r>
+              <a:rPr lang="en-US" dirty="0"/>
+              <a:t>Used to set a pointer to ANY location</a:t>
+            </a:r>
+          </a:p>
+        </p:txBody>
+      </p:sp>
+    </p:spTree>
+    <p:extLst>
+      <p:ext uri="{BB962C8B-B14F-4D97-AF65-F5344CB8AC3E}">
+        <p14:creationId xmlns:p14="http://schemas.microsoft.com/office/powerpoint/2010/main" val="2624626848"/>
+      </p:ext>
+    </p:extLst>
+  </p:cSld>
+  <p:clrMapOvr>
+    <a:masterClrMapping/>
+  </p:clrMapOvr>
+</p:sld>
+</file>
+
+<file path=ppt/slides/slide28.xml><?xml version="1.0" encoding="utf-8"?>
+<p:sld xmlns:a="http://schemas.openxmlformats.org/drawingml/2006/main" xmlns:r="http://schemas.openxmlformats.org/officeDocument/2006/relationships" xmlns:p="http://schemas.openxmlformats.org/presentationml/2006/main">
+  <p:cSld>
+    <p:spTree>
+      <p:nvGrpSpPr>
+        <p:cNvPr id="1" name=""/>
+        <p:cNvGrpSpPr/>
+        <p:nvPr/>
+      </p:nvGrpSpPr>
+      <p:grpSpPr>
+        <a:xfrm>
+          <a:off x="0" y="0"/>
+          <a:ext cx="0" cy="0"/>
+          <a:chOff x="0" y="0"/>
+          <a:chExt cx="0" cy="0"/>
+        </a:xfrm>
+      </p:grpSpPr>
+      <p:sp>
+        <p:nvSpPr>
+          <p:cNvPr id="2" name="Title 1">
+            <a:extLst>
+              <a:ext uri="{FF2B5EF4-FFF2-40B4-BE49-F238E27FC236}">
                 <a16:creationId xmlns:a16="http://schemas.microsoft.com/office/drawing/2014/main" id="{BA872FA3-F02F-1745-B595-57166CE10F41}"/>
               </a:ext>
             </a:extLst>
@@ -35409,7 +35410,7 @@
 </p:sld>
 </file>
 
-<file path=ppt/slides/slide28.xml><?xml version="1.0" encoding="utf-8"?>
+<file path=ppt/slides/slide29.xml><?xml version="1.0" encoding="utf-8"?>
 <p:sld xmlns:a="http://schemas.openxmlformats.org/drawingml/2006/main" xmlns:r="http://schemas.openxmlformats.org/officeDocument/2006/relationships" xmlns:p="http://schemas.openxmlformats.org/presentationml/2006/main">
   <p:cSld>
     <p:spTree>
@@ -35582,156 +35583,6 @@
     <p:extLst>
       <p:ext uri="{BB962C8B-B14F-4D97-AF65-F5344CB8AC3E}">
         <p14:creationId xmlns:p14="http://schemas.microsoft.com/office/powerpoint/2010/main" val="496836656"/>
-      </p:ext>
-    </p:extLst>
-  </p:cSld>
-  <p:clrMapOvr>
-    <a:masterClrMapping/>
-  </p:clrMapOvr>
-</p:sld>
-</file>
-
-<file path=ppt/slides/slide29.xml><?xml version="1.0" encoding="utf-8"?>
-<p:sld xmlns:a="http://schemas.openxmlformats.org/drawingml/2006/main" xmlns:r="http://schemas.openxmlformats.org/officeDocument/2006/relationships" xmlns:p="http://schemas.openxmlformats.org/presentationml/2006/main">
-  <p:cSld>
-    <p:spTree>
-      <p:nvGrpSpPr>
-        <p:cNvPr id="1" name=""/>
-        <p:cNvGrpSpPr/>
-        <p:nvPr/>
-      </p:nvGrpSpPr>
-      <p:grpSpPr>
-        <a:xfrm>
-          <a:off x="0" y="0"/>
-          <a:ext cx="0" cy="0"/>
-          <a:chOff x="0" y="0"/>
-          <a:chExt cx="0" cy="0"/>
-        </a:xfrm>
-      </p:grpSpPr>
-      <p:sp>
-        <p:nvSpPr>
-          <p:cNvPr id="2" name="Title 1">
-            <a:extLst>
-              <a:ext uri="{FF2B5EF4-FFF2-40B4-BE49-F238E27FC236}">
-                <a16:creationId xmlns:a16="http://schemas.microsoft.com/office/drawing/2014/main" id="{82DA7DEA-B481-9045-B5D4-BF35BBF2F0E2}"/>
-              </a:ext>
-            </a:extLst>
-          </p:cNvPr>
-          <p:cNvSpPr>
-            <a:spLocks noGrp="1"/>
-          </p:cNvSpPr>
-          <p:nvPr>
-            <p:ph type="title"/>
-          </p:nvPr>
-        </p:nvSpPr>
-        <p:spPr/>
-        <p:txBody>
-          <a:bodyPr/>
-          <a:lstStyle/>
-          <a:p>
-            <a:r>
-              <a:rPr lang="en-US" dirty="0"/>
-              <a:t>Challenge Time!</a:t>
-            </a:r>
-          </a:p>
-        </p:txBody>
-      </p:sp>
-      <p:sp>
-        <p:nvSpPr>
-          <p:cNvPr id="3" name="Content Placeholder 2">
-            <a:extLst>
-              <a:ext uri="{FF2B5EF4-FFF2-40B4-BE49-F238E27FC236}">
-                <a16:creationId xmlns:a16="http://schemas.microsoft.com/office/drawing/2014/main" id="{9B84729C-0F4E-C64D-A363-B1B7546CE7EE}"/>
-              </a:ext>
-            </a:extLst>
-          </p:cNvPr>
-          <p:cNvSpPr>
-            <a:spLocks noGrp="1"/>
-          </p:cNvSpPr>
-          <p:nvPr>
-            <p:ph idx="1"/>
-          </p:nvPr>
-        </p:nvSpPr>
-        <p:spPr/>
-        <p:txBody>
-          <a:bodyPr/>
-          <a:lstStyle/>
-          <a:p>
-            <a:r>
-              <a:rPr lang="en-US" dirty="0" err="1"/>
-              <a:t>house_of_force</a:t>
-            </a:r>
-            <a:r>
-              <a:rPr lang="en-US" dirty="0"/>
-              <a:t>/</a:t>
-            </a:r>
-            <a:r>
-              <a:rPr lang="en-US" dirty="0" err="1"/>
-              <a:t>shinning_moment</a:t>
-            </a:r>
-            <a:endParaRPr lang="en-US" dirty="0"/>
-          </a:p>
-          <a:p>
-            <a:r>
-              <a:rPr lang="en-US" dirty="0"/>
-              <a:t>Remember the three steps: </a:t>
-            </a:r>
-          </a:p>
-          <a:p>
-            <a:pPr lvl="1"/>
-            <a:r>
-              <a:rPr lang="en-US" dirty="0"/>
-              <a:t>Corrupt Top Chunk</a:t>
-            </a:r>
-          </a:p>
-          <a:p>
-            <a:pPr lvl="1"/>
-            <a:r>
-              <a:rPr lang="en-US" dirty="0"/>
-              <a:t>Allocate </a:t>
-            </a:r>
-            <a:r>
-              <a:rPr lang="en-US" i="1" dirty="0"/>
-              <a:t>close</a:t>
-            </a:r>
-            <a:r>
-              <a:rPr lang="en-US" dirty="0"/>
-              <a:t> to the target</a:t>
-            </a:r>
-          </a:p>
-          <a:p>
-            <a:pPr lvl="1"/>
-            <a:r>
-              <a:rPr lang="en-US" dirty="0"/>
-              <a:t>Allocate &amp; overwrite target</a:t>
-            </a:r>
-          </a:p>
-          <a:p>
-            <a:r>
-              <a:rPr lang="en-US" dirty="0"/>
-              <a:t>Hints: </a:t>
-            </a:r>
-          </a:p>
-          <a:p>
-            <a:pPr lvl="1"/>
-            <a:r>
-              <a:rPr lang="en-US" dirty="0"/>
-              <a:t>Remember that 0x20 of metadata</a:t>
-            </a:r>
-          </a:p>
-          <a:p>
-            <a:pPr lvl="1"/>
-            <a:r>
-              <a:rPr lang="en-US" dirty="0"/>
-              <a:t>Read through the source code to see what is going on</a:t>
-            </a:r>
-          </a:p>
-        </p:txBody>
-      </p:sp>
-    </p:spTree>
-    <p:extLst>
-      <p:ext uri="{BB962C8B-B14F-4D97-AF65-F5344CB8AC3E}">
-        <p14:creationId xmlns:p14="http://schemas.microsoft.com/office/powerpoint/2010/main" val="2527480506"/>
       </p:ext>
     </p:extLst>
   </p:cSld>
@@ -36073,7 +35924,7 @@
           <p:cNvPr id="2" name="Title 1">
             <a:extLst>
               <a:ext uri="{FF2B5EF4-FFF2-40B4-BE49-F238E27FC236}">
-                <a16:creationId xmlns:a16="http://schemas.microsoft.com/office/drawing/2014/main" id="{F90744CA-AA12-694B-9EFD-DAE3C6B34B65}"/>
+                <a16:creationId xmlns:a16="http://schemas.microsoft.com/office/drawing/2014/main" id="{82DA7DEA-B481-9045-B5D4-BF35BBF2F0E2}"/>
               </a:ext>
             </a:extLst>
           </p:cNvPr>
@@ -36084,55 +35935,114 @@
             <p:ph type="title"/>
           </p:nvPr>
         </p:nvSpPr>
-        <p:spPr>
-          <a:xfrm>
-            <a:off x="628650" y="273847"/>
-            <a:ext cx="7886700" cy="994172"/>
-          </a:xfrm>
-        </p:spPr>
+        <p:spPr/>
         <p:txBody>
-          <a:bodyPr anchor="ctr">
-            <a:normAutofit/>
-          </a:bodyPr>
+          <a:bodyPr/>
           <a:lstStyle/>
           <a:p>
             <a:r>
               <a:rPr lang="en-US" dirty="0"/>
-              <a:t>Flow of the Attack</a:t>
+              <a:t>Challenge Time!</a:t>
             </a:r>
           </a:p>
         </p:txBody>
       </p:sp>
-      <p:graphicFrame>
-        <p:nvGraphicFramePr>
-          <p:cNvPr id="7" name="Content Placeholder 2">
+      <p:sp>
+        <p:nvSpPr>
+          <p:cNvPr id="3" name="Content Placeholder 2">
             <a:extLst>
               <a:ext uri="{FF2B5EF4-FFF2-40B4-BE49-F238E27FC236}">
-                <a16:creationId xmlns:a16="http://schemas.microsoft.com/office/drawing/2014/main" id="{16AFF43D-D95F-43D7-9B17-22E96F279462}"/>
+                <a16:creationId xmlns:a16="http://schemas.microsoft.com/office/drawing/2014/main" id="{9B84729C-0F4E-C64D-A363-B1B7546CE7EE}"/>
               </a:ext>
             </a:extLst>
           </p:cNvPr>
-          <p:cNvGraphicFramePr>
-            <a:graphicFrameLocks noGrp="1"/>
-          </p:cNvGraphicFramePr>
+          <p:cNvSpPr>
+            <a:spLocks noGrp="1"/>
+          </p:cNvSpPr>
           <p:nvPr>
             <p:ph idx="1"/>
           </p:nvPr>
-        </p:nvGraphicFramePr>
-        <p:xfrm>
-          <a:off x="628650" y="1236541"/>
-          <a:ext cx="7886700" cy="3263504"/>
-        </p:xfrm>
-        <a:graphic>
-          <a:graphicData uri="http://schemas.openxmlformats.org/drawingml/2006/diagram">
-            <dgm:relIds xmlns:dgm="http://schemas.openxmlformats.org/drawingml/2006/diagram" xmlns:r="http://schemas.openxmlformats.org/officeDocument/2006/relationships" r:dm="rId2" r:lo="rId3" r:qs="rId4" r:cs="rId5"/>
-          </a:graphicData>
-        </a:graphic>
-      </p:graphicFrame>
+        </p:nvSpPr>
+        <p:spPr/>
+        <p:txBody>
+          <a:bodyPr/>
+          <a:lstStyle/>
+          <a:p>
+            <a:r>
+              <a:rPr lang="en-US" dirty="0" err="1"/>
+              <a:t>house_of_force</a:t>
+            </a:r>
+            <a:r>
+              <a:rPr lang="en-US" dirty="0"/>
+              <a:t>/</a:t>
+            </a:r>
+            <a:r>
+              <a:rPr lang="en-US" dirty="0" err="1"/>
+              <a:t>shinning_moment</a:t>
+            </a:r>
+            <a:endParaRPr lang="en-US" dirty="0"/>
+          </a:p>
+          <a:p>
+            <a:r>
+              <a:rPr lang="en-US" dirty="0"/>
+              <a:t>Remember the three steps: </a:t>
+            </a:r>
+          </a:p>
+          <a:p>
+            <a:pPr lvl="1"/>
+            <a:r>
+              <a:rPr lang="en-US" dirty="0"/>
+              <a:t>Corrupt Top Chunk</a:t>
+            </a:r>
+          </a:p>
+          <a:p>
+            <a:pPr lvl="1"/>
+            <a:r>
+              <a:rPr lang="en-US" dirty="0"/>
+              <a:t>Allocate </a:t>
+            </a:r>
+            <a:r>
+              <a:rPr lang="en-US" i="1" dirty="0"/>
+              <a:t>close</a:t>
+            </a:r>
+            <a:r>
+              <a:rPr lang="en-US" dirty="0"/>
+              <a:t> to the target</a:t>
+            </a:r>
+          </a:p>
+          <a:p>
+            <a:pPr lvl="1"/>
+            <a:r>
+              <a:rPr lang="en-US" dirty="0"/>
+              <a:t>Allocate &amp; overwrite target</a:t>
+            </a:r>
+          </a:p>
+          <a:p>
+            <a:r>
+              <a:rPr lang="en-US" dirty="0"/>
+              <a:t>Hints: </a:t>
+            </a:r>
+          </a:p>
+          <a:p>
+            <a:pPr lvl="1"/>
+            <a:r>
+              <a:rPr lang="en-US" dirty="0"/>
+              <a:t> Remember that 0x20 of metadata</a:t>
+            </a:r>
+          </a:p>
+          <a:p>
+            <a:pPr lvl="1"/>
+            <a:r>
+              <a:rPr lang="en-US" dirty="0"/>
+              <a:t>Read through the source code to see what is going on</a:t>
+            </a:r>
+          </a:p>
+        </p:txBody>
+      </p:sp>
     </p:spTree>
     <p:extLst>
       <p:ext uri="{BB962C8B-B14F-4D97-AF65-F5344CB8AC3E}">
-        <p14:creationId xmlns:p14="http://schemas.microsoft.com/office/powerpoint/2010/main" val="2852268455"/>
+        <p14:creationId xmlns:p14="http://schemas.microsoft.com/office/powerpoint/2010/main" val="2527480506"/>
       </p:ext>
     </p:extLst>
   </p:cSld>
@@ -36208,6 +36118,97 @@
           </p:cNvGraphicFramePr>
           <p:nvPr>
             <p:ph idx="1"/>
+          </p:nvPr>
+        </p:nvGraphicFramePr>
+        <p:xfrm>
+          <a:off x="628650" y="1236541"/>
+          <a:ext cx="7886700" cy="3263504"/>
+        </p:xfrm>
+        <a:graphic>
+          <a:graphicData uri="http://schemas.openxmlformats.org/drawingml/2006/diagram">
+            <dgm:relIds xmlns:dgm="http://schemas.openxmlformats.org/drawingml/2006/diagram" xmlns:r="http://schemas.openxmlformats.org/officeDocument/2006/relationships" r:dm="rId2" r:lo="rId3" r:qs="rId4" r:cs="rId5"/>
+          </a:graphicData>
+        </a:graphic>
+      </p:graphicFrame>
+    </p:spTree>
+    <p:extLst>
+      <p:ext uri="{BB962C8B-B14F-4D97-AF65-F5344CB8AC3E}">
+        <p14:creationId xmlns:p14="http://schemas.microsoft.com/office/powerpoint/2010/main" val="2852268455"/>
+      </p:ext>
+    </p:extLst>
+  </p:cSld>
+  <p:clrMapOvr>
+    <a:masterClrMapping/>
+  </p:clrMapOvr>
+</p:sld>
+</file>
+
+<file path=ppt/slides/slide32.xml><?xml version="1.0" encoding="utf-8"?>
+<p:sld xmlns:a="http://schemas.openxmlformats.org/drawingml/2006/main" xmlns:r="http://schemas.openxmlformats.org/officeDocument/2006/relationships" xmlns:p="http://schemas.openxmlformats.org/presentationml/2006/main">
+  <p:cSld>
+    <p:spTree>
+      <p:nvGrpSpPr>
+        <p:cNvPr id="1" name=""/>
+        <p:cNvGrpSpPr/>
+        <p:nvPr/>
+      </p:nvGrpSpPr>
+      <p:grpSpPr>
+        <a:xfrm>
+          <a:off x="0" y="0"/>
+          <a:ext cx="0" cy="0"/>
+          <a:chOff x="0" y="0"/>
+          <a:chExt cx="0" cy="0"/>
+        </a:xfrm>
+      </p:grpSpPr>
+      <p:sp>
+        <p:nvSpPr>
+          <p:cNvPr id="2" name="Title 1">
+            <a:extLst>
+              <a:ext uri="{FF2B5EF4-FFF2-40B4-BE49-F238E27FC236}">
+                <a16:creationId xmlns:a16="http://schemas.microsoft.com/office/drawing/2014/main" id="{F90744CA-AA12-694B-9EFD-DAE3C6B34B65}"/>
+              </a:ext>
+            </a:extLst>
+          </p:cNvPr>
+          <p:cNvSpPr>
+            <a:spLocks noGrp="1"/>
+          </p:cNvSpPr>
+          <p:nvPr>
+            <p:ph type="title"/>
+          </p:nvPr>
+        </p:nvSpPr>
+        <p:spPr>
+          <a:xfrm>
+            <a:off x="628650" y="273847"/>
+            <a:ext cx="7886700" cy="994172"/>
+          </a:xfrm>
+        </p:spPr>
+        <p:txBody>
+          <a:bodyPr anchor="ctr">
+            <a:normAutofit/>
+          </a:bodyPr>
+          <a:lstStyle/>
+          <a:p>
+            <a:r>
+              <a:rPr lang="en-US" dirty="0"/>
+              <a:t>Flow of the Attack</a:t>
+            </a:r>
+          </a:p>
+        </p:txBody>
+      </p:sp>
+      <p:graphicFrame>
+        <p:nvGraphicFramePr>
+          <p:cNvPr id="7" name="Content Placeholder 2">
+            <a:extLst>
+              <a:ext uri="{FF2B5EF4-FFF2-40B4-BE49-F238E27FC236}">
+                <a16:creationId xmlns:a16="http://schemas.microsoft.com/office/drawing/2014/main" id="{16AFF43D-D95F-43D7-9B17-22E96F279462}"/>
+              </a:ext>
+            </a:extLst>
+          </p:cNvPr>
+          <p:cNvGraphicFramePr>
+            <a:graphicFrameLocks noGrp="1"/>
+          </p:cNvGraphicFramePr>
+          <p:nvPr>
+            <p:ph idx="1"/>
             <p:extLst>
               <p:ext uri="{D42A27DB-BD31-4B8C-83A1-F6EECF244321}">
                 <p14:modId xmlns:p14="http://schemas.microsoft.com/office/powerpoint/2010/main" val="3693824306"/>
@@ -36238,7 +36239,7 @@
 </p:sld>
 </file>
 
-<file path=ppt/slides/slide32.xml><?xml version="1.0" encoding="utf-8"?>
+<file path=ppt/slides/slide33.xml><?xml version="1.0" encoding="utf-8"?>
 <p:sld xmlns:a="http://schemas.openxmlformats.org/drawingml/2006/main" xmlns:r="http://schemas.openxmlformats.org/officeDocument/2006/relationships" xmlns:p="http://schemas.openxmlformats.org/presentationml/2006/main">
   <p:cSld>
     <p:spTree>
@@ -36541,7 +36542,7 @@
 </p:sld>
 </file>
 
-<file path=ppt/slides/slide33.xml><?xml version="1.0" encoding="utf-8"?>
+<file path=ppt/slides/slide34.xml><?xml version="1.0" encoding="utf-8"?>
 <p:sld xmlns:a="http://schemas.openxmlformats.org/drawingml/2006/main" xmlns:r="http://schemas.openxmlformats.org/officeDocument/2006/relationships" xmlns:p="http://schemas.openxmlformats.org/presentationml/2006/main">
   <p:cSld>
     <p:spTree>
@@ -36847,7 +36848,7 @@
 </p:sld>
 </file>
 
-<file path=ppt/slides/slide34.xml><?xml version="1.0" encoding="utf-8"?>
+<file path=ppt/slides/slide35.xml><?xml version="1.0" encoding="utf-8"?>
 <p:sld xmlns:a="http://schemas.openxmlformats.org/drawingml/2006/main" xmlns:r="http://schemas.openxmlformats.org/officeDocument/2006/relationships" xmlns:p="http://schemas.openxmlformats.org/presentationml/2006/main">
   <p:cSld>
     <p:spTree>
@@ -37142,7 +37143,7 @@
 </p:sld>
 </file>
 
-<file path=ppt/slides/slide35.xml><?xml version="1.0" encoding="utf-8"?>
+<file path=ppt/slides/slide36.xml><?xml version="1.0" encoding="utf-8"?>
 <p:sld xmlns:a="http://schemas.openxmlformats.org/drawingml/2006/main" xmlns:r="http://schemas.openxmlformats.org/officeDocument/2006/relationships" xmlns:p="http://schemas.openxmlformats.org/presentationml/2006/main">
   <p:cSld>
     <p:spTree>
@@ -37279,7 +37280,7 @@
 </p:sld>
 </file>
 
-<file path=ppt/slides/slide36.xml><?xml version="1.0" encoding="utf-8"?>
+<file path=ppt/slides/slide37.xml><?xml version="1.0" encoding="utf-8"?>
 <p:sld xmlns:a="http://schemas.openxmlformats.org/drawingml/2006/main" xmlns:r="http://schemas.openxmlformats.org/officeDocument/2006/relationships" xmlns:p="http://schemas.openxmlformats.org/presentationml/2006/main">
   <p:cSld>
     <p:spTree>
@@ -37375,7 +37376,7 @@
 </p:sld>
 </file>
 
-<file path=ppt/slides/slide37.xml><?xml version="1.0" encoding="utf-8"?>
+<file path=ppt/slides/slide38.xml><?xml version="1.0" encoding="utf-8"?>
 <p:sld xmlns:a="http://schemas.openxmlformats.org/drawingml/2006/main" xmlns:r="http://schemas.openxmlformats.org/officeDocument/2006/relationships" xmlns:p="http://schemas.openxmlformats.org/presentationml/2006/main">
   <p:cSld>
     <p:spTree>
@@ -38092,7 +38093,7 @@
 </p:sld>
 </file>
 
-<file path=ppt/slides/slide38.xml><?xml version="1.0" encoding="utf-8"?>
+<file path=ppt/slides/slide39.xml><?xml version="1.0" encoding="utf-8"?>
 <p:sld xmlns:a="http://schemas.openxmlformats.org/drawingml/2006/main" xmlns:r="http://schemas.openxmlformats.org/officeDocument/2006/relationships" xmlns:p="http://schemas.openxmlformats.org/presentationml/2006/main">
   <p:cSld>
     <p:spTree>
@@ -38836,7 +38837,299 @@
 </p:sld>
 </file>
 
-<file path=ppt/slides/slide39.xml><?xml version="1.0" encoding="utf-8"?>
+<file path=ppt/slides/slide4.xml><?xml version="1.0" encoding="utf-8"?>
+<p:sld xmlns:a="http://schemas.openxmlformats.org/drawingml/2006/main" xmlns:r="http://schemas.openxmlformats.org/officeDocument/2006/relationships" xmlns:p="http://schemas.openxmlformats.org/presentationml/2006/main">
+  <p:cSld>
+    <p:spTree>
+      <p:nvGrpSpPr>
+        <p:cNvPr id="1" name=""/>
+        <p:cNvGrpSpPr/>
+        <p:nvPr/>
+      </p:nvGrpSpPr>
+      <p:grpSpPr>
+        <a:xfrm>
+          <a:off x="0" y="0"/>
+          <a:ext cx="0" cy="0"/>
+          <a:chOff x="0" y="0"/>
+          <a:chExt cx="0" cy="0"/>
+        </a:xfrm>
+      </p:grpSpPr>
+      <p:sp>
+        <p:nvSpPr>
+          <p:cNvPr id="2" name="Title 1">
+            <a:extLst>
+              <a:ext uri="{FF2B5EF4-FFF2-40B4-BE49-F238E27FC236}">
+                <a16:creationId xmlns:a16="http://schemas.microsoft.com/office/drawing/2014/main" id="{496A2660-C8FE-1445-B170-34232396C7B1}"/>
+              </a:ext>
+            </a:extLst>
+          </p:cNvPr>
+          <p:cNvSpPr>
+            <a:spLocks noGrp="1"/>
+          </p:cNvSpPr>
+          <p:nvPr>
+            <p:ph type="title"/>
+          </p:nvPr>
+        </p:nvSpPr>
+        <p:spPr/>
+        <p:txBody>
+          <a:bodyPr/>
+          <a:lstStyle/>
+          <a:p>
+            <a:r>
+              <a:rPr lang="en-US" dirty="0"/>
+              <a:t>Top Chunk - 2</a:t>
+            </a:r>
+          </a:p>
+        </p:txBody>
+      </p:sp>
+      <p:sp>
+        <p:nvSpPr>
+          <p:cNvPr id="3" name="Content Placeholder 2">
+            <a:extLst>
+              <a:ext uri="{FF2B5EF4-FFF2-40B4-BE49-F238E27FC236}">
+                <a16:creationId xmlns:a16="http://schemas.microsoft.com/office/drawing/2014/main" id="{19A651E9-27DF-FA46-9C12-B918D240929A}"/>
+              </a:ext>
+            </a:extLst>
+          </p:cNvPr>
+          <p:cNvSpPr>
+            <a:spLocks noGrp="1"/>
+          </p:cNvSpPr>
+          <p:nvPr>
+            <p:ph idx="1"/>
+          </p:nvPr>
+        </p:nvSpPr>
+        <p:spPr>
+          <a:xfrm>
+            <a:off x="628650" y="1236540"/>
+            <a:ext cx="4506620" cy="3814853"/>
+          </a:xfrm>
+        </p:spPr>
+        <p:txBody>
+          <a:bodyPr>
+            <a:normAutofit/>
+          </a:bodyPr>
+          <a:lstStyle/>
+          <a:p>
+            <a:r>
+              <a:rPr lang="en-US" dirty="0"/>
+              <a:t>Size: </a:t>
+            </a:r>
+          </a:p>
+          <a:p>
+            <a:pPr lvl="1"/>
+            <a:r>
+              <a:rPr lang="en-US" dirty="0"/>
+              <a:t>The remaining size from the original </a:t>
+            </a:r>
+            <a:r>
+              <a:rPr lang="en-US" i="1" dirty="0" err="1"/>
+              <a:t>sbrk</a:t>
+            </a:r>
+            <a:r>
+              <a:rPr lang="en-US" dirty="0"/>
+              <a:t> allocation</a:t>
+            </a:r>
+          </a:p>
+          <a:p>
+            <a:r>
+              <a:rPr lang="en-US" dirty="0" err="1"/>
+              <a:t>prev_inuse</a:t>
+            </a:r>
+            <a:r>
+              <a:rPr lang="en-US" dirty="0"/>
+              <a:t> is ALWAYS set</a:t>
+            </a:r>
+          </a:p>
+          <a:p>
+            <a:r>
+              <a:rPr lang="en-US" dirty="0"/>
+              <a:t>Unused fields: </a:t>
+            </a:r>
+          </a:p>
+          <a:p>
+            <a:pPr lvl="1"/>
+            <a:r>
+              <a:rPr lang="en-US" dirty="0"/>
+              <a:t>prev_size, fd and bk are NOT used on the top chunk</a:t>
+            </a:r>
+          </a:p>
+        </p:txBody>
+      </p:sp>
+      <p:pic>
+        <p:nvPicPr>
+          <p:cNvPr id="5" name="Picture 4" descr="Top Chunk">
+            <a:extLst>
+              <a:ext uri="{FF2B5EF4-FFF2-40B4-BE49-F238E27FC236}">
+                <a16:creationId xmlns:a16="http://schemas.microsoft.com/office/drawing/2014/main" id="{CEE51AF2-F9D0-8942-876F-E0AD7F4853B3}"/>
+              </a:ext>
+            </a:extLst>
+          </p:cNvPr>
+          <p:cNvPicPr>
+            <a:picLocks noChangeAspect="1"/>
+          </p:cNvPicPr>
+          <p:nvPr/>
+        </p:nvPicPr>
+        <p:blipFill>
+          <a:blip r:embed="rId2"/>
+          <a:stretch>
+            <a:fillRect/>
+          </a:stretch>
+        </p:blipFill>
+        <p:spPr>
+          <a:xfrm>
+            <a:off x="6222326" y="273847"/>
+            <a:ext cx="2655376" cy="4085193"/>
+          </a:xfrm>
+          <a:prstGeom prst="rect">
+            <a:avLst/>
+          </a:prstGeom>
+        </p:spPr>
+      </p:pic>
+      <p:cxnSp>
+        <p:nvCxnSpPr>
+          <p:cNvPr id="6" name="Straight Arrow Connector 5">
+            <a:extLst>
+              <a:ext uri="{FF2B5EF4-FFF2-40B4-BE49-F238E27FC236}">
+                <a16:creationId xmlns:a16="http://schemas.microsoft.com/office/drawing/2014/main" id="{8DA1D707-D95D-5141-9BAC-9B2EC095D01E}"/>
+              </a:ext>
+            </a:extLst>
+          </p:cNvPr>
+          <p:cNvCxnSpPr>
+            <a:cxnSpLocks/>
+          </p:cNvCxnSpPr>
+          <p:nvPr/>
+        </p:nvCxnSpPr>
+        <p:spPr>
+          <a:xfrm>
+            <a:off x="5449662" y="1387088"/>
+            <a:ext cx="719601" cy="0"/>
+          </a:xfrm>
+          <a:prstGeom prst="straightConnector1">
+            <a:avLst/>
+          </a:prstGeom>
+          <a:ln w="57150">
+            <a:solidFill>
+              <a:srgbClr val="FF0000"/>
+            </a:solidFill>
+            <a:tailEnd type="triangle"/>
+          </a:ln>
+        </p:spPr>
+        <p:style>
+          <a:lnRef idx="1">
+            <a:schemeClr val="accent1"/>
+          </a:lnRef>
+          <a:fillRef idx="0">
+            <a:schemeClr val="accent1"/>
+          </a:fillRef>
+          <a:effectRef idx="0">
+            <a:schemeClr val="accent1"/>
+          </a:effectRef>
+          <a:fontRef idx="minor">
+            <a:schemeClr val="tx1"/>
+          </a:fontRef>
+        </p:style>
+      </p:cxnSp>
+      <p:cxnSp>
+        <p:nvCxnSpPr>
+          <p:cNvPr id="7" name="Straight Connector 6">
+            <a:extLst>
+              <a:ext uri="{FF2B5EF4-FFF2-40B4-BE49-F238E27FC236}">
+                <a16:creationId xmlns:a16="http://schemas.microsoft.com/office/drawing/2014/main" id="{825AABEF-A152-B94A-993C-C49238F2EC7A}"/>
+              </a:ext>
+            </a:extLst>
+          </p:cNvPr>
+          <p:cNvCxnSpPr>
+            <a:cxnSpLocks/>
+          </p:cNvCxnSpPr>
+          <p:nvPr/>
+        </p:nvCxnSpPr>
+        <p:spPr>
+          <a:xfrm>
+            <a:off x="5477166" y="1387088"/>
+            <a:ext cx="17905" cy="2244135"/>
+          </a:xfrm>
+          <a:prstGeom prst="line">
+            <a:avLst/>
+          </a:prstGeom>
+          <a:ln w="47625">
+            <a:solidFill>
+              <a:srgbClr val="FF0000"/>
+            </a:solidFill>
+          </a:ln>
+        </p:spPr>
+        <p:style>
+          <a:lnRef idx="1">
+            <a:schemeClr val="accent1"/>
+          </a:lnRef>
+          <a:fillRef idx="0">
+            <a:schemeClr val="accent1"/>
+          </a:fillRef>
+          <a:effectRef idx="0">
+            <a:schemeClr val="accent1"/>
+          </a:effectRef>
+          <a:fontRef idx="minor">
+            <a:schemeClr val="tx1"/>
+          </a:fontRef>
+        </p:style>
+      </p:cxnSp>
+      <p:cxnSp>
+        <p:nvCxnSpPr>
+          <p:cNvPr id="8" name="Straight Arrow Connector 7">
+            <a:extLst>
+              <a:ext uri="{FF2B5EF4-FFF2-40B4-BE49-F238E27FC236}">
+                <a16:creationId xmlns:a16="http://schemas.microsoft.com/office/drawing/2014/main" id="{11D7D034-34AC-F041-A6F7-141B41F57537}"/>
+              </a:ext>
+            </a:extLst>
+          </p:cNvPr>
+          <p:cNvCxnSpPr>
+            <a:cxnSpLocks/>
+          </p:cNvCxnSpPr>
+          <p:nvPr/>
+        </p:nvCxnSpPr>
+        <p:spPr>
+          <a:xfrm>
+            <a:off x="5495071" y="3631223"/>
+            <a:ext cx="719601" cy="0"/>
+          </a:xfrm>
+          <a:prstGeom prst="straightConnector1">
+            <a:avLst/>
+          </a:prstGeom>
+          <a:ln w="57150">
+            <a:solidFill>
+              <a:srgbClr val="FF0000"/>
+            </a:solidFill>
+            <a:tailEnd type="triangle"/>
+          </a:ln>
+        </p:spPr>
+        <p:style>
+          <a:lnRef idx="1">
+            <a:schemeClr val="accent1"/>
+          </a:lnRef>
+          <a:fillRef idx="0">
+            <a:schemeClr val="accent1"/>
+          </a:fillRef>
+          <a:effectRef idx="0">
+            <a:schemeClr val="accent1"/>
+          </a:effectRef>
+          <a:fontRef idx="minor">
+            <a:schemeClr val="tx1"/>
+          </a:fontRef>
+        </p:style>
+      </p:cxnSp>
+    </p:spTree>
+    <p:extLst>
+      <p:ext uri="{BB962C8B-B14F-4D97-AF65-F5344CB8AC3E}">
+        <p14:creationId xmlns:p14="http://schemas.microsoft.com/office/powerpoint/2010/main" val="4193465238"/>
+      </p:ext>
+    </p:extLst>
+  </p:cSld>
+  <p:clrMapOvr>
+    <a:masterClrMapping/>
+  </p:clrMapOvr>
+</p:sld>
+</file>
+
+<file path=ppt/slides/slide40.xml><?xml version="1.0" encoding="utf-8"?>
 <p:sld xmlns:a="http://schemas.openxmlformats.org/drawingml/2006/main" xmlns:r="http://schemas.openxmlformats.org/officeDocument/2006/relationships" xmlns:p="http://schemas.openxmlformats.org/presentationml/2006/main">
   <p:cSld>
     <p:spTree>
@@ -39743,299 +40036,7 @@
 </p:sld>
 </file>
 
-<file path=ppt/slides/slide4.xml><?xml version="1.0" encoding="utf-8"?>
-<p:sld xmlns:a="http://schemas.openxmlformats.org/drawingml/2006/main" xmlns:r="http://schemas.openxmlformats.org/officeDocument/2006/relationships" xmlns:p="http://schemas.openxmlformats.org/presentationml/2006/main">
-  <p:cSld>
-    <p:spTree>
-      <p:nvGrpSpPr>
-        <p:cNvPr id="1" name=""/>
-        <p:cNvGrpSpPr/>
-        <p:nvPr/>
-      </p:nvGrpSpPr>
-      <p:grpSpPr>
-        <a:xfrm>
-          <a:off x="0" y="0"/>
-          <a:ext cx="0" cy="0"/>
-          <a:chOff x="0" y="0"/>
-          <a:chExt cx="0" cy="0"/>
-        </a:xfrm>
-      </p:grpSpPr>
-      <p:sp>
-        <p:nvSpPr>
-          <p:cNvPr id="2" name="Title 1">
-            <a:extLst>
-              <a:ext uri="{FF2B5EF4-FFF2-40B4-BE49-F238E27FC236}">
-                <a16:creationId xmlns:a16="http://schemas.microsoft.com/office/drawing/2014/main" id="{496A2660-C8FE-1445-B170-34232396C7B1}"/>
-              </a:ext>
-            </a:extLst>
-          </p:cNvPr>
-          <p:cNvSpPr>
-            <a:spLocks noGrp="1"/>
-          </p:cNvSpPr>
-          <p:nvPr>
-            <p:ph type="title"/>
-          </p:nvPr>
-        </p:nvSpPr>
-        <p:spPr/>
-        <p:txBody>
-          <a:bodyPr/>
-          <a:lstStyle/>
-          <a:p>
-            <a:r>
-              <a:rPr lang="en-US" dirty="0"/>
-              <a:t>Top Chunk - 2</a:t>
-            </a:r>
-          </a:p>
-        </p:txBody>
-      </p:sp>
-      <p:sp>
-        <p:nvSpPr>
-          <p:cNvPr id="3" name="Content Placeholder 2">
-            <a:extLst>
-              <a:ext uri="{FF2B5EF4-FFF2-40B4-BE49-F238E27FC236}">
-                <a16:creationId xmlns:a16="http://schemas.microsoft.com/office/drawing/2014/main" id="{19A651E9-27DF-FA46-9C12-B918D240929A}"/>
-              </a:ext>
-            </a:extLst>
-          </p:cNvPr>
-          <p:cNvSpPr>
-            <a:spLocks noGrp="1"/>
-          </p:cNvSpPr>
-          <p:nvPr>
-            <p:ph idx="1"/>
-          </p:nvPr>
-        </p:nvSpPr>
-        <p:spPr>
-          <a:xfrm>
-            <a:off x="628650" y="1236540"/>
-            <a:ext cx="4506620" cy="3814853"/>
-          </a:xfrm>
-        </p:spPr>
-        <p:txBody>
-          <a:bodyPr>
-            <a:normAutofit/>
-          </a:bodyPr>
-          <a:lstStyle/>
-          <a:p>
-            <a:r>
-              <a:rPr lang="en-US" dirty="0"/>
-              <a:t>Size: </a:t>
-            </a:r>
-          </a:p>
-          <a:p>
-            <a:pPr lvl="1"/>
-            <a:r>
-              <a:rPr lang="en-US" dirty="0"/>
-              <a:t>The remaining size from the original </a:t>
-            </a:r>
-            <a:r>
-              <a:rPr lang="en-US" i="1" dirty="0" err="1"/>
-              <a:t>sbrk</a:t>
-            </a:r>
-            <a:r>
-              <a:rPr lang="en-US" dirty="0"/>
-              <a:t> allocation</a:t>
-            </a:r>
-          </a:p>
-          <a:p>
-            <a:r>
-              <a:rPr lang="en-US" dirty="0" err="1"/>
-              <a:t>prev_inuse</a:t>
-            </a:r>
-            <a:r>
-              <a:rPr lang="en-US" dirty="0"/>
-              <a:t> is ALWAYS set</a:t>
-            </a:r>
-          </a:p>
-          <a:p>
-            <a:r>
-              <a:rPr lang="en-US" dirty="0"/>
-              <a:t>Unused fields: </a:t>
-            </a:r>
-          </a:p>
-          <a:p>
-            <a:pPr lvl="1"/>
-            <a:r>
-              <a:rPr lang="en-US" dirty="0"/>
-              <a:t>prev_size, fd and bk are NOT used on the top chunk</a:t>
-            </a:r>
-          </a:p>
-        </p:txBody>
-      </p:sp>
-      <p:pic>
-        <p:nvPicPr>
-          <p:cNvPr id="5" name="Picture 4" descr="Top Chunk">
-            <a:extLst>
-              <a:ext uri="{FF2B5EF4-FFF2-40B4-BE49-F238E27FC236}">
-                <a16:creationId xmlns:a16="http://schemas.microsoft.com/office/drawing/2014/main" id="{CEE51AF2-F9D0-8942-876F-E0AD7F4853B3}"/>
-              </a:ext>
-            </a:extLst>
-          </p:cNvPr>
-          <p:cNvPicPr>
-            <a:picLocks noChangeAspect="1"/>
-          </p:cNvPicPr>
-          <p:nvPr/>
-        </p:nvPicPr>
-        <p:blipFill>
-          <a:blip r:embed="rId2"/>
-          <a:stretch>
-            <a:fillRect/>
-          </a:stretch>
-        </p:blipFill>
-        <p:spPr>
-          <a:xfrm>
-            <a:off x="6222326" y="273847"/>
-            <a:ext cx="2655376" cy="4085193"/>
-          </a:xfrm>
-          <a:prstGeom prst="rect">
-            <a:avLst/>
-          </a:prstGeom>
-        </p:spPr>
-      </p:pic>
-      <p:cxnSp>
-        <p:nvCxnSpPr>
-          <p:cNvPr id="6" name="Straight Arrow Connector 5">
-            <a:extLst>
-              <a:ext uri="{FF2B5EF4-FFF2-40B4-BE49-F238E27FC236}">
-                <a16:creationId xmlns:a16="http://schemas.microsoft.com/office/drawing/2014/main" id="{8DA1D707-D95D-5141-9BAC-9B2EC095D01E}"/>
-              </a:ext>
-            </a:extLst>
-          </p:cNvPr>
-          <p:cNvCxnSpPr>
-            <a:cxnSpLocks/>
-          </p:cNvCxnSpPr>
-          <p:nvPr/>
-        </p:nvCxnSpPr>
-        <p:spPr>
-          <a:xfrm>
-            <a:off x="5449662" y="1387088"/>
-            <a:ext cx="719601" cy="0"/>
-          </a:xfrm>
-          <a:prstGeom prst="straightConnector1">
-            <a:avLst/>
-          </a:prstGeom>
-          <a:ln w="57150">
-            <a:solidFill>
-              <a:srgbClr val="FF0000"/>
-            </a:solidFill>
-            <a:tailEnd type="triangle"/>
-          </a:ln>
-        </p:spPr>
-        <p:style>
-          <a:lnRef idx="1">
-            <a:schemeClr val="accent1"/>
-          </a:lnRef>
-          <a:fillRef idx="0">
-            <a:schemeClr val="accent1"/>
-          </a:fillRef>
-          <a:effectRef idx="0">
-            <a:schemeClr val="accent1"/>
-          </a:effectRef>
-          <a:fontRef idx="minor">
-            <a:schemeClr val="tx1"/>
-          </a:fontRef>
-        </p:style>
-      </p:cxnSp>
-      <p:cxnSp>
-        <p:nvCxnSpPr>
-          <p:cNvPr id="7" name="Straight Connector 6">
-            <a:extLst>
-              <a:ext uri="{FF2B5EF4-FFF2-40B4-BE49-F238E27FC236}">
-                <a16:creationId xmlns:a16="http://schemas.microsoft.com/office/drawing/2014/main" id="{825AABEF-A152-B94A-993C-C49238F2EC7A}"/>
-              </a:ext>
-            </a:extLst>
-          </p:cNvPr>
-          <p:cNvCxnSpPr>
-            <a:cxnSpLocks/>
-          </p:cNvCxnSpPr>
-          <p:nvPr/>
-        </p:nvCxnSpPr>
-        <p:spPr>
-          <a:xfrm>
-            <a:off x="5477166" y="1387088"/>
-            <a:ext cx="17905" cy="2244135"/>
-          </a:xfrm>
-          <a:prstGeom prst="line">
-            <a:avLst/>
-          </a:prstGeom>
-          <a:ln w="47625">
-            <a:solidFill>
-              <a:srgbClr val="FF0000"/>
-            </a:solidFill>
-          </a:ln>
-        </p:spPr>
-        <p:style>
-          <a:lnRef idx="1">
-            <a:schemeClr val="accent1"/>
-          </a:lnRef>
-          <a:fillRef idx="0">
-            <a:schemeClr val="accent1"/>
-          </a:fillRef>
-          <a:effectRef idx="0">
-            <a:schemeClr val="accent1"/>
-          </a:effectRef>
-          <a:fontRef idx="minor">
-            <a:schemeClr val="tx1"/>
-          </a:fontRef>
-        </p:style>
-      </p:cxnSp>
-      <p:cxnSp>
-        <p:nvCxnSpPr>
-          <p:cNvPr id="8" name="Straight Arrow Connector 7">
-            <a:extLst>
-              <a:ext uri="{FF2B5EF4-FFF2-40B4-BE49-F238E27FC236}">
-                <a16:creationId xmlns:a16="http://schemas.microsoft.com/office/drawing/2014/main" id="{11D7D034-34AC-F041-A6F7-141B41F57537}"/>
-              </a:ext>
-            </a:extLst>
-          </p:cNvPr>
-          <p:cNvCxnSpPr>
-            <a:cxnSpLocks/>
-          </p:cNvCxnSpPr>
-          <p:nvPr/>
-        </p:nvCxnSpPr>
-        <p:spPr>
-          <a:xfrm>
-            <a:off x="5495071" y="3631223"/>
-            <a:ext cx="719601" cy="0"/>
-          </a:xfrm>
-          <a:prstGeom prst="straightConnector1">
-            <a:avLst/>
-          </a:prstGeom>
-          <a:ln w="57150">
-            <a:solidFill>
-              <a:srgbClr val="FF0000"/>
-            </a:solidFill>
-            <a:tailEnd type="triangle"/>
-          </a:ln>
-        </p:spPr>
-        <p:style>
-          <a:lnRef idx="1">
-            <a:schemeClr val="accent1"/>
-          </a:lnRef>
-          <a:fillRef idx="0">
-            <a:schemeClr val="accent1"/>
-          </a:fillRef>
-          <a:effectRef idx="0">
-            <a:schemeClr val="accent1"/>
-          </a:effectRef>
-          <a:fontRef idx="minor">
-            <a:schemeClr val="tx1"/>
-          </a:fontRef>
-        </p:style>
-      </p:cxnSp>
-    </p:spTree>
-    <p:extLst>
-      <p:ext uri="{BB962C8B-B14F-4D97-AF65-F5344CB8AC3E}">
-        <p14:creationId xmlns:p14="http://schemas.microsoft.com/office/powerpoint/2010/main" val="4193465238"/>
-      </p:ext>
-    </p:extLst>
-  </p:cSld>
-  <p:clrMapOvr>
-    <a:masterClrMapping/>
-  </p:clrMapOvr>
-</p:sld>
-</file>
-
-<file path=ppt/slides/slide40.xml><?xml version="1.0" encoding="utf-8"?>
+<file path=ppt/slides/slide41.xml><?xml version="1.0" encoding="utf-8"?>
 <p:sld xmlns:a="http://schemas.openxmlformats.org/drawingml/2006/main" xmlns:r="http://schemas.openxmlformats.org/officeDocument/2006/relationships" xmlns:p="http://schemas.openxmlformats.org/presentationml/2006/main">
   <p:cSld>
     <p:spTree>
@@ -40746,7 +40747,7 @@
 </p:sld>
 </file>
 
-<file path=ppt/slides/slide41.xml><?xml version="1.0" encoding="utf-8"?>
+<file path=ppt/slides/slide42.xml><?xml version="1.0" encoding="utf-8"?>
 <p:sld xmlns:a="http://schemas.openxmlformats.org/drawingml/2006/main" xmlns:r="http://schemas.openxmlformats.org/officeDocument/2006/relationships" xmlns:p="http://schemas.openxmlformats.org/presentationml/2006/main">
   <p:cSld>
     <p:spTree>
@@ -40785,7 +40786,7 @@
         </p:blipFill>
         <p:spPr>
           <a:xfrm>
-            <a:off x="6764265" y="1878810"/>
+            <a:off x="5527997" y="1878809"/>
             <a:ext cx="2089709" cy="2763441"/>
           </a:xfrm>
           <a:prstGeom prst="rect">
@@ -40810,7 +40811,7 @@
         </p:nvSpPr>
         <p:spPr>
           <a:xfrm>
-            <a:off x="5535705" y="4203964"/>
+            <a:off x="4299437" y="4203963"/>
             <a:ext cx="1228559" cy="438287"/>
           </a:xfrm>
           <a:prstGeom prst="rect">
@@ -41004,7 +41005,7 @@
         </p:nvSpPr>
         <p:spPr>
           <a:xfrm>
-            <a:off x="5999567" y="4238441"/>
+            <a:off x="4763299" y="4238440"/>
             <a:ext cx="764697" cy="369332"/>
           </a:xfrm>
           <a:prstGeom prst="rect">
@@ -41043,7 +41044,7 @@
         </p:nvSpPr>
         <p:spPr>
           <a:xfrm>
-            <a:off x="5734450" y="1878809"/>
+            <a:off x="4498182" y="1878808"/>
             <a:ext cx="1140377" cy="369332"/>
           </a:xfrm>
           <a:prstGeom prst="rect">
@@ -41281,7 +41282,7 @@
         <p:spPr>
           <a:xfrm>
             <a:off x="629841" y="1063869"/>
-            <a:ext cx="5099428" cy="3455377"/>
+            <a:ext cx="4525633" cy="3455377"/>
           </a:xfrm>
           <a:prstGeom prst="rect">
             <a:avLst/>
@@ -41483,15 +41484,7 @@
           <a:p>
             <a:r>
               <a:rPr lang="en-US" dirty="0"/>
-              <a:t>Size = __</a:t>
-            </a:r>
-            <a:r>
-              <a:rPr lang="en-US" dirty="0" err="1"/>
-              <a:t>malloc_hook</a:t>
-            </a:r>
-            <a:r>
-              <a:rPr lang="en-US" dirty="0"/>
-              <a:t> – top chunk</a:t>
+              <a:t>Size = target – top chunk</a:t>
             </a:r>
           </a:p>
         </p:txBody>
@@ -41547,7 +41540,7 @@
         </p:nvCxnSpPr>
         <p:spPr>
           <a:xfrm>
-            <a:off x="5735746" y="1907112"/>
+            <a:off x="4499478" y="1907111"/>
             <a:ext cx="719601" cy="0"/>
           </a:xfrm>
           <a:prstGeom prst="straightConnector1">
@@ -41591,7 +41584,7 @@
         </p:nvCxnSpPr>
         <p:spPr>
           <a:xfrm flipH="1">
-            <a:off x="5734450" y="1878808"/>
+            <a:off x="4498182" y="1878807"/>
             <a:ext cx="2590" cy="2720309"/>
           </a:xfrm>
           <a:prstGeom prst="line">
@@ -41634,7 +41627,7 @@
         </p:nvCxnSpPr>
         <p:spPr>
           <a:xfrm>
-            <a:off x="5734450" y="4599117"/>
+            <a:off x="4498182" y="4599116"/>
             <a:ext cx="719601" cy="0"/>
           </a:xfrm>
           <a:prstGeom prst="straightConnector1">
@@ -41675,7 +41668,7 @@
 </p:sld>
 </file>
 
-<file path=ppt/slides/slide42.xml><?xml version="1.0" encoding="utf-8"?>
+<file path=ppt/slides/slide43.xml><?xml version="1.0" encoding="utf-8"?>
 <p:sld xmlns:a="http://schemas.openxmlformats.org/drawingml/2006/main" xmlns:r="http://schemas.openxmlformats.org/officeDocument/2006/relationships" xmlns:p="http://schemas.openxmlformats.org/presentationml/2006/main">
   <p:cSld>
     <p:spTree>
@@ -42536,7 +42529,7 @@
 </p:sld>
 </file>
 
-<file path=ppt/slides/slide43.xml><?xml version="1.0" encoding="utf-8"?>
+<file path=ppt/slides/slide44.xml><?xml version="1.0" encoding="utf-8"?>
 <p:sld xmlns:a="http://schemas.openxmlformats.org/drawingml/2006/main" xmlns:r="http://schemas.openxmlformats.org/officeDocument/2006/relationships" xmlns:p="http://schemas.openxmlformats.org/presentationml/2006/main">
   <p:cSld>
     <p:spTree>
@@ -42897,7 +42890,7 @@
 </p:sld>
 </file>
 
-<file path=ppt/slides/slide44.xml><?xml version="1.0" encoding="utf-8"?>
+<file path=ppt/slides/slide45.xml><?xml version="1.0" encoding="utf-8"?>
 <p:sld xmlns:a="http://schemas.openxmlformats.org/drawingml/2006/main" xmlns:r="http://schemas.openxmlformats.org/officeDocument/2006/relationships" xmlns:p="http://schemas.openxmlformats.org/presentationml/2006/main">
   <p:cSld>
     <p:spTree>
@@ -43062,7 +43055,7 @@
 </p:sld>
 </file>
 
-<file path=ppt/slides/slide45.xml><?xml version="1.0" encoding="utf-8"?>
+<file path=ppt/slides/slide46.xml><?xml version="1.0" encoding="utf-8"?>
 <p:sld xmlns:a="http://schemas.openxmlformats.org/drawingml/2006/main" xmlns:r="http://schemas.openxmlformats.org/officeDocument/2006/relationships" xmlns:p="http://schemas.openxmlformats.org/presentationml/2006/main">
   <p:cSld>
     <p:spTree>
@@ -43149,102 +43142,6 @@
     <p:extLst>
       <p:ext uri="{BB962C8B-B14F-4D97-AF65-F5344CB8AC3E}">
         <p14:creationId xmlns:p14="http://schemas.microsoft.com/office/powerpoint/2010/main" val="3595735604"/>
-      </p:ext>
-    </p:extLst>
-  </p:cSld>
-  <p:clrMapOvr>
-    <a:masterClrMapping/>
-  </p:clrMapOvr>
-</p:sld>
-</file>
-
-<file path=ppt/slides/slide46.xml><?xml version="1.0" encoding="utf-8"?>
-<p:sld xmlns:a="http://schemas.openxmlformats.org/drawingml/2006/main" xmlns:r="http://schemas.openxmlformats.org/officeDocument/2006/relationships" xmlns:p="http://schemas.openxmlformats.org/presentationml/2006/main">
-  <p:cSld>
-    <p:spTree>
-      <p:nvGrpSpPr>
-        <p:cNvPr id="1" name=""/>
-        <p:cNvGrpSpPr/>
-        <p:nvPr/>
-      </p:nvGrpSpPr>
-      <p:grpSpPr>
-        <a:xfrm>
-          <a:off x="0" y="0"/>
-          <a:ext cx="0" cy="0"/>
-          <a:chOff x="0" y="0"/>
-          <a:chExt cx="0" cy="0"/>
-        </a:xfrm>
-      </p:grpSpPr>
-      <p:sp>
-        <p:nvSpPr>
-          <p:cNvPr id="2" name="Title 1">
-            <a:extLst>
-              <a:ext uri="{FF2B5EF4-FFF2-40B4-BE49-F238E27FC236}">
-                <a16:creationId xmlns:a16="http://schemas.microsoft.com/office/drawing/2014/main" id="{F90744CA-AA12-694B-9EFD-DAE3C6B34B65}"/>
-              </a:ext>
-            </a:extLst>
-          </p:cNvPr>
-          <p:cNvSpPr>
-            <a:spLocks noGrp="1"/>
-          </p:cNvSpPr>
-          <p:nvPr>
-            <p:ph type="title"/>
-          </p:nvPr>
-        </p:nvSpPr>
-        <p:spPr>
-          <a:xfrm>
-            <a:off x="628650" y="273847"/>
-            <a:ext cx="7886700" cy="994172"/>
-          </a:xfrm>
-        </p:spPr>
-        <p:txBody>
-          <a:bodyPr anchor="ctr">
-            <a:normAutofit/>
-          </a:bodyPr>
-          <a:lstStyle/>
-          <a:p>
-            <a:r>
-              <a:rPr lang="en-US" dirty="0"/>
-              <a:t>Flow of the Attack</a:t>
-            </a:r>
-          </a:p>
-        </p:txBody>
-      </p:sp>
-      <p:graphicFrame>
-        <p:nvGraphicFramePr>
-          <p:cNvPr id="7" name="Content Placeholder 2">
-            <a:extLst>
-              <a:ext uri="{FF2B5EF4-FFF2-40B4-BE49-F238E27FC236}">
-                <a16:creationId xmlns:a16="http://schemas.microsoft.com/office/drawing/2014/main" id="{16AFF43D-D95F-43D7-9B17-22E96F279462}"/>
-              </a:ext>
-            </a:extLst>
-          </p:cNvPr>
-          <p:cNvGraphicFramePr>
-            <a:graphicFrameLocks noGrp="1"/>
-          </p:cNvGraphicFramePr>
-          <p:nvPr>
-            <p:ph idx="1"/>
-            <p:extLst>
-              <p:ext uri="{D42A27DB-BD31-4B8C-83A1-F6EECF244321}">
-                <p14:modId xmlns:p14="http://schemas.microsoft.com/office/powerpoint/2010/main" val="2551833715"/>
-              </p:ext>
-            </p:extLst>
-          </p:nvPr>
-        </p:nvGraphicFramePr>
-        <p:xfrm>
-          <a:off x="628650" y="1236541"/>
-          <a:ext cx="7886700" cy="3263504"/>
-        </p:xfrm>
-        <a:graphic>
-          <a:graphicData uri="http://schemas.openxmlformats.org/drawingml/2006/diagram">
-            <dgm:relIds xmlns:dgm="http://schemas.openxmlformats.org/drawingml/2006/diagram" xmlns:r="http://schemas.openxmlformats.org/officeDocument/2006/relationships" r:dm="rId2" r:lo="rId3" r:qs="rId4" r:cs="rId5"/>
-          </a:graphicData>
-        </a:graphic>
-      </p:graphicFrame>
-    </p:spTree>
-    <p:extLst>
-      <p:ext uri="{BB962C8B-B14F-4D97-AF65-F5344CB8AC3E}">
-        <p14:creationId xmlns:p14="http://schemas.microsoft.com/office/powerpoint/2010/main" val="2426609233"/>
       </p:ext>
     </p:extLst>
   </p:cSld>
@@ -43322,14 +43219,14 @@
             <p:ph idx="1"/>
             <p:extLst>
               <p:ext uri="{D42A27DB-BD31-4B8C-83A1-F6EECF244321}">
-                <p14:modId xmlns:p14="http://schemas.microsoft.com/office/powerpoint/2010/main" val="225848377"/>
+                <p14:modId xmlns:p14="http://schemas.microsoft.com/office/powerpoint/2010/main" val="2551833715"/>
               </p:ext>
             </p:extLst>
           </p:nvPr>
         </p:nvGraphicFramePr>
         <p:xfrm>
           <a:off x="628650" y="1236541"/>
-          <a:ext cx="7886700" cy="1637288"/>
+          <a:ext cx="7886700" cy="3263504"/>
         </p:xfrm>
         <a:graphic>
           <a:graphicData uri="http://schemas.openxmlformats.org/drawingml/2006/diagram">
@@ -43340,7 +43237,7 @@
     </p:spTree>
     <p:extLst>
       <p:ext uri="{BB962C8B-B14F-4D97-AF65-F5344CB8AC3E}">
-        <p14:creationId xmlns:p14="http://schemas.microsoft.com/office/powerpoint/2010/main" val="1539991312"/>
+        <p14:creationId xmlns:p14="http://schemas.microsoft.com/office/powerpoint/2010/main" val="2426609233"/>
       </p:ext>
     </p:extLst>
   </p:cSld>
@@ -43372,7 +43269,7 @@
           <p:cNvPr id="2" name="Title 1">
             <a:extLst>
               <a:ext uri="{FF2B5EF4-FFF2-40B4-BE49-F238E27FC236}">
-                <a16:creationId xmlns:a16="http://schemas.microsoft.com/office/drawing/2014/main" id="{A10A7709-FD6C-B04E-8F0B-FE511A82C787}"/>
+                <a16:creationId xmlns:a16="http://schemas.microsoft.com/office/drawing/2014/main" id="{F90744CA-AA12-694B-9EFD-DAE3C6B34B65}"/>
               </a:ext>
             </a:extLst>
           </p:cNvPr>
@@ -43397,99 +43294,46 @@
           <a:p>
             <a:r>
               <a:rPr lang="en-US" dirty="0"/>
-              <a:t>Overlap Chunk Over Target </a:t>
+              <a:t>Flow of the Attack</a:t>
             </a:r>
           </a:p>
         </p:txBody>
       </p:sp>
-      <p:sp>
-        <p:nvSpPr>
-          <p:cNvPr id="14" name="Content Placeholder 2">
+      <p:graphicFrame>
+        <p:nvGraphicFramePr>
+          <p:cNvPr id="7" name="Content Placeholder 2">
             <a:extLst>
               <a:ext uri="{FF2B5EF4-FFF2-40B4-BE49-F238E27FC236}">
-                <a16:creationId xmlns:a16="http://schemas.microsoft.com/office/drawing/2014/main" id="{A25A42B0-2650-4A72-B532-FA1013885883}"/>
+                <a16:creationId xmlns:a16="http://schemas.microsoft.com/office/drawing/2014/main" id="{16AFF43D-D95F-43D7-9B17-22E96F279462}"/>
               </a:ext>
             </a:extLst>
           </p:cNvPr>
-          <p:cNvSpPr>
-            <a:spLocks noGrp="1"/>
-          </p:cNvSpPr>
+          <p:cNvGraphicFramePr>
+            <a:graphicFrameLocks noGrp="1"/>
+          </p:cNvGraphicFramePr>
           <p:nvPr>
-            <p:ph sz="half" idx="1"/>
+            <p:ph idx="1"/>
+            <p:extLst>
+              <p:ext uri="{D42A27DB-BD31-4B8C-83A1-F6EECF244321}">
+                <p14:modId xmlns:p14="http://schemas.microsoft.com/office/powerpoint/2010/main" val="225848377"/>
+              </p:ext>
+            </p:extLst>
           </p:nvPr>
-        </p:nvSpPr>
-        <p:spPr>
-          <a:xfrm>
-            <a:off x="628650" y="1369219"/>
-            <a:ext cx="4648744" cy="3263504"/>
-          </a:xfrm>
-        </p:spPr>
-        <p:txBody>
-          <a:bodyPr>
-            <a:normAutofit/>
-          </a:bodyPr>
-          <a:lstStyle/>
-          <a:p>
-            <a:r>
-              <a:rPr lang="en-US" dirty="0"/>
-              <a:t>Top Chunk is RIGHT before the </a:t>
-            </a:r>
-            <a:r>
-              <a:rPr lang="en-US" b="1" i="1" dirty="0"/>
-              <a:t>target</a:t>
-            </a:r>
-          </a:p>
-          <a:p>
-            <a:r>
-              <a:rPr lang="en-US" dirty="0"/>
-              <a:t>To overwrite the target, we just allocate a chunk!</a:t>
-            </a:r>
-          </a:p>
-          <a:p>
-            <a:pPr lvl="1"/>
-            <a:r>
-              <a:rPr lang="en-US" dirty="0"/>
-              <a:t>Must get into step 7 (no other chunks in bins) </a:t>
-            </a:r>
-          </a:p>
-          <a:p>
-            <a:endParaRPr lang="en-US" dirty="0"/>
-          </a:p>
-        </p:txBody>
-      </p:sp>
-      <p:pic>
-        <p:nvPicPr>
-          <p:cNvPr id="6" name="Content Placeholder 5" descr="Top Chunk close to __malloc_hook">
-            <a:extLst>
-              <a:ext uri="{FF2B5EF4-FFF2-40B4-BE49-F238E27FC236}">
-                <a16:creationId xmlns:a16="http://schemas.microsoft.com/office/drawing/2014/main" id="{B40C0FC3-2632-424E-B07E-25682AC173B3}"/>
-              </a:ext>
-            </a:extLst>
-          </p:cNvPr>
-          <p:cNvPicPr>
-            <a:picLocks noGrp="1" noChangeAspect="1"/>
-          </p:cNvPicPr>
-          <p:nvPr>
-            <p:ph sz="half" idx="2"/>
-          </p:nvPr>
-        </p:nvPicPr>
-        <p:blipFill>
-          <a:blip r:embed="rId2"/>
-          <a:stretch>
-            <a:fillRect/>
-          </a:stretch>
-        </p:blipFill>
-        <p:spPr>
-          <a:xfrm>
-            <a:off x="5434148" y="1369219"/>
-            <a:ext cx="3075059" cy="2894172"/>
-          </a:xfrm>
-        </p:spPr>
-      </p:pic>
+        </p:nvGraphicFramePr>
+        <p:xfrm>
+          <a:off x="628650" y="1236541"/>
+          <a:ext cx="7886700" cy="1637288"/>
+        </p:xfrm>
+        <a:graphic>
+          <a:graphicData uri="http://schemas.openxmlformats.org/drawingml/2006/diagram">
+            <dgm:relIds xmlns:dgm="http://schemas.openxmlformats.org/drawingml/2006/diagram" xmlns:r="http://schemas.openxmlformats.org/officeDocument/2006/relationships" r:dm="rId2" r:lo="rId3" r:qs="rId4" r:cs="rId5"/>
+          </a:graphicData>
+        </a:graphic>
+      </p:graphicFrame>
     </p:spTree>
     <p:extLst>
       <p:ext uri="{BB962C8B-B14F-4D97-AF65-F5344CB8AC3E}">
-        <p14:creationId xmlns:p14="http://schemas.microsoft.com/office/powerpoint/2010/main" val="572446649"/>
+        <p14:creationId xmlns:p14="http://schemas.microsoft.com/office/powerpoint/2010/main" val="1539991312"/>
       </p:ext>
     </p:extLst>
   </p:cSld>
@@ -43546,17 +43390,72 @@
           <a:p>
             <a:r>
               <a:rPr lang="en-US" dirty="0"/>
-              <a:t>Overlap Chunk Over Target</a:t>
-            </a:r>
+              <a:t>Overlap Chunk Over Target </a:t>
+            </a:r>
+          </a:p>
+        </p:txBody>
+      </p:sp>
+      <p:sp>
+        <p:nvSpPr>
+          <p:cNvPr id="14" name="Content Placeholder 2">
+            <a:extLst>
+              <a:ext uri="{FF2B5EF4-FFF2-40B4-BE49-F238E27FC236}">
+                <a16:creationId xmlns:a16="http://schemas.microsoft.com/office/drawing/2014/main" id="{A25A42B0-2650-4A72-B532-FA1013885883}"/>
+              </a:ext>
+            </a:extLst>
+          </p:cNvPr>
+          <p:cNvSpPr>
+            <a:spLocks noGrp="1"/>
+          </p:cNvSpPr>
+          <p:nvPr>
+            <p:ph sz="half" idx="1"/>
+          </p:nvPr>
+        </p:nvSpPr>
+        <p:spPr>
+          <a:xfrm>
+            <a:off x="628650" y="1369219"/>
+            <a:ext cx="4648744" cy="3263504"/>
+          </a:xfrm>
+        </p:spPr>
+        <p:txBody>
+          <a:bodyPr>
+            <a:normAutofit/>
+          </a:bodyPr>
+          <a:lstStyle/>
+          <a:p>
+            <a:r>
+              <a:rPr lang="en-US" dirty="0"/>
+              <a:t>Top Chunk is RIGHT before the </a:t>
+            </a:r>
+            <a:r>
+              <a:rPr lang="en-US" b="1" i="1" dirty="0"/>
+              <a:t>target</a:t>
+            </a:r>
+          </a:p>
+          <a:p>
+            <a:r>
+              <a:rPr lang="en-US" dirty="0"/>
+              <a:t>To overwrite the target, we just allocate a chunk!</a:t>
+            </a:r>
+          </a:p>
+          <a:p>
+            <a:pPr lvl="1"/>
+            <a:r>
+              <a:rPr lang="en-US" dirty="0"/>
+              <a:t>Must get into step 7 (no other chunks in bins) </a:t>
+            </a:r>
+          </a:p>
+          <a:p>
+            <a:endParaRPr lang="en-US" dirty="0"/>
           </a:p>
         </p:txBody>
       </p:sp>
       <p:pic>
         <p:nvPicPr>
-          <p:cNvPr id="24" name="Content Placeholder 23" descr="Overlapping fake chunk on malloc hook">
+          <p:cNvPr id="6" name="Content Placeholder 5" descr="Top Chunk close to __malloc_hook">
             <a:extLst>
               <a:ext uri="{FF2B5EF4-FFF2-40B4-BE49-F238E27FC236}">
-                <a16:creationId xmlns:a16="http://schemas.microsoft.com/office/drawing/2014/main" id="{A8F3C739-EAF4-3C4F-8B63-F9774D3BB97A}"/>
+                <a16:creationId xmlns:a16="http://schemas.microsoft.com/office/drawing/2014/main" id="{B40C0FC3-2632-424E-B07E-25682AC173B3}"/>
               </a:ext>
             </a:extLst>
           </p:cNvPr>
@@ -43564,7 +43463,7 @@
             <a:picLocks noGrp="1" noChangeAspect="1"/>
           </p:cNvPicPr>
           <p:nvPr>
-            <p:ph sz="half" idx="1"/>
+            <p:ph sz="half" idx="2"/>
           </p:nvPr>
         </p:nvPicPr>
         <p:blipFill>
@@ -43575,74 +43474,15 @@
         </p:blipFill>
         <p:spPr>
           <a:xfrm>
-            <a:off x="4790076" y="1369218"/>
-            <a:ext cx="3474357" cy="3269983"/>
+            <a:off x="5434148" y="1369219"/>
+            <a:ext cx="3075059" cy="2894172"/>
           </a:xfrm>
         </p:spPr>
       </p:pic>
-      <p:sp>
-        <p:nvSpPr>
-          <p:cNvPr id="22" name="Content Placeholder 21">
-            <a:extLst>
-              <a:ext uri="{FF2B5EF4-FFF2-40B4-BE49-F238E27FC236}">
-                <a16:creationId xmlns:a16="http://schemas.microsoft.com/office/drawing/2014/main" id="{8DC6FE71-F634-CC43-AF63-6EA86497B900}"/>
-              </a:ext>
-            </a:extLst>
-          </p:cNvPr>
-          <p:cNvSpPr>
-            <a:spLocks noGrp="1"/>
-          </p:cNvSpPr>
-          <p:nvPr>
-            <p:ph sz="half" idx="2"/>
-          </p:nvPr>
-        </p:nvSpPr>
-        <p:spPr>
-          <a:xfrm>
-            <a:off x="771253" y="1369219"/>
-            <a:ext cx="3886200" cy="3263504"/>
-          </a:xfrm>
-        </p:spPr>
-        <p:txBody>
-          <a:bodyPr/>
-          <a:lstStyle/>
-          <a:p>
-            <a:r>
-              <a:rPr lang="en-US" i="1"/>
-              <a:t>Third</a:t>
-            </a:r>
-            <a:r>
-              <a:rPr lang="en-US"/>
-              <a:t> pointer</a:t>
-            </a:r>
-            <a:endParaRPr lang="en-US" i="1" dirty="0"/>
-          </a:p>
-          <a:p>
-            <a:r>
-              <a:rPr lang="en-US" dirty="0"/>
-              <a:t>Allocated over the </a:t>
-            </a:r>
-            <a:r>
-              <a:rPr lang="en-US" i="1" dirty="0"/>
-              <a:t>__</a:t>
-            </a:r>
-            <a:r>
-              <a:rPr lang="en-US" i="1" dirty="0" err="1"/>
-              <a:t>malloc_hook</a:t>
-            </a:r>
-            <a:r>
-              <a:rPr lang="en-US" dirty="0"/>
-              <a:t>!</a:t>
-            </a:r>
-          </a:p>
-          <a:p>
-            <a:endParaRPr lang="en-US" dirty="0"/>
-          </a:p>
-        </p:txBody>
-      </p:sp>
     </p:spTree>
     <p:extLst>
       <p:ext uri="{BB962C8B-B14F-4D97-AF65-F5344CB8AC3E}">
-        <p14:creationId xmlns:p14="http://schemas.microsoft.com/office/powerpoint/2010/main" val="3982501371"/>
+        <p14:creationId xmlns:p14="http://schemas.microsoft.com/office/powerpoint/2010/main" val="572446649"/>
       </p:ext>
     </p:extLst>
   </p:cSld>
@@ -44027,7 +43867,7 @@
             </a:pPr>
             <a:r>
               <a:rPr lang="en-US" sz="2100" b="1" dirty="0"/>
-              <a:t>Top Chunk Usage </a:t>
+              <a:t>Top Chunk Extension </a:t>
             </a:r>
           </a:p>
           <a:p>
@@ -44157,6 +43997,159 @@
           </a:p>
         </p:txBody>
       </p:sp>
+      <p:pic>
+        <p:nvPicPr>
+          <p:cNvPr id="24" name="Content Placeholder 23" descr="Overlapping fake chunk on malloc hook">
+            <a:extLst>
+              <a:ext uri="{FF2B5EF4-FFF2-40B4-BE49-F238E27FC236}">
+                <a16:creationId xmlns:a16="http://schemas.microsoft.com/office/drawing/2014/main" id="{A8F3C739-EAF4-3C4F-8B63-F9774D3BB97A}"/>
+              </a:ext>
+            </a:extLst>
+          </p:cNvPr>
+          <p:cNvPicPr>
+            <a:picLocks noGrp="1" noChangeAspect="1"/>
+          </p:cNvPicPr>
+          <p:nvPr>
+            <p:ph sz="half" idx="1"/>
+          </p:nvPr>
+        </p:nvPicPr>
+        <p:blipFill>
+          <a:blip r:embed="rId2"/>
+          <a:stretch>
+            <a:fillRect/>
+          </a:stretch>
+        </p:blipFill>
+        <p:spPr>
+          <a:xfrm>
+            <a:off x="4790076" y="1369218"/>
+            <a:ext cx="3474357" cy="3269983"/>
+          </a:xfrm>
+        </p:spPr>
+      </p:pic>
+      <p:sp>
+        <p:nvSpPr>
+          <p:cNvPr id="22" name="Content Placeholder 21">
+            <a:extLst>
+              <a:ext uri="{FF2B5EF4-FFF2-40B4-BE49-F238E27FC236}">
+                <a16:creationId xmlns:a16="http://schemas.microsoft.com/office/drawing/2014/main" id="{8DC6FE71-F634-CC43-AF63-6EA86497B900}"/>
+              </a:ext>
+            </a:extLst>
+          </p:cNvPr>
+          <p:cNvSpPr>
+            <a:spLocks noGrp="1"/>
+          </p:cNvSpPr>
+          <p:nvPr>
+            <p:ph sz="half" idx="2"/>
+          </p:nvPr>
+        </p:nvSpPr>
+        <p:spPr>
+          <a:xfrm>
+            <a:off x="771253" y="1369219"/>
+            <a:ext cx="3886200" cy="3263504"/>
+          </a:xfrm>
+        </p:spPr>
+        <p:txBody>
+          <a:bodyPr/>
+          <a:lstStyle/>
+          <a:p>
+            <a:r>
+              <a:rPr lang="en-US" i="1"/>
+              <a:t>Third</a:t>
+            </a:r>
+            <a:r>
+              <a:rPr lang="en-US"/>
+              <a:t> pointer</a:t>
+            </a:r>
+            <a:endParaRPr lang="en-US" i="1" dirty="0"/>
+          </a:p>
+          <a:p>
+            <a:r>
+              <a:rPr lang="en-US" dirty="0"/>
+              <a:t>Allocated over the </a:t>
+            </a:r>
+            <a:r>
+              <a:rPr lang="en-US" i="1" dirty="0"/>
+              <a:t>__</a:t>
+            </a:r>
+            <a:r>
+              <a:rPr lang="en-US" i="1" dirty="0" err="1"/>
+              <a:t>malloc_hook</a:t>
+            </a:r>
+            <a:r>
+              <a:rPr lang="en-US" dirty="0"/>
+              <a:t>!</a:t>
+            </a:r>
+          </a:p>
+          <a:p>
+            <a:endParaRPr lang="en-US" dirty="0"/>
+          </a:p>
+        </p:txBody>
+      </p:sp>
+    </p:spTree>
+    <p:extLst>
+      <p:ext uri="{BB962C8B-B14F-4D97-AF65-F5344CB8AC3E}">
+        <p14:creationId xmlns:p14="http://schemas.microsoft.com/office/powerpoint/2010/main" val="3982501371"/>
+      </p:ext>
+    </p:extLst>
+  </p:cSld>
+  <p:clrMapOvr>
+    <a:masterClrMapping/>
+  </p:clrMapOvr>
+</p:sld>
+</file>
+
+<file path=ppt/slides/slide51.xml><?xml version="1.0" encoding="utf-8"?>
+<p:sld xmlns:a="http://schemas.openxmlformats.org/drawingml/2006/main" xmlns:r="http://schemas.openxmlformats.org/officeDocument/2006/relationships" xmlns:p="http://schemas.openxmlformats.org/presentationml/2006/main">
+  <p:cSld>
+    <p:spTree>
+      <p:nvGrpSpPr>
+        <p:cNvPr id="1" name=""/>
+        <p:cNvGrpSpPr/>
+        <p:nvPr/>
+      </p:nvGrpSpPr>
+      <p:grpSpPr>
+        <a:xfrm>
+          <a:off x="0" y="0"/>
+          <a:ext cx="0" cy="0"/>
+          <a:chOff x="0" y="0"/>
+          <a:chExt cx="0" cy="0"/>
+        </a:xfrm>
+      </p:grpSpPr>
+      <p:sp>
+        <p:nvSpPr>
+          <p:cNvPr id="2" name="Title 1">
+            <a:extLst>
+              <a:ext uri="{FF2B5EF4-FFF2-40B4-BE49-F238E27FC236}">
+                <a16:creationId xmlns:a16="http://schemas.microsoft.com/office/drawing/2014/main" id="{A10A7709-FD6C-B04E-8F0B-FE511A82C787}"/>
+              </a:ext>
+            </a:extLst>
+          </p:cNvPr>
+          <p:cNvSpPr>
+            <a:spLocks noGrp="1"/>
+          </p:cNvSpPr>
+          <p:nvPr>
+            <p:ph type="title"/>
+          </p:nvPr>
+        </p:nvSpPr>
+        <p:spPr>
+          <a:xfrm>
+            <a:off x="628650" y="273847"/>
+            <a:ext cx="7886700" cy="994172"/>
+          </a:xfrm>
+        </p:spPr>
+        <p:txBody>
+          <a:bodyPr anchor="ctr">
+            <a:normAutofit/>
+          </a:bodyPr>
+          <a:lstStyle/>
+          <a:p>
+            <a:r>
+              <a:rPr lang="en-US" dirty="0"/>
+              <a:t>Overlap Chunk Over Target</a:t>
+            </a:r>
+          </a:p>
+        </p:txBody>
+      </p:sp>
       <p:sp>
         <p:nvSpPr>
           <p:cNvPr id="22" name="Content Placeholder 21">
@@ -44253,7 +44246,7 @@
 </p:sld>
 </file>
 
-<file path=ppt/slides/slide51.xml><?xml version="1.0" encoding="utf-8"?>
+<file path=ppt/slides/slide52.xml><?xml version="1.0" encoding="utf-8"?>
 <p:sld xmlns:a="http://schemas.openxmlformats.org/drawingml/2006/main" xmlns:r="http://schemas.openxmlformats.org/officeDocument/2006/relationships" xmlns:p="http://schemas.openxmlformats.org/presentationml/2006/main">
   <p:cSld>
     <p:spTree>
@@ -44576,7 +44569,7 @@
 </p:sld>
 </file>
 
-<file path=ppt/slides/slide52.xml><?xml version="1.0" encoding="utf-8"?>
+<file path=ppt/slides/slide53.xml><?xml version="1.0" encoding="utf-8"?>
 <p:sld xmlns:a="http://schemas.openxmlformats.org/drawingml/2006/main" xmlns:r="http://schemas.openxmlformats.org/officeDocument/2006/relationships" xmlns:p="http://schemas.openxmlformats.org/presentationml/2006/main">
   <p:cSld>
     <p:spTree>
@@ -44672,7 +44665,7 @@
 </p:sld>
 </file>
 
-<file path=ppt/slides/slide53.xml><?xml version="1.0" encoding="utf-8"?>
+<file path=ppt/slides/slide54.xml><?xml version="1.0" encoding="utf-8"?>
 <p:sld xmlns:a="http://schemas.openxmlformats.org/drawingml/2006/main" xmlns:r="http://schemas.openxmlformats.org/officeDocument/2006/relationships" xmlns:p="http://schemas.openxmlformats.org/presentationml/2006/main">
   <p:cSld>
     <p:spTree>
@@ -44836,7 +44829,7 @@
 </p:sld>
 </file>
 
-<file path=ppt/slides/slide54.xml><?xml version="1.0" encoding="utf-8"?>
+<file path=ppt/slides/slide55.xml><?xml version="1.0" encoding="utf-8"?>
 <p:sld xmlns:a="http://schemas.openxmlformats.org/drawingml/2006/main" xmlns:r="http://schemas.openxmlformats.org/officeDocument/2006/relationships" xmlns:p="http://schemas.openxmlformats.org/presentationml/2006/main">
   <p:cSld>
     <p:spTree>
@@ -44983,12 +44976,19 @@
               <a:rPr lang="en-US" dirty="0">
                 <a:hlinkClick r:id="rId7"/>
               </a:rPr>
-              <a:t>https://www.youtube.com/watch?v=PISoSH8KGVI</a:t>
-            </a:r>
-            <a:r>
-              <a:rPr lang="en-US" dirty="0"/>
+              <a:t>https://www.youtube.com/watch?v</a:t>
+            </a:r>
+            <a:r>
+              <a:rPr lang="en-US">
+                <a:hlinkClick r:id="rId7"/>
+              </a:rPr>
+              <a:t>=PISoSH8KGVI</a:t>
+            </a:r>
+            <a:r>
+              <a:rPr lang="en-US"/>
               <a:t> </a:t>
             </a:r>
+            <a:endParaRPr lang="en-US" dirty="0"/>
           </a:p>
           <a:p>
             <a:r>
@@ -45277,7 +45277,7 @@
             </a:pPr>
             <a:r>
               <a:rPr lang="en-US" sz="2100" dirty="0"/>
-              <a:t>Top Chunk Usage </a:t>
+              <a:t>Top Chunk Extension </a:t>
             </a:r>
             <a:r>
               <a:rPr lang="en-US" sz="2100" b="1" dirty="0"/>
@@ -45387,7 +45387,7 @@
           <a:p>
             <a:r>
               <a:rPr lang="en-US" dirty="0"/>
-              <a:t>Using the Top Chunk</a:t>
+              <a:t>Top Chunk Extension</a:t>
             </a:r>
           </a:p>
         </p:txBody>
@@ -45643,7 +45643,7 @@
         </p:blipFill>
         <p:spPr>
           <a:xfrm>
-            <a:off x="5903736" y="431257"/>
+            <a:off x="5640389" y="418029"/>
             <a:ext cx="2782641" cy="4280985"/>
           </a:xfrm>
           <a:prstGeom prst="rect">
@@ -45667,7 +45667,7 @@
         </p:nvCxnSpPr>
         <p:spPr>
           <a:xfrm>
-            <a:off x="5185071" y="1681594"/>
+            <a:off x="4929039" y="1659649"/>
             <a:ext cx="719601" cy="0"/>
           </a:xfrm>
           <a:prstGeom prst="straightConnector1">
@@ -45711,7 +45711,7 @@
         </p:nvCxnSpPr>
         <p:spPr>
           <a:xfrm>
-            <a:off x="5188430" y="1677652"/>
+            <a:off x="4932398" y="1655707"/>
             <a:ext cx="0" cy="2369163"/>
           </a:xfrm>
           <a:prstGeom prst="line">
@@ -45754,7 +45754,7 @@
         </p:nvCxnSpPr>
         <p:spPr>
           <a:xfrm>
-            <a:off x="5185071" y="4046815"/>
+            <a:off x="4929039" y="4024870"/>
             <a:ext cx="719601" cy="0"/>
           </a:xfrm>
           <a:prstGeom prst="straightConnector1">
@@ -45835,7 +45835,7 @@
           <a:p>
             <a:r>
               <a:rPr lang="en-US" dirty="0"/>
-              <a:t>Top Chunk Extension – 1 </a:t>
+              <a:t>Top Chunk Extension</a:t>
             </a:r>
           </a:p>
         </p:txBody>
@@ -46075,7 +46075,7 @@
         </p:blipFill>
         <p:spPr>
           <a:xfrm>
-            <a:off x="6425989" y="645046"/>
+            <a:off x="5811512" y="703390"/>
             <a:ext cx="2600513" cy="4000790"/>
           </a:xfrm>
           <a:prstGeom prst="rect">
@@ -46099,7 +46099,7 @@
         </p:nvCxnSpPr>
         <p:spPr>
           <a:xfrm>
-            <a:off x="5682504" y="2400300"/>
+            <a:off x="4929039" y="2400300"/>
             <a:ext cx="719601" cy="0"/>
           </a:xfrm>
           <a:prstGeom prst="straightConnector1">
@@ -46143,7 +46143,7 @@
         </p:nvCxnSpPr>
         <p:spPr>
           <a:xfrm>
-            <a:off x="5685863" y="2365131"/>
+            <a:off x="4932398" y="2365131"/>
             <a:ext cx="0" cy="1659739"/>
           </a:xfrm>
           <a:prstGeom prst="line">
@@ -46186,7 +46186,7 @@
         </p:nvCxnSpPr>
         <p:spPr>
           <a:xfrm>
-            <a:off x="5682504" y="4022863"/>
+            <a:off x="4929039" y="4022863"/>
             <a:ext cx="719601" cy="0"/>
           </a:xfrm>
           <a:prstGeom prst="straightConnector1">

</xml_diff>

<commit_message>
House of force slides
</commit_message>
<xml_diff>
--- a/challenges/house_of_force/house_of_force.pptx
+++ b/challenges/house_of_force/house_of_force.pptx
@@ -5,7 +5,7 @@
     <p:sldMasterId id="2147483660" r:id="rId1"/>
   </p:sldMasterIdLst>
   <p:notesMasterIdLst>
-    <p:notesMasterId r:id="rId56"/>
+    <p:notesMasterId r:id="rId57"/>
   </p:notesMasterIdLst>
   <p:sldIdLst>
     <p:sldId id="327" r:id="rId2"/>
@@ -35,7 +35,7 @@
     <p:sldId id="522" r:id="rId26"/>
     <p:sldId id="516" r:id="rId27"/>
     <p:sldId id="504" r:id="rId28"/>
-    <p:sldId id="505" r:id="rId29"/>
+    <p:sldId id="559" r:id="rId29"/>
     <p:sldId id="525" r:id="rId30"/>
     <p:sldId id="536" r:id="rId31"/>
     <p:sldId id="537" r:id="rId32"/>
@@ -60,8 +60,9 @@
     <p:sldId id="554" r:id="rId51"/>
     <p:sldId id="555" r:id="rId52"/>
     <p:sldId id="556" r:id="rId53"/>
-    <p:sldId id="557" r:id="rId54"/>
-    <p:sldId id="524" r:id="rId55"/>
+    <p:sldId id="505" r:id="rId54"/>
+    <p:sldId id="557" r:id="rId55"/>
+    <p:sldId id="524" r:id="rId56"/>
   </p:sldIdLst>
   <p:sldSz cx="9144000" cy="5143500" type="screen16x9"/>
   <p:notesSz cx="6858000" cy="9144000"/>
@@ -35431,7 +35432,7 @@
           <p:cNvPr id="2" name="Title 1">
             <a:extLst>
               <a:ext uri="{FF2B5EF4-FFF2-40B4-BE49-F238E27FC236}">
-                <a16:creationId xmlns:a16="http://schemas.microsoft.com/office/drawing/2014/main" id="{0D0B15C1-72BF-BE43-8C9D-694FA7FB4C7D}"/>
+                <a16:creationId xmlns:a16="http://schemas.microsoft.com/office/drawing/2014/main" id="{82C88F05-6ED7-E947-B950-290DA01131F0}"/>
               </a:ext>
             </a:extLst>
           </p:cNvPr>
@@ -35444,12 +35445,30 @@
         </p:nvSpPr>
         <p:spPr/>
         <p:txBody>
-          <a:bodyPr/>
+          <a:bodyPr>
+            <a:normAutofit fontScale="90000"/>
+          </a:bodyPr>
           <a:lstStyle/>
           <a:p>
             <a:r>
               <a:rPr lang="en-US" dirty="0"/>
-              <a:t>Drawbacks</a:t>
+              <a:t>Viewing the </a:t>
+            </a:r>
+            <a:r>
+              <a:rPr lang="en-US" dirty="0" err="1"/>
+              <a:t>top_chunk</a:t>
+            </a:r>
+            <a:r>
+              <a:rPr lang="en-US" dirty="0"/>
+              <a:t> – </a:t>
+            </a:r>
+            <a:r>
+              <a:rPr lang="en-US" dirty="0" err="1"/>
+              <a:t>Pwndbg</a:t>
+            </a:r>
+            <a:r>
+              <a:rPr lang="en-US" dirty="0"/>
+              <a:t> </a:t>
             </a:r>
           </a:p>
         </p:txBody>
@@ -35459,7 +35478,7 @@
           <p:cNvPr id="3" name="Content Placeholder 2">
             <a:extLst>
               <a:ext uri="{FF2B5EF4-FFF2-40B4-BE49-F238E27FC236}">
-                <a16:creationId xmlns:a16="http://schemas.microsoft.com/office/drawing/2014/main" id="{05F00F21-345C-604D-8C1F-E5BCEB780502}"/>
+                <a16:creationId xmlns:a16="http://schemas.microsoft.com/office/drawing/2014/main" id="{40298989-3D5B-B34A-A855-3DE1811765B1}"/>
               </a:ext>
             </a:extLst>
           </p:cNvPr>
@@ -35470,90 +35489,84 @@
             <p:ph idx="1"/>
           </p:nvPr>
         </p:nvSpPr>
-        <p:spPr>
-          <a:xfrm>
-            <a:off x="628650" y="1236540"/>
-            <a:ext cx="7886700" cy="3555267"/>
-          </a:xfrm>
-        </p:spPr>
+        <p:spPr/>
         <p:txBody>
-          <a:bodyPr>
-            <a:normAutofit/>
-          </a:bodyPr>
+          <a:bodyPr/>
           <a:lstStyle/>
           <a:p>
             <a:r>
+              <a:rPr lang="en-US" dirty="0" err="1"/>
+              <a:t>Pwndbg</a:t>
+            </a:r>
+            <a:r>
               <a:rPr lang="en-US" dirty="0"/>
-              <a:t>Patched in </a:t>
-            </a:r>
-            <a:r>
-              <a:rPr lang="en-US" dirty="0" err="1"/>
-              <a:t>GLibC</a:t>
-            </a:r>
-            <a:r>
-              <a:rPr lang="en-US" dirty="0"/>
-              <a:t> Malloc 2.29 (code shown below) </a:t>
-            </a:r>
-            <a:br>
-              <a:rPr lang="en-US" dirty="0"/>
-            </a:br>
-            <a:br>
-              <a:rPr lang="en-US" dirty="0"/>
-            </a:br>
+              <a:t> specific command: </a:t>
+            </a:r>
+          </a:p>
+          <a:p>
+            <a:pPr lvl="1"/>
+            <a:r>
+              <a:rPr lang="en-US" sz="3800" dirty="0" err="1">
+                <a:latin typeface="Agency FB" panose="020F0502020204030204" pitchFamily="34" charset="0"/>
+              </a:rPr>
+              <a:t>top_chunk</a:t>
+            </a:r>
+            <a:endParaRPr lang="en-US" sz="3800" dirty="0">
+              <a:latin typeface="Agency FB" panose="020F0502020204030204" pitchFamily="34" charset="0"/>
+            </a:endParaRPr>
+          </a:p>
+          <a:p>
             <a:endParaRPr lang="en-US" dirty="0"/>
           </a:p>
           <a:p>
-            <a:r>
-              <a:rPr lang="en-US" dirty="0"/>
-              <a:t>Arbitrary sized allocations are hard to come by</a:t>
-            </a:r>
+            <a:endParaRPr lang="en-US" dirty="0"/>
           </a:p>
           <a:p>
             <a:r>
               <a:rPr lang="en-US" dirty="0"/>
-              <a:t>Requires one or two leaks: </a:t>
+              <a:t>View raw </a:t>
+            </a:r>
+            <a:r>
+              <a:rPr lang="en-US" dirty="0" err="1"/>
+              <a:t>top_chunk</a:t>
+            </a:r>
+            <a:r>
+              <a:rPr lang="en-US" dirty="0"/>
+              <a:t> data: </a:t>
             </a:r>
           </a:p>
           <a:p>
             <a:pPr lvl="1"/>
             <a:r>
-              <a:rPr lang="en-US" dirty="0"/>
-              <a:t>Heap leak </a:t>
-            </a:r>
-          </a:p>
-          <a:p>
-            <a:pPr lvl="1"/>
-            <a:r>
-              <a:rPr lang="en-US" dirty="0" err="1"/>
-              <a:t>LibC</a:t>
-            </a:r>
-            <a:r>
-              <a:rPr lang="en-US" dirty="0"/>
-              <a:t> or stack or .</a:t>
-            </a:r>
-            <a:r>
-              <a:rPr lang="en-US" dirty="0" err="1"/>
-              <a:t>bss</a:t>
-            </a:r>
-            <a:r>
-              <a:rPr lang="en-US" dirty="0"/>
-              <a:t> (depending on the target)</a:t>
-            </a:r>
-          </a:p>
-          <a:p>
-            <a:r>
-              <a:rPr lang="en-US" dirty="0"/>
-              <a:t>Top Chunk metadata may corrupt other data</a:t>
+              <a:rPr lang="en-US" sz="3800" dirty="0">
+                <a:latin typeface="Agency FB" panose="020F0502020204030204" pitchFamily="34" charset="0"/>
+                <a:cs typeface="Agency FB" panose="020F0502020204030204" pitchFamily="34" charset="0"/>
+              </a:rPr>
+              <a:t>﻿x/4gx </a:t>
+            </a:r>
+            <a:r>
+              <a:rPr lang="en-US" sz="3800" dirty="0" err="1">
+                <a:latin typeface="Agency FB" panose="020F0502020204030204" pitchFamily="34" charset="0"/>
+                <a:cs typeface="Agency FB" panose="020F0502020204030204" pitchFamily="34" charset="0"/>
+              </a:rPr>
+              <a:t>main_arena</a:t>
+            </a:r>
+            <a:r>
+              <a:rPr lang="en-US" sz="3800" dirty="0">
+                <a:latin typeface="Agency FB" panose="020F0502020204030204" pitchFamily="34" charset="0"/>
+                <a:cs typeface="Agency FB" panose="020F0502020204030204" pitchFamily="34" charset="0"/>
+              </a:rPr>
+              <a:t>-&gt;top</a:t>
             </a:r>
           </a:p>
         </p:txBody>
       </p:sp>
       <p:pic>
         <p:nvPicPr>
-          <p:cNvPr id="6" name="Picture 5">
+          <p:cNvPr id="5" name="Picture 4">
             <a:extLst>
               <a:ext uri="{FF2B5EF4-FFF2-40B4-BE49-F238E27FC236}">
-                <a16:creationId xmlns:a16="http://schemas.microsoft.com/office/drawing/2014/main" id="{1510C3B3-B0C0-224F-B89E-CEFA332D6DFA}"/>
+                <a16:creationId xmlns:a16="http://schemas.microsoft.com/office/drawing/2014/main" id="{A9388B8A-CE9E-3540-9A83-A0F0D18E85C2}"/>
               </a:ext>
             </a:extLst>
           </p:cNvPr>
@@ -35570,8 +35583,38 @@
         </p:blipFill>
         <p:spPr>
           <a:xfrm>
-            <a:off x="857251" y="1519512"/>
-            <a:ext cx="6362700" cy="711200"/>
+            <a:off x="592074" y="4103108"/>
+            <a:ext cx="6845300" cy="673100"/>
+          </a:xfrm>
+          <a:prstGeom prst="rect">
+            <a:avLst/>
+          </a:prstGeom>
+        </p:spPr>
+      </p:pic>
+      <p:pic>
+        <p:nvPicPr>
+          <p:cNvPr id="7" name="Picture 6" descr="Text&#10;&#10;Description automatically generated">
+            <a:extLst>
+              <a:ext uri="{FF2B5EF4-FFF2-40B4-BE49-F238E27FC236}">
+                <a16:creationId xmlns:a16="http://schemas.microsoft.com/office/drawing/2014/main" id="{49F8B520-A332-4645-9421-5340DA28826A}"/>
+              </a:ext>
+            </a:extLst>
+          </p:cNvPr>
+          <p:cNvPicPr>
+            <a:picLocks noChangeAspect="1"/>
+          </p:cNvPicPr>
+          <p:nvPr/>
+        </p:nvPicPr>
+        <p:blipFill>
+          <a:blip r:embed="rId3"/>
+          <a:stretch>
+            <a:fillRect/>
+          </a:stretch>
+        </p:blipFill>
+        <p:spPr>
+          <a:xfrm>
+            <a:off x="4761822" y="1268019"/>
+            <a:ext cx="2806700" cy="2006600"/>
           </a:xfrm>
           <a:prstGeom prst="rect">
             <a:avLst/>
@@ -35581,7 +35624,7 @@
     </p:spTree>
     <p:extLst>
       <p:ext uri="{BB962C8B-B14F-4D97-AF65-F5344CB8AC3E}">
-        <p14:creationId xmlns:p14="http://schemas.microsoft.com/office/powerpoint/2010/main" val="496836656"/>
+        <p14:creationId xmlns:p14="http://schemas.microsoft.com/office/powerpoint/2010/main" val="4145057408"/>
       </p:ext>
     </p:extLst>
   </p:cSld>
@@ -36506,8 +36549,13 @@
           <a:p>
             <a:r>
               <a:rPr lang="en-US" dirty="0"/>
-              <a:t>First = Allocation 1024 chunk</a:t>
-            </a:r>
+              <a:t>First = </a:t>
+            </a:r>
+            <a:r>
+              <a:rPr lang="en-US"/>
+              <a:t>1024 sized chunk</a:t>
+            </a:r>
+            <a:endParaRPr lang="en-US" dirty="0"/>
           </a:p>
           <a:p>
             <a:r>
@@ -44694,6 +44742,188 @@
           <p:cNvPr id="2" name="Title 1">
             <a:extLst>
               <a:ext uri="{FF2B5EF4-FFF2-40B4-BE49-F238E27FC236}">
+                <a16:creationId xmlns:a16="http://schemas.microsoft.com/office/drawing/2014/main" id="{0D0B15C1-72BF-BE43-8C9D-694FA7FB4C7D}"/>
+              </a:ext>
+            </a:extLst>
+          </p:cNvPr>
+          <p:cNvSpPr>
+            <a:spLocks noGrp="1"/>
+          </p:cNvSpPr>
+          <p:nvPr>
+            <p:ph type="title"/>
+          </p:nvPr>
+        </p:nvSpPr>
+        <p:spPr/>
+        <p:txBody>
+          <a:bodyPr/>
+          <a:lstStyle/>
+          <a:p>
+            <a:r>
+              <a:rPr lang="en-US" dirty="0"/>
+              <a:t>Drawbacks</a:t>
+            </a:r>
+          </a:p>
+        </p:txBody>
+      </p:sp>
+      <p:sp>
+        <p:nvSpPr>
+          <p:cNvPr id="3" name="Content Placeholder 2">
+            <a:extLst>
+              <a:ext uri="{FF2B5EF4-FFF2-40B4-BE49-F238E27FC236}">
+                <a16:creationId xmlns:a16="http://schemas.microsoft.com/office/drawing/2014/main" id="{05F00F21-345C-604D-8C1F-E5BCEB780502}"/>
+              </a:ext>
+            </a:extLst>
+          </p:cNvPr>
+          <p:cNvSpPr>
+            <a:spLocks noGrp="1"/>
+          </p:cNvSpPr>
+          <p:nvPr>
+            <p:ph idx="1"/>
+          </p:nvPr>
+        </p:nvSpPr>
+        <p:spPr>
+          <a:xfrm>
+            <a:off x="628650" y="1236540"/>
+            <a:ext cx="7886700" cy="3555267"/>
+          </a:xfrm>
+        </p:spPr>
+        <p:txBody>
+          <a:bodyPr>
+            <a:normAutofit/>
+          </a:bodyPr>
+          <a:lstStyle/>
+          <a:p>
+            <a:r>
+              <a:rPr lang="en-US" dirty="0"/>
+              <a:t>Patched in </a:t>
+            </a:r>
+            <a:r>
+              <a:rPr lang="en-US" dirty="0" err="1"/>
+              <a:t>GLibC</a:t>
+            </a:r>
+            <a:r>
+              <a:rPr lang="en-US" dirty="0"/>
+              <a:t> Malloc 2.29 (code shown below) </a:t>
+            </a:r>
+            <a:br>
+              <a:rPr lang="en-US" dirty="0"/>
+            </a:br>
+            <a:br>
+              <a:rPr lang="en-US" dirty="0"/>
+            </a:br>
+            <a:endParaRPr lang="en-US" dirty="0"/>
+          </a:p>
+          <a:p>
+            <a:r>
+              <a:rPr lang="en-US" dirty="0"/>
+              <a:t>Arbitrary sized allocations are hard to come by</a:t>
+            </a:r>
+          </a:p>
+          <a:p>
+            <a:r>
+              <a:rPr lang="en-US" dirty="0"/>
+              <a:t>Requires one or two leaks: </a:t>
+            </a:r>
+          </a:p>
+          <a:p>
+            <a:pPr lvl="1"/>
+            <a:r>
+              <a:rPr lang="en-US" dirty="0"/>
+              <a:t>Heap leak </a:t>
+            </a:r>
+          </a:p>
+          <a:p>
+            <a:pPr lvl="1"/>
+            <a:r>
+              <a:rPr lang="en-US" dirty="0" err="1"/>
+              <a:t>LibC</a:t>
+            </a:r>
+            <a:r>
+              <a:rPr lang="en-US" dirty="0"/>
+              <a:t> or stack or .</a:t>
+            </a:r>
+            <a:r>
+              <a:rPr lang="en-US" dirty="0" err="1"/>
+              <a:t>bss</a:t>
+            </a:r>
+            <a:r>
+              <a:rPr lang="en-US" dirty="0"/>
+              <a:t> (depending on the target)</a:t>
+            </a:r>
+          </a:p>
+          <a:p>
+            <a:r>
+              <a:rPr lang="en-US" dirty="0"/>
+              <a:t>Top Chunk metadata may corrupt other data</a:t>
+            </a:r>
+          </a:p>
+        </p:txBody>
+      </p:sp>
+      <p:pic>
+        <p:nvPicPr>
+          <p:cNvPr id="6" name="Picture 5">
+            <a:extLst>
+              <a:ext uri="{FF2B5EF4-FFF2-40B4-BE49-F238E27FC236}">
+                <a16:creationId xmlns:a16="http://schemas.microsoft.com/office/drawing/2014/main" id="{1510C3B3-B0C0-224F-B89E-CEFA332D6DFA}"/>
+              </a:ext>
+            </a:extLst>
+          </p:cNvPr>
+          <p:cNvPicPr>
+            <a:picLocks noChangeAspect="1"/>
+          </p:cNvPicPr>
+          <p:nvPr/>
+        </p:nvPicPr>
+        <p:blipFill>
+          <a:blip r:embed="rId2"/>
+          <a:stretch>
+            <a:fillRect/>
+          </a:stretch>
+        </p:blipFill>
+        <p:spPr>
+          <a:xfrm>
+            <a:off x="857251" y="1519512"/>
+            <a:ext cx="6362700" cy="711200"/>
+          </a:xfrm>
+          <a:prstGeom prst="rect">
+            <a:avLst/>
+          </a:prstGeom>
+        </p:spPr>
+      </p:pic>
+    </p:spTree>
+    <p:extLst>
+      <p:ext uri="{BB962C8B-B14F-4D97-AF65-F5344CB8AC3E}">
+        <p14:creationId xmlns:p14="http://schemas.microsoft.com/office/powerpoint/2010/main" val="496836656"/>
+      </p:ext>
+    </p:extLst>
+  </p:cSld>
+  <p:clrMapOvr>
+    <a:masterClrMapping/>
+  </p:clrMapOvr>
+</p:sld>
+</file>
+
+<file path=ppt/slides/slide54.xml><?xml version="1.0" encoding="utf-8"?>
+<p:sld xmlns:a="http://schemas.openxmlformats.org/drawingml/2006/main" xmlns:r="http://schemas.openxmlformats.org/officeDocument/2006/relationships" xmlns:p="http://schemas.openxmlformats.org/presentationml/2006/main">
+  <p:cSld>
+    <p:spTree>
+      <p:nvGrpSpPr>
+        <p:cNvPr id="1" name=""/>
+        <p:cNvGrpSpPr/>
+        <p:nvPr/>
+      </p:nvGrpSpPr>
+      <p:grpSpPr>
+        <a:xfrm>
+          <a:off x="0" y="0"/>
+          <a:ext cx="0" cy="0"/>
+          <a:chOff x="0" y="0"/>
+          <a:chExt cx="0" cy="0"/>
+        </a:xfrm>
+      </p:grpSpPr>
+      <p:sp>
+        <p:nvSpPr>
+          <p:cNvPr id="2" name="Title 1">
+            <a:extLst>
+              <a:ext uri="{FF2B5EF4-FFF2-40B4-BE49-F238E27FC236}">
                 <a16:creationId xmlns:a16="http://schemas.microsoft.com/office/drawing/2014/main" id="{5A2C7F9C-1BBE-8A43-97B8-7835CCBDB8B9}"/>
               </a:ext>
             </a:extLst>
@@ -44836,7 +45066,7 @@
 </p:sld>
 </file>
 
-<file path=ppt/slides/slide54.xml><?xml version="1.0" encoding="utf-8"?>
+<file path=ppt/slides/slide55.xml><?xml version="1.0" encoding="utf-8"?>
 <p:sld xmlns:a="http://schemas.openxmlformats.org/drawingml/2006/main" xmlns:r="http://schemas.openxmlformats.org/officeDocument/2006/relationships" xmlns:p="http://schemas.openxmlformats.org/presentationml/2006/main">
   <p:cSld>
     <p:spTree>

</xml_diff>